<commit_message>
Se agrega panel de selección de opciones, y posibilidad de ingreso de número
</commit_message>
<xml_diff>
--- a/HistorialDeCambios.pptx
+++ b/HistorialDeCambios.pptx
@@ -9,6 +9,9 @@
     <p:sldId id="258" r:id="rId3"/>
     <p:sldId id="259" r:id="rId4"/>
     <p:sldId id="261" r:id="rId5"/>
+    <p:sldId id="262" r:id="rId6"/>
+    <p:sldId id="263" r:id="rId7"/>
+    <p:sldId id="264" r:id="rId8"/>
   </p:sldIdLst>
   <p:sldSz cx="12192000" cy="6858000"/>
   <p:notesSz cx="6858000" cy="9144000"/>
@@ -123,7 +126,7 @@
   <pc:docChgLst>
     <pc:chgData name="German Luis Dagatti" userId="43e7766c8bef1a99" providerId="LiveId" clId="{571E5FA9-B83F-472B-AE41-7DE03044985C}"/>
     <pc:docChg chg="custSel addSld modSld">
-      <pc:chgData name="German Luis Dagatti" userId="43e7766c8bef1a99" providerId="LiveId" clId="{571E5FA9-B83F-472B-AE41-7DE03044985C}" dt="2025-04-18T01:09:36.669" v="220" actId="20577"/>
+      <pc:chgData name="German Luis Dagatti" userId="43e7766c8bef1a99" providerId="LiveId" clId="{571E5FA9-B83F-472B-AE41-7DE03044985C}" dt="2025-04-19T17:17:35.789" v="226" actId="22"/>
       <pc:docMkLst>
         <pc:docMk/>
       </pc:docMkLst>
@@ -192,6 +195,51 @@
             <pc:docMk/>
             <pc:sldMk cId="1408610806" sldId="261"/>
             <ac:picMk id="3" creationId="{C36E81D9-7848-159F-90EB-EEC6B96E166E}"/>
+          </ac:picMkLst>
+        </pc:picChg>
+      </pc:sldChg>
+      <pc:sldChg chg="addSp new mod">
+        <pc:chgData name="German Luis Dagatti" userId="43e7766c8bef1a99" providerId="LiveId" clId="{571E5FA9-B83F-472B-AE41-7DE03044985C}" dt="2025-04-19T02:56:54.562" v="222" actId="22"/>
+        <pc:sldMkLst>
+          <pc:docMk/>
+          <pc:sldMk cId="3617571959" sldId="262"/>
+        </pc:sldMkLst>
+        <pc:picChg chg="add">
+          <ac:chgData name="German Luis Dagatti" userId="43e7766c8bef1a99" providerId="LiveId" clId="{571E5FA9-B83F-472B-AE41-7DE03044985C}" dt="2025-04-19T02:56:54.562" v="222" actId="22"/>
+          <ac:picMkLst>
+            <pc:docMk/>
+            <pc:sldMk cId="3617571959" sldId="262"/>
+            <ac:picMk id="3" creationId="{F40AC34F-D917-6FD2-2C53-9E689A4D639B}"/>
+          </ac:picMkLst>
+        </pc:picChg>
+      </pc:sldChg>
+      <pc:sldChg chg="addSp new mod">
+        <pc:chgData name="German Luis Dagatti" userId="43e7766c8bef1a99" providerId="LiveId" clId="{571E5FA9-B83F-472B-AE41-7DE03044985C}" dt="2025-04-19T02:57:47.749" v="224" actId="22"/>
+        <pc:sldMkLst>
+          <pc:docMk/>
+          <pc:sldMk cId="4277338908" sldId="263"/>
+        </pc:sldMkLst>
+        <pc:picChg chg="add">
+          <ac:chgData name="German Luis Dagatti" userId="43e7766c8bef1a99" providerId="LiveId" clId="{571E5FA9-B83F-472B-AE41-7DE03044985C}" dt="2025-04-19T02:57:47.749" v="224" actId="22"/>
+          <ac:picMkLst>
+            <pc:docMk/>
+            <pc:sldMk cId="4277338908" sldId="263"/>
+            <ac:picMk id="3" creationId="{C0313311-D3F7-67C4-3931-B0D480FFAFE0}"/>
+          </ac:picMkLst>
+        </pc:picChg>
+      </pc:sldChg>
+      <pc:sldChg chg="addSp new mod">
+        <pc:chgData name="German Luis Dagatti" userId="43e7766c8bef1a99" providerId="LiveId" clId="{571E5FA9-B83F-472B-AE41-7DE03044985C}" dt="2025-04-19T17:17:35.789" v="226" actId="22"/>
+        <pc:sldMkLst>
+          <pc:docMk/>
+          <pc:sldMk cId="3021590399" sldId="264"/>
+        </pc:sldMkLst>
+        <pc:picChg chg="add">
+          <ac:chgData name="German Luis Dagatti" userId="43e7766c8bef1a99" providerId="LiveId" clId="{571E5FA9-B83F-472B-AE41-7DE03044985C}" dt="2025-04-19T17:17:35.789" v="226" actId="22"/>
+          <ac:picMkLst>
+            <pc:docMk/>
+            <pc:sldMk cId="3021590399" sldId="264"/>
+            <ac:picMk id="3" creationId="{031AB544-7E16-F6BD-5B4A-F3E0762E512F}"/>
           </ac:picMkLst>
         </pc:picChg>
       </pc:sldChg>
@@ -3625,6 +3673,186 @@
 </p:sld>
 </file>
 
+<file path=ppt/slides/slide5.xml><?xml version="1.0" encoding="utf-8"?>
+<p:sld xmlns:a="http://schemas.openxmlformats.org/drawingml/2006/main" xmlns:r="http://schemas.openxmlformats.org/officeDocument/2006/relationships" xmlns:p="http://schemas.openxmlformats.org/presentationml/2006/main">
+  <p:cSld>
+    <p:spTree>
+      <p:nvGrpSpPr>
+        <p:cNvPr id="1" name=""/>
+        <p:cNvGrpSpPr/>
+        <p:nvPr/>
+      </p:nvGrpSpPr>
+      <p:grpSpPr>
+        <a:xfrm>
+          <a:off x="0" y="0"/>
+          <a:ext cx="0" cy="0"/>
+          <a:chOff x="0" y="0"/>
+          <a:chExt cx="0" cy="0"/>
+        </a:xfrm>
+      </p:grpSpPr>
+      <p:pic>
+        <p:nvPicPr>
+          <p:cNvPr id="3" name="Imagen 2">
+            <a:extLst>
+              <a:ext uri="{FF2B5EF4-FFF2-40B4-BE49-F238E27FC236}">
+                <a16:creationId xmlns:a16="http://schemas.microsoft.com/office/drawing/2014/main" id="{F40AC34F-D917-6FD2-2C53-9E689A4D639B}"/>
+              </a:ext>
+            </a:extLst>
+          </p:cNvPr>
+          <p:cNvPicPr>
+            <a:picLocks noChangeAspect="1"/>
+          </p:cNvPicPr>
+          <p:nvPr/>
+        </p:nvPicPr>
+        <p:blipFill>
+          <a:blip r:embed="rId2"/>
+          <a:stretch>
+            <a:fillRect/>
+          </a:stretch>
+        </p:blipFill>
+        <p:spPr>
+          <a:xfrm>
+            <a:off x="0" y="485993"/>
+            <a:ext cx="12192000" cy="5886013"/>
+          </a:xfrm>
+          <a:prstGeom prst="rect">
+            <a:avLst/>
+          </a:prstGeom>
+        </p:spPr>
+      </p:pic>
+    </p:spTree>
+    <p:extLst>
+      <p:ext uri="{BB962C8B-B14F-4D97-AF65-F5344CB8AC3E}">
+        <p14:creationId xmlns:p14="http://schemas.microsoft.com/office/powerpoint/2010/main" val="3617571959"/>
+      </p:ext>
+    </p:extLst>
+  </p:cSld>
+  <p:clrMapOvr>
+    <a:masterClrMapping/>
+  </p:clrMapOvr>
+</p:sld>
+</file>
+
+<file path=ppt/slides/slide6.xml><?xml version="1.0" encoding="utf-8"?>
+<p:sld xmlns:a="http://schemas.openxmlformats.org/drawingml/2006/main" xmlns:r="http://schemas.openxmlformats.org/officeDocument/2006/relationships" xmlns:p="http://schemas.openxmlformats.org/presentationml/2006/main">
+  <p:cSld>
+    <p:spTree>
+      <p:nvGrpSpPr>
+        <p:cNvPr id="1" name=""/>
+        <p:cNvGrpSpPr/>
+        <p:nvPr/>
+      </p:nvGrpSpPr>
+      <p:grpSpPr>
+        <a:xfrm>
+          <a:off x="0" y="0"/>
+          <a:ext cx="0" cy="0"/>
+          <a:chOff x="0" y="0"/>
+          <a:chExt cx="0" cy="0"/>
+        </a:xfrm>
+      </p:grpSpPr>
+      <p:pic>
+        <p:nvPicPr>
+          <p:cNvPr id="3" name="Imagen 2">
+            <a:extLst>
+              <a:ext uri="{FF2B5EF4-FFF2-40B4-BE49-F238E27FC236}">
+                <a16:creationId xmlns:a16="http://schemas.microsoft.com/office/drawing/2014/main" id="{C0313311-D3F7-67C4-3931-B0D480FFAFE0}"/>
+              </a:ext>
+            </a:extLst>
+          </p:cNvPr>
+          <p:cNvPicPr>
+            <a:picLocks noChangeAspect="1"/>
+          </p:cNvPicPr>
+          <p:nvPr/>
+        </p:nvPicPr>
+        <p:blipFill>
+          <a:blip r:embed="rId2"/>
+          <a:stretch>
+            <a:fillRect/>
+          </a:stretch>
+        </p:blipFill>
+        <p:spPr>
+          <a:xfrm>
+            <a:off x="0" y="437474"/>
+            <a:ext cx="12192000" cy="5983051"/>
+          </a:xfrm>
+          <a:prstGeom prst="rect">
+            <a:avLst/>
+          </a:prstGeom>
+        </p:spPr>
+      </p:pic>
+    </p:spTree>
+    <p:extLst>
+      <p:ext uri="{BB962C8B-B14F-4D97-AF65-F5344CB8AC3E}">
+        <p14:creationId xmlns:p14="http://schemas.microsoft.com/office/powerpoint/2010/main" val="4277338908"/>
+      </p:ext>
+    </p:extLst>
+  </p:cSld>
+  <p:clrMapOvr>
+    <a:masterClrMapping/>
+  </p:clrMapOvr>
+</p:sld>
+</file>
+
+<file path=ppt/slides/slide7.xml><?xml version="1.0" encoding="utf-8"?>
+<p:sld xmlns:a="http://schemas.openxmlformats.org/drawingml/2006/main" xmlns:r="http://schemas.openxmlformats.org/officeDocument/2006/relationships" xmlns:p="http://schemas.openxmlformats.org/presentationml/2006/main">
+  <p:cSld>
+    <p:spTree>
+      <p:nvGrpSpPr>
+        <p:cNvPr id="1" name=""/>
+        <p:cNvGrpSpPr/>
+        <p:nvPr/>
+      </p:nvGrpSpPr>
+      <p:grpSpPr>
+        <a:xfrm>
+          <a:off x="0" y="0"/>
+          <a:ext cx="0" cy="0"/>
+          <a:chOff x="0" y="0"/>
+          <a:chExt cx="0" cy="0"/>
+        </a:xfrm>
+      </p:grpSpPr>
+      <p:pic>
+        <p:nvPicPr>
+          <p:cNvPr id="3" name="Imagen 2">
+            <a:extLst>
+              <a:ext uri="{FF2B5EF4-FFF2-40B4-BE49-F238E27FC236}">
+                <a16:creationId xmlns:a16="http://schemas.microsoft.com/office/drawing/2014/main" id="{031AB544-7E16-F6BD-5B4A-F3E0762E512F}"/>
+              </a:ext>
+            </a:extLst>
+          </p:cNvPr>
+          <p:cNvPicPr>
+            <a:picLocks noChangeAspect="1"/>
+          </p:cNvPicPr>
+          <p:nvPr/>
+        </p:nvPicPr>
+        <p:blipFill>
+          <a:blip r:embed="rId2"/>
+          <a:stretch>
+            <a:fillRect/>
+          </a:stretch>
+        </p:blipFill>
+        <p:spPr>
+          <a:xfrm>
+            <a:off x="0" y="201519"/>
+            <a:ext cx="12192000" cy="6454962"/>
+          </a:xfrm>
+          <a:prstGeom prst="rect">
+            <a:avLst/>
+          </a:prstGeom>
+        </p:spPr>
+      </p:pic>
+    </p:spTree>
+    <p:extLst>
+      <p:ext uri="{BB962C8B-B14F-4D97-AF65-F5344CB8AC3E}">
+        <p14:creationId xmlns:p14="http://schemas.microsoft.com/office/powerpoint/2010/main" val="3021590399"/>
+      </p:ext>
+    </p:extLst>
+  </p:cSld>
+  <p:clrMapOvr>
+    <a:masterClrMapping/>
+  </p:clrMapOvr>
+</p:sld>
+</file>
+
 <file path=ppt/theme/theme1.xml><?xml version="1.0" encoding="utf-8"?>
 <a:theme xmlns:a="http://schemas.openxmlformats.org/drawingml/2006/main" name="Office Theme">
   <a:themeElements>

</xml_diff>

<commit_message>
Se optimiza el código  usando IA (Copilot)
</commit_message>
<xml_diff>
--- a/HistorialDeCambios.pptx
+++ b/HistorialDeCambios.pptx
@@ -12,6 +12,11 @@
     <p:sldId id="262" r:id="rId6"/>
     <p:sldId id="263" r:id="rId7"/>
     <p:sldId id="264" r:id="rId8"/>
+    <p:sldId id="265" r:id="rId9"/>
+    <p:sldId id="266" r:id="rId10"/>
+    <p:sldId id="267" r:id="rId11"/>
+    <p:sldId id="268" r:id="rId12"/>
+    <p:sldId id="269" r:id="rId13"/>
   </p:sldIdLst>
   <p:sldSz cx="12192000" cy="6858000"/>
   <p:notesSz cx="6858000" cy="9144000"/>
@@ -126,7 +131,7 @@
   <pc:docChgLst>
     <pc:chgData name="German Luis Dagatti" userId="43e7766c8bef1a99" providerId="LiveId" clId="{571E5FA9-B83F-472B-AE41-7DE03044985C}"/>
     <pc:docChg chg="custSel addSld modSld">
-      <pc:chgData name="German Luis Dagatti" userId="43e7766c8bef1a99" providerId="LiveId" clId="{571E5FA9-B83F-472B-AE41-7DE03044985C}" dt="2025-04-19T17:17:35.789" v="226" actId="22"/>
+      <pc:chgData name="German Luis Dagatti" userId="43e7766c8bef1a99" providerId="LiveId" clId="{571E5FA9-B83F-472B-AE41-7DE03044985C}" dt="2025-04-19T17:44:33.418" v="236" actId="22"/>
       <pc:docMkLst>
         <pc:docMk/>
       </pc:docMkLst>
@@ -240,6 +245,81 @@
             <pc:docMk/>
             <pc:sldMk cId="3021590399" sldId="264"/>
             <ac:picMk id="3" creationId="{031AB544-7E16-F6BD-5B4A-F3E0762E512F}"/>
+          </ac:picMkLst>
+        </pc:picChg>
+      </pc:sldChg>
+      <pc:sldChg chg="addSp new mod">
+        <pc:chgData name="German Luis Dagatti" userId="43e7766c8bef1a99" providerId="LiveId" clId="{571E5FA9-B83F-472B-AE41-7DE03044985C}" dt="2025-04-19T17:30:22.908" v="228" actId="22"/>
+        <pc:sldMkLst>
+          <pc:docMk/>
+          <pc:sldMk cId="2948101576" sldId="265"/>
+        </pc:sldMkLst>
+        <pc:picChg chg="add">
+          <ac:chgData name="German Luis Dagatti" userId="43e7766c8bef1a99" providerId="LiveId" clId="{571E5FA9-B83F-472B-AE41-7DE03044985C}" dt="2025-04-19T17:30:22.908" v="228" actId="22"/>
+          <ac:picMkLst>
+            <pc:docMk/>
+            <pc:sldMk cId="2948101576" sldId="265"/>
+            <ac:picMk id="3" creationId="{D08EB241-DD0F-B533-5A3D-063438C8FF28}"/>
+          </ac:picMkLst>
+        </pc:picChg>
+      </pc:sldChg>
+      <pc:sldChg chg="addSp new mod">
+        <pc:chgData name="German Luis Dagatti" userId="43e7766c8bef1a99" providerId="LiveId" clId="{571E5FA9-B83F-472B-AE41-7DE03044985C}" dt="2025-04-19T17:39:22.621" v="230" actId="22"/>
+        <pc:sldMkLst>
+          <pc:docMk/>
+          <pc:sldMk cId="3503346368" sldId="266"/>
+        </pc:sldMkLst>
+        <pc:picChg chg="add">
+          <ac:chgData name="German Luis Dagatti" userId="43e7766c8bef1a99" providerId="LiveId" clId="{571E5FA9-B83F-472B-AE41-7DE03044985C}" dt="2025-04-19T17:39:22.621" v="230" actId="22"/>
+          <ac:picMkLst>
+            <pc:docMk/>
+            <pc:sldMk cId="3503346368" sldId="266"/>
+            <ac:picMk id="3" creationId="{65D580F7-7D77-920E-D870-3B052FF03AE6}"/>
+          </ac:picMkLst>
+        </pc:picChg>
+      </pc:sldChg>
+      <pc:sldChg chg="addSp new mod">
+        <pc:chgData name="German Luis Dagatti" userId="43e7766c8bef1a99" providerId="LiveId" clId="{571E5FA9-B83F-472B-AE41-7DE03044985C}" dt="2025-04-19T17:39:53.115" v="234" actId="22"/>
+        <pc:sldMkLst>
+          <pc:docMk/>
+          <pc:sldMk cId="2555316905" sldId="267"/>
+        </pc:sldMkLst>
+        <pc:picChg chg="add">
+          <ac:chgData name="German Luis Dagatti" userId="43e7766c8bef1a99" providerId="LiveId" clId="{571E5FA9-B83F-472B-AE41-7DE03044985C}" dt="2025-04-19T17:39:53.115" v="234" actId="22"/>
+          <ac:picMkLst>
+            <pc:docMk/>
+            <pc:sldMk cId="2555316905" sldId="267"/>
+            <ac:picMk id="3" creationId="{CA2DE50D-B667-6C28-778D-73A34DF069C9}"/>
+          </ac:picMkLst>
+        </pc:picChg>
+      </pc:sldChg>
+      <pc:sldChg chg="addSp new mod">
+        <pc:chgData name="German Luis Dagatti" userId="43e7766c8bef1a99" providerId="LiveId" clId="{571E5FA9-B83F-472B-AE41-7DE03044985C}" dt="2025-04-19T17:44:09.676" v="235" actId="22"/>
+        <pc:sldMkLst>
+          <pc:docMk/>
+          <pc:sldMk cId="3375920547" sldId="268"/>
+        </pc:sldMkLst>
+        <pc:picChg chg="add">
+          <ac:chgData name="German Luis Dagatti" userId="43e7766c8bef1a99" providerId="LiveId" clId="{571E5FA9-B83F-472B-AE41-7DE03044985C}" dt="2025-04-19T17:44:09.676" v="235" actId="22"/>
+          <ac:picMkLst>
+            <pc:docMk/>
+            <pc:sldMk cId="3375920547" sldId="268"/>
+            <ac:picMk id="3" creationId="{4DAB8AF3-0DC1-75CA-75DC-49C1FDF71F75}"/>
+          </ac:picMkLst>
+        </pc:picChg>
+      </pc:sldChg>
+      <pc:sldChg chg="addSp new mod">
+        <pc:chgData name="German Luis Dagatti" userId="43e7766c8bef1a99" providerId="LiveId" clId="{571E5FA9-B83F-472B-AE41-7DE03044985C}" dt="2025-04-19T17:44:33.418" v="236" actId="22"/>
+        <pc:sldMkLst>
+          <pc:docMk/>
+          <pc:sldMk cId="4082906994" sldId="269"/>
+        </pc:sldMkLst>
+        <pc:picChg chg="add">
+          <ac:chgData name="German Luis Dagatti" userId="43e7766c8bef1a99" providerId="LiveId" clId="{571E5FA9-B83F-472B-AE41-7DE03044985C}" dt="2025-04-19T17:44:33.418" v="236" actId="22"/>
+          <ac:picMkLst>
+            <pc:docMk/>
+            <pc:sldMk cId="4082906994" sldId="269"/>
+            <ac:picMk id="3" creationId="{599485CC-34A0-3813-BA63-66AF0F637008}"/>
           </ac:picMkLst>
         </pc:picChg>
       </pc:sldChg>
@@ -3193,6 +3273,186 @@
 </p:sld>
 </file>
 
+<file path=ppt/slides/slide10.xml><?xml version="1.0" encoding="utf-8"?>
+<p:sld xmlns:a="http://schemas.openxmlformats.org/drawingml/2006/main" xmlns:r="http://schemas.openxmlformats.org/officeDocument/2006/relationships" xmlns:p="http://schemas.openxmlformats.org/presentationml/2006/main">
+  <p:cSld>
+    <p:spTree>
+      <p:nvGrpSpPr>
+        <p:cNvPr id="1" name=""/>
+        <p:cNvGrpSpPr/>
+        <p:nvPr/>
+      </p:nvGrpSpPr>
+      <p:grpSpPr>
+        <a:xfrm>
+          <a:off x="0" y="0"/>
+          <a:ext cx="0" cy="0"/>
+          <a:chOff x="0" y="0"/>
+          <a:chExt cx="0" cy="0"/>
+        </a:xfrm>
+      </p:grpSpPr>
+      <p:pic>
+        <p:nvPicPr>
+          <p:cNvPr id="3" name="Imagen 2">
+            <a:extLst>
+              <a:ext uri="{FF2B5EF4-FFF2-40B4-BE49-F238E27FC236}">
+                <a16:creationId xmlns:a16="http://schemas.microsoft.com/office/drawing/2014/main" id="{CA2DE50D-B667-6C28-778D-73A34DF069C9}"/>
+              </a:ext>
+            </a:extLst>
+          </p:cNvPr>
+          <p:cNvPicPr>
+            <a:picLocks noChangeAspect="1"/>
+          </p:cNvPicPr>
+          <p:nvPr/>
+        </p:nvPicPr>
+        <p:blipFill>
+          <a:blip r:embed="rId2"/>
+          <a:stretch>
+            <a:fillRect/>
+          </a:stretch>
+        </p:blipFill>
+        <p:spPr>
+          <a:xfrm>
+            <a:off x="0" y="217402"/>
+            <a:ext cx="12192000" cy="6423195"/>
+          </a:xfrm>
+          <a:prstGeom prst="rect">
+            <a:avLst/>
+          </a:prstGeom>
+        </p:spPr>
+      </p:pic>
+    </p:spTree>
+    <p:extLst>
+      <p:ext uri="{BB962C8B-B14F-4D97-AF65-F5344CB8AC3E}">
+        <p14:creationId xmlns:p14="http://schemas.microsoft.com/office/powerpoint/2010/main" val="2555316905"/>
+      </p:ext>
+    </p:extLst>
+  </p:cSld>
+  <p:clrMapOvr>
+    <a:masterClrMapping/>
+  </p:clrMapOvr>
+</p:sld>
+</file>
+
+<file path=ppt/slides/slide11.xml><?xml version="1.0" encoding="utf-8"?>
+<p:sld xmlns:a="http://schemas.openxmlformats.org/drawingml/2006/main" xmlns:r="http://schemas.openxmlformats.org/officeDocument/2006/relationships" xmlns:p="http://schemas.openxmlformats.org/presentationml/2006/main">
+  <p:cSld>
+    <p:spTree>
+      <p:nvGrpSpPr>
+        <p:cNvPr id="1" name=""/>
+        <p:cNvGrpSpPr/>
+        <p:nvPr/>
+      </p:nvGrpSpPr>
+      <p:grpSpPr>
+        <a:xfrm>
+          <a:off x="0" y="0"/>
+          <a:ext cx="0" cy="0"/>
+          <a:chOff x="0" y="0"/>
+          <a:chExt cx="0" cy="0"/>
+        </a:xfrm>
+      </p:grpSpPr>
+      <p:pic>
+        <p:nvPicPr>
+          <p:cNvPr id="3" name="Imagen 2">
+            <a:extLst>
+              <a:ext uri="{FF2B5EF4-FFF2-40B4-BE49-F238E27FC236}">
+                <a16:creationId xmlns:a16="http://schemas.microsoft.com/office/drawing/2014/main" id="{4DAB8AF3-0DC1-75CA-75DC-49C1FDF71F75}"/>
+              </a:ext>
+            </a:extLst>
+          </p:cNvPr>
+          <p:cNvPicPr>
+            <a:picLocks noChangeAspect="1"/>
+          </p:cNvPicPr>
+          <p:nvPr/>
+        </p:nvPicPr>
+        <p:blipFill>
+          <a:blip r:embed="rId2"/>
+          <a:stretch>
+            <a:fillRect/>
+          </a:stretch>
+        </p:blipFill>
+        <p:spPr>
+          <a:xfrm>
+            <a:off x="0" y="244047"/>
+            <a:ext cx="12192000" cy="6369906"/>
+          </a:xfrm>
+          <a:prstGeom prst="rect">
+            <a:avLst/>
+          </a:prstGeom>
+        </p:spPr>
+      </p:pic>
+    </p:spTree>
+    <p:extLst>
+      <p:ext uri="{BB962C8B-B14F-4D97-AF65-F5344CB8AC3E}">
+        <p14:creationId xmlns:p14="http://schemas.microsoft.com/office/powerpoint/2010/main" val="3375920547"/>
+      </p:ext>
+    </p:extLst>
+  </p:cSld>
+  <p:clrMapOvr>
+    <a:masterClrMapping/>
+  </p:clrMapOvr>
+</p:sld>
+</file>
+
+<file path=ppt/slides/slide12.xml><?xml version="1.0" encoding="utf-8"?>
+<p:sld xmlns:a="http://schemas.openxmlformats.org/drawingml/2006/main" xmlns:r="http://schemas.openxmlformats.org/officeDocument/2006/relationships" xmlns:p="http://schemas.openxmlformats.org/presentationml/2006/main">
+  <p:cSld>
+    <p:spTree>
+      <p:nvGrpSpPr>
+        <p:cNvPr id="1" name=""/>
+        <p:cNvGrpSpPr/>
+        <p:nvPr/>
+      </p:nvGrpSpPr>
+      <p:grpSpPr>
+        <a:xfrm>
+          <a:off x="0" y="0"/>
+          <a:ext cx="0" cy="0"/>
+          <a:chOff x="0" y="0"/>
+          <a:chExt cx="0" cy="0"/>
+        </a:xfrm>
+      </p:grpSpPr>
+      <p:pic>
+        <p:nvPicPr>
+          <p:cNvPr id="3" name="Imagen 2">
+            <a:extLst>
+              <a:ext uri="{FF2B5EF4-FFF2-40B4-BE49-F238E27FC236}">
+                <a16:creationId xmlns:a16="http://schemas.microsoft.com/office/drawing/2014/main" id="{599485CC-34A0-3813-BA63-66AF0F637008}"/>
+              </a:ext>
+            </a:extLst>
+          </p:cNvPr>
+          <p:cNvPicPr>
+            <a:picLocks noChangeAspect="1"/>
+          </p:cNvPicPr>
+          <p:nvPr/>
+        </p:nvPicPr>
+        <p:blipFill>
+          <a:blip r:embed="rId2"/>
+          <a:stretch>
+            <a:fillRect/>
+          </a:stretch>
+        </p:blipFill>
+        <p:spPr>
+          <a:xfrm>
+            <a:off x="0" y="205828"/>
+            <a:ext cx="12192000" cy="6446344"/>
+          </a:xfrm>
+          <a:prstGeom prst="rect">
+            <a:avLst/>
+          </a:prstGeom>
+        </p:spPr>
+      </p:pic>
+    </p:spTree>
+    <p:extLst>
+      <p:ext uri="{BB962C8B-B14F-4D97-AF65-F5344CB8AC3E}">
+        <p14:creationId xmlns:p14="http://schemas.microsoft.com/office/powerpoint/2010/main" val="4082906994"/>
+      </p:ext>
+    </p:extLst>
+  </p:cSld>
+  <p:clrMapOvr>
+    <a:masterClrMapping/>
+  </p:clrMapOvr>
+</p:sld>
+</file>
+
 <file path=ppt/slides/slide2.xml><?xml version="1.0" encoding="utf-8"?>
 <p:sld xmlns:a="http://schemas.openxmlformats.org/drawingml/2006/main" xmlns:r="http://schemas.openxmlformats.org/officeDocument/2006/relationships" xmlns:p="http://schemas.openxmlformats.org/presentationml/2006/main">
   <p:cSld>
@@ -3844,6 +4104,126 @@
     <p:extLst>
       <p:ext uri="{BB962C8B-B14F-4D97-AF65-F5344CB8AC3E}">
         <p14:creationId xmlns:p14="http://schemas.microsoft.com/office/powerpoint/2010/main" val="3021590399"/>
+      </p:ext>
+    </p:extLst>
+  </p:cSld>
+  <p:clrMapOvr>
+    <a:masterClrMapping/>
+  </p:clrMapOvr>
+</p:sld>
+</file>
+
+<file path=ppt/slides/slide8.xml><?xml version="1.0" encoding="utf-8"?>
+<p:sld xmlns:a="http://schemas.openxmlformats.org/drawingml/2006/main" xmlns:r="http://schemas.openxmlformats.org/officeDocument/2006/relationships" xmlns:p="http://schemas.openxmlformats.org/presentationml/2006/main">
+  <p:cSld>
+    <p:spTree>
+      <p:nvGrpSpPr>
+        <p:cNvPr id="1" name=""/>
+        <p:cNvGrpSpPr/>
+        <p:nvPr/>
+      </p:nvGrpSpPr>
+      <p:grpSpPr>
+        <a:xfrm>
+          <a:off x="0" y="0"/>
+          <a:ext cx="0" cy="0"/>
+          <a:chOff x="0" y="0"/>
+          <a:chExt cx="0" cy="0"/>
+        </a:xfrm>
+      </p:grpSpPr>
+      <p:pic>
+        <p:nvPicPr>
+          <p:cNvPr id="3" name="Imagen 2">
+            <a:extLst>
+              <a:ext uri="{FF2B5EF4-FFF2-40B4-BE49-F238E27FC236}">
+                <a16:creationId xmlns:a16="http://schemas.microsoft.com/office/drawing/2014/main" id="{D08EB241-DD0F-B533-5A3D-063438C8FF28}"/>
+              </a:ext>
+            </a:extLst>
+          </p:cNvPr>
+          <p:cNvPicPr>
+            <a:picLocks noChangeAspect="1"/>
+          </p:cNvPicPr>
+          <p:nvPr/>
+        </p:nvPicPr>
+        <p:blipFill>
+          <a:blip r:embed="rId2"/>
+          <a:stretch>
+            <a:fillRect/>
+          </a:stretch>
+        </p:blipFill>
+        <p:spPr>
+          <a:xfrm>
+            <a:off x="0" y="169752"/>
+            <a:ext cx="12192000" cy="6518495"/>
+          </a:xfrm>
+          <a:prstGeom prst="rect">
+            <a:avLst/>
+          </a:prstGeom>
+        </p:spPr>
+      </p:pic>
+    </p:spTree>
+    <p:extLst>
+      <p:ext uri="{BB962C8B-B14F-4D97-AF65-F5344CB8AC3E}">
+        <p14:creationId xmlns:p14="http://schemas.microsoft.com/office/powerpoint/2010/main" val="2948101576"/>
+      </p:ext>
+    </p:extLst>
+  </p:cSld>
+  <p:clrMapOvr>
+    <a:masterClrMapping/>
+  </p:clrMapOvr>
+</p:sld>
+</file>
+
+<file path=ppt/slides/slide9.xml><?xml version="1.0" encoding="utf-8"?>
+<p:sld xmlns:a="http://schemas.openxmlformats.org/drawingml/2006/main" xmlns:r="http://schemas.openxmlformats.org/officeDocument/2006/relationships" xmlns:p="http://schemas.openxmlformats.org/presentationml/2006/main">
+  <p:cSld>
+    <p:spTree>
+      <p:nvGrpSpPr>
+        <p:cNvPr id="1" name=""/>
+        <p:cNvGrpSpPr/>
+        <p:nvPr/>
+      </p:nvGrpSpPr>
+      <p:grpSpPr>
+        <a:xfrm>
+          <a:off x="0" y="0"/>
+          <a:ext cx="0" cy="0"/>
+          <a:chOff x="0" y="0"/>
+          <a:chExt cx="0" cy="0"/>
+        </a:xfrm>
+      </p:grpSpPr>
+      <p:pic>
+        <p:nvPicPr>
+          <p:cNvPr id="3" name="Imagen 2">
+            <a:extLst>
+              <a:ext uri="{FF2B5EF4-FFF2-40B4-BE49-F238E27FC236}">
+                <a16:creationId xmlns:a16="http://schemas.microsoft.com/office/drawing/2014/main" id="{65D580F7-7D77-920E-D870-3B052FF03AE6}"/>
+              </a:ext>
+            </a:extLst>
+          </p:cNvPr>
+          <p:cNvPicPr>
+            <a:picLocks noChangeAspect="1"/>
+          </p:cNvPicPr>
+          <p:nvPr/>
+        </p:nvPicPr>
+        <p:blipFill>
+          <a:blip r:embed="rId2"/>
+          <a:stretch>
+            <a:fillRect/>
+          </a:stretch>
+        </p:blipFill>
+        <p:spPr>
+          <a:xfrm>
+            <a:off x="0" y="186514"/>
+            <a:ext cx="12192000" cy="6484971"/>
+          </a:xfrm>
+          <a:prstGeom prst="rect">
+            <a:avLst/>
+          </a:prstGeom>
+        </p:spPr>
+      </p:pic>
+    </p:spTree>
+    <p:extLst>
+      <p:ext uri="{BB962C8B-B14F-4D97-AF65-F5344CB8AC3E}">
+        <p14:creationId xmlns:p14="http://schemas.microsoft.com/office/powerpoint/2010/main" val="3503346368"/>
       </p:ext>
     </p:extLst>
   </p:cSld>

</xml_diff>

<commit_message>
Se optimiza el código  usando IA (Copilot)- Se agregan detalles a pptx
</commit_message>
<xml_diff>
--- a/HistorialDeCambios.pptx
+++ b/HistorialDeCambios.pptx
@@ -4,6 +4,9 @@
   <p:sldMasterIdLst>
     <p:sldMasterId id="2147483672" r:id="rId1"/>
   </p:sldMasterIdLst>
+  <p:notesMasterIdLst>
+    <p:notesMasterId r:id="rId14"/>
+  </p:notesMasterIdLst>
   <p:sldIdLst>
     <p:sldId id="260" r:id="rId2"/>
     <p:sldId id="258" r:id="rId3"/>
@@ -121,7 +124,7 @@
 <file path=ppt/revisionInfo.xml><?xml version="1.0" encoding="utf-8"?>
 <p1510:revInfo xmlns:a="http://schemas.openxmlformats.org/drawingml/2006/main" xmlns:r="http://schemas.openxmlformats.org/officeDocument/2006/relationships" xmlns:p1510="http://schemas.microsoft.com/office/powerpoint/2015/10/main">
   <p1510:revLst>
-    <p1510:client id="{571E5FA9-B83F-472B-AE41-7DE03044985C}" v="4" dt="2025-04-18T01:09:09.212"/>
+    <p1510:client id="{571E5FA9-B83F-472B-AE41-7DE03044985C}" v="6" dt="2025-04-21T02:37:54.423"/>
   </p1510:revLst>
 </p1510:revInfo>
 </file>
@@ -130,202 +133,2309 @@
 <pc:chgInfo xmlns:a="http://schemas.openxmlformats.org/drawingml/2006/main" xmlns:r="http://schemas.openxmlformats.org/officeDocument/2006/relationships" xmlns:ac="http://schemas.microsoft.com/office/drawing/2013/main/command" xmlns:pc="http://schemas.microsoft.com/office/powerpoint/2013/main/command">
   <pc:docChgLst>
     <pc:chgData name="German Luis Dagatti" userId="43e7766c8bef1a99" providerId="LiveId" clId="{571E5FA9-B83F-472B-AE41-7DE03044985C}"/>
-    <pc:docChg chg="custSel addSld modSld">
-      <pc:chgData name="German Luis Dagatti" userId="43e7766c8bef1a99" providerId="LiveId" clId="{571E5FA9-B83F-472B-AE41-7DE03044985C}" dt="2025-04-19T17:44:33.418" v="236" actId="22"/>
+    <pc:docChg chg="undo custSel addSld delSld modSld addMainMaster delMainMaster modMainMaster addSection delSection">
+      <pc:chgData name="German Luis Dagatti" userId="43e7766c8bef1a99" providerId="LiveId" clId="{571E5FA9-B83F-472B-AE41-7DE03044985C}" dt="2025-04-21T02:37:57.584" v="276" actId="34807"/>
       <pc:docMkLst>
         <pc:docMk/>
       </pc:docMkLst>
-      <pc:sldChg chg="addSp modSp mod">
-        <pc:chgData name="German Luis Dagatti" userId="43e7766c8bef1a99" providerId="LiveId" clId="{571E5FA9-B83F-472B-AE41-7DE03044985C}" dt="2025-04-18T01:08:46.755" v="100" actId="20577"/>
+      <pc:sldChg chg="addSp modSp add del mod">
+        <pc:chgData name="German Luis Dagatti" userId="43e7766c8bef1a99" providerId="LiveId" clId="{571E5FA9-B83F-472B-AE41-7DE03044985C}" dt="2025-04-21T02:37:57.584" v="276" actId="34807"/>
         <pc:sldMkLst>
           <pc:docMk/>
           <pc:sldMk cId="1552804827" sldId="258"/>
         </pc:sldMkLst>
-        <pc:spChg chg="add mod">
-          <ac:chgData name="German Luis Dagatti" userId="43e7766c8bef1a99" providerId="LiveId" clId="{571E5FA9-B83F-472B-AE41-7DE03044985C}" dt="2025-04-18T01:08:46.755" v="100" actId="20577"/>
-          <ac:spMkLst>
-            <pc:docMk/>
-            <pc:sldMk cId="1552804827" sldId="258"/>
-            <ac:spMk id="4" creationId="{2AB0FBF2-DD93-550E-2EE2-160565E44B3C}"/>
-          </ac:spMkLst>
-        </pc:spChg>
       </pc:sldChg>
-      <pc:sldChg chg="addSp modSp mod">
-        <pc:chgData name="German Luis Dagatti" userId="43e7766c8bef1a99" providerId="LiveId" clId="{571E5FA9-B83F-472B-AE41-7DE03044985C}" dt="2025-04-18T01:09:06.283" v="122" actId="1076"/>
+      <pc:sldChg chg="addSp modSp add del mod">
+        <pc:chgData name="German Luis Dagatti" userId="43e7766c8bef1a99" providerId="LiveId" clId="{571E5FA9-B83F-472B-AE41-7DE03044985C}" dt="2025-04-21T02:37:57.584" v="276" actId="34807"/>
         <pc:sldMkLst>
           <pc:docMk/>
           <pc:sldMk cId="1989973634" sldId="259"/>
         </pc:sldMkLst>
-        <pc:spChg chg="add mod">
-          <ac:chgData name="German Luis Dagatti" userId="43e7766c8bef1a99" providerId="LiveId" clId="{571E5FA9-B83F-472B-AE41-7DE03044985C}" dt="2025-04-18T01:09:06.283" v="122" actId="1076"/>
-          <ac:spMkLst>
-            <pc:docMk/>
-            <pc:sldMk cId="1989973634" sldId="259"/>
-            <ac:spMk id="4" creationId="{F6EDB328-8047-4787-E96D-6352FA57958F}"/>
-          </ac:spMkLst>
-        </pc:spChg>
       </pc:sldChg>
-      <pc:sldChg chg="addSp modSp mod">
-        <pc:chgData name="German Luis Dagatti" userId="43e7766c8bef1a99" providerId="LiveId" clId="{571E5FA9-B83F-472B-AE41-7DE03044985C}" dt="2025-04-18T01:08:19.004" v="40" actId="20577"/>
+      <pc:sldChg chg="addSp modSp add del mod">
+        <pc:chgData name="German Luis Dagatti" userId="43e7766c8bef1a99" providerId="LiveId" clId="{571E5FA9-B83F-472B-AE41-7DE03044985C}" dt="2025-04-21T02:37:57.584" v="276" actId="34807"/>
         <pc:sldMkLst>
           <pc:docMk/>
           <pc:sldMk cId="168120994" sldId="260"/>
         </pc:sldMkLst>
-        <pc:spChg chg="add mod">
-          <ac:chgData name="German Luis Dagatti" userId="43e7766c8bef1a99" providerId="LiveId" clId="{571E5FA9-B83F-472B-AE41-7DE03044985C}" dt="2025-04-18T01:08:19.004" v="40" actId="20577"/>
-          <ac:spMkLst>
-            <pc:docMk/>
-            <pc:sldMk cId="168120994" sldId="260"/>
-            <ac:spMk id="4" creationId="{D3CA4ED9-F86E-EA47-DDCA-BA83F6E31280}"/>
-          </ac:spMkLst>
-        </pc:spChg>
       </pc:sldChg>
-      <pc:sldChg chg="addSp modSp new mod">
-        <pc:chgData name="German Luis Dagatti" userId="43e7766c8bef1a99" providerId="LiveId" clId="{571E5FA9-B83F-472B-AE41-7DE03044985C}" dt="2025-04-18T01:09:36.669" v="220" actId="20577"/>
+      <pc:sldChg chg="addSp modSp new add del mod">
+        <pc:chgData name="German Luis Dagatti" userId="43e7766c8bef1a99" providerId="LiveId" clId="{571E5FA9-B83F-472B-AE41-7DE03044985C}" dt="2025-04-21T02:37:57.584" v="276" actId="34807"/>
         <pc:sldMkLst>
           <pc:docMk/>
           <pc:sldMk cId="1408610806" sldId="261"/>
         </pc:sldMkLst>
-        <pc:spChg chg="add mod">
-          <ac:chgData name="German Luis Dagatti" userId="43e7766c8bef1a99" providerId="LiveId" clId="{571E5FA9-B83F-472B-AE41-7DE03044985C}" dt="2025-04-18T01:09:36.669" v="220" actId="20577"/>
-          <ac:spMkLst>
-            <pc:docMk/>
-            <pc:sldMk cId="1408610806" sldId="261"/>
-            <ac:spMk id="4" creationId="{E9CED2DA-16F6-5807-BFAB-C6EAF75B1E0E}"/>
-          </ac:spMkLst>
-        </pc:spChg>
-        <pc:picChg chg="add">
-          <ac:chgData name="German Luis Dagatti" userId="43e7766c8bef1a99" providerId="LiveId" clId="{571E5FA9-B83F-472B-AE41-7DE03044985C}" dt="2025-04-18T01:07:39.843" v="1" actId="22"/>
-          <ac:picMkLst>
-            <pc:docMk/>
-            <pc:sldMk cId="1408610806" sldId="261"/>
-            <ac:picMk id="3" creationId="{C36E81D9-7848-159F-90EB-EEC6B96E166E}"/>
-          </ac:picMkLst>
-        </pc:picChg>
       </pc:sldChg>
-      <pc:sldChg chg="addSp new mod">
-        <pc:chgData name="German Luis Dagatti" userId="43e7766c8bef1a99" providerId="LiveId" clId="{571E5FA9-B83F-472B-AE41-7DE03044985C}" dt="2025-04-19T02:56:54.562" v="222" actId="22"/>
+      <pc:sldChg chg="addSp new add del mod">
+        <pc:chgData name="German Luis Dagatti" userId="43e7766c8bef1a99" providerId="LiveId" clId="{571E5FA9-B83F-472B-AE41-7DE03044985C}" dt="2025-04-21T02:37:57.584" v="276" actId="34807"/>
         <pc:sldMkLst>
           <pc:docMk/>
           <pc:sldMk cId="3617571959" sldId="262"/>
         </pc:sldMkLst>
-        <pc:picChg chg="add">
-          <ac:chgData name="German Luis Dagatti" userId="43e7766c8bef1a99" providerId="LiveId" clId="{571E5FA9-B83F-472B-AE41-7DE03044985C}" dt="2025-04-19T02:56:54.562" v="222" actId="22"/>
-          <ac:picMkLst>
-            <pc:docMk/>
-            <pc:sldMk cId="3617571959" sldId="262"/>
-            <ac:picMk id="3" creationId="{F40AC34F-D917-6FD2-2C53-9E689A4D639B}"/>
-          </ac:picMkLst>
-        </pc:picChg>
       </pc:sldChg>
-      <pc:sldChg chg="addSp new mod">
-        <pc:chgData name="German Luis Dagatti" userId="43e7766c8bef1a99" providerId="LiveId" clId="{571E5FA9-B83F-472B-AE41-7DE03044985C}" dt="2025-04-19T02:57:47.749" v="224" actId="22"/>
+      <pc:sldChg chg="addSp new add del mod">
+        <pc:chgData name="German Luis Dagatti" userId="43e7766c8bef1a99" providerId="LiveId" clId="{571E5FA9-B83F-472B-AE41-7DE03044985C}" dt="2025-04-21T02:37:57.584" v="276" actId="34807"/>
         <pc:sldMkLst>
           <pc:docMk/>
           <pc:sldMk cId="4277338908" sldId="263"/>
         </pc:sldMkLst>
-        <pc:picChg chg="add">
-          <ac:chgData name="German Luis Dagatti" userId="43e7766c8bef1a99" providerId="LiveId" clId="{571E5FA9-B83F-472B-AE41-7DE03044985C}" dt="2025-04-19T02:57:47.749" v="224" actId="22"/>
-          <ac:picMkLst>
-            <pc:docMk/>
-            <pc:sldMk cId="4277338908" sldId="263"/>
-            <ac:picMk id="3" creationId="{C0313311-D3F7-67C4-3931-B0D480FFAFE0}"/>
-          </ac:picMkLst>
-        </pc:picChg>
       </pc:sldChg>
-      <pc:sldChg chg="addSp new mod">
-        <pc:chgData name="German Luis Dagatti" userId="43e7766c8bef1a99" providerId="LiveId" clId="{571E5FA9-B83F-472B-AE41-7DE03044985C}" dt="2025-04-19T17:17:35.789" v="226" actId="22"/>
+      <pc:sldChg chg="addSp new add del mod">
+        <pc:chgData name="German Luis Dagatti" userId="43e7766c8bef1a99" providerId="LiveId" clId="{571E5FA9-B83F-472B-AE41-7DE03044985C}" dt="2025-04-21T02:37:57.584" v="276" actId="34807"/>
         <pc:sldMkLst>
           <pc:docMk/>
           <pc:sldMk cId="3021590399" sldId="264"/>
         </pc:sldMkLst>
-        <pc:picChg chg="add">
-          <ac:chgData name="German Luis Dagatti" userId="43e7766c8bef1a99" providerId="LiveId" clId="{571E5FA9-B83F-472B-AE41-7DE03044985C}" dt="2025-04-19T17:17:35.789" v="226" actId="22"/>
-          <ac:picMkLst>
-            <pc:docMk/>
-            <pc:sldMk cId="3021590399" sldId="264"/>
-            <ac:picMk id="3" creationId="{031AB544-7E16-F6BD-5B4A-F3E0762E512F}"/>
-          </ac:picMkLst>
-        </pc:picChg>
       </pc:sldChg>
-      <pc:sldChg chg="addSp new mod">
-        <pc:chgData name="German Luis Dagatti" userId="43e7766c8bef1a99" providerId="LiveId" clId="{571E5FA9-B83F-472B-AE41-7DE03044985C}" dt="2025-04-19T17:30:22.908" v="228" actId="22"/>
+      <pc:sldChg chg="addSp new add del mod">
+        <pc:chgData name="German Luis Dagatti" userId="43e7766c8bef1a99" providerId="LiveId" clId="{571E5FA9-B83F-472B-AE41-7DE03044985C}" dt="2025-04-21T02:37:57.584" v="276" actId="34807"/>
         <pc:sldMkLst>
           <pc:docMk/>
           <pc:sldMk cId="2948101576" sldId="265"/>
         </pc:sldMkLst>
-        <pc:picChg chg="add">
-          <ac:chgData name="German Luis Dagatti" userId="43e7766c8bef1a99" providerId="LiveId" clId="{571E5FA9-B83F-472B-AE41-7DE03044985C}" dt="2025-04-19T17:30:22.908" v="228" actId="22"/>
-          <ac:picMkLst>
-            <pc:docMk/>
-            <pc:sldMk cId="2948101576" sldId="265"/>
-            <ac:picMk id="3" creationId="{D08EB241-DD0F-B533-5A3D-063438C8FF28}"/>
-          </ac:picMkLst>
-        </pc:picChg>
       </pc:sldChg>
-      <pc:sldChg chg="addSp new mod">
-        <pc:chgData name="German Luis Dagatti" userId="43e7766c8bef1a99" providerId="LiveId" clId="{571E5FA9-B83F-472B-AE41-7DE03044985C}" dt="2025-04-19T17:39:22.621" v="230" actId="22"/>
+      <pc:sldChg chg="addSp new add del mod">
+        <pc:chgData name="German Luis Dagatti" userId="43e7766c8bef1a99" providerId="LiveId" clId="{571E5FA9-B83F-472B-AE41-7DE03044985C}" dt="2025-04-21T02:37:57.584" v="276" actId="34807"/>
         <pc:sldMkLst>
           <pc:docMk/>
           <pc:sldMk cId="3503346368" sldId="266"/>
         </pc:sldMkLst>
-        <pc:picChg chg="add">
-          <ac:chgData name="German Luis Dagatti" userId="43e7766c8bef1a99" providerId="LiveId" clId="{571E5FA9-B83F-472B-AE41-7DE03044985C}" dt="2025-04-19T17:39:22.621" v="230" actId="22"/>
-          <ac:picMkLst>
-            <pc:docMk/>
-            <pc:sldMk cId="3503346368" sldId="266"/>
-            <ac:picMk id="3" creationId="{65D580F7-7D77-920E-D870-3B052FF03AE6}"/>
-          </ac:picMkLst>
-        </pc:picChg>
       </pc:sldChg>
-      <pc:sldChg chg="addSp new mod">
-        <pc:chgData name="German Luis Dagatti" userId="43e7766c8bef1a99" providerId="LiveId" clId="{571E5FA9-B83F-472B-AE41-7DE03044985C}" dt="2025-04-19T17:39:53.115" v="234" actId="22"/>
+      <pc:sldChg chg="addSp new add del mod">
+        <pc:chgData name="German Luis Dagatti" userId="43e7766c8bef1a99" providerId="LiveId" clId="{571E5FA9-B83F-472B-AE41-7DE03044985C}" dt="2025-04-21T02:37:57.584" v="276" actId="34807"/>
         <pc:sldMkLst>
           <pc:docMk/>
           <pc:sldMk cId="2555316905" sldId="267"/>
         </pc:sldMkLst>
-        <pc:picChg chg="add">
-          <ac:chgData name="German Luis Dagatti" userId="43e7766c8bef1a99" providerId="LiveId" clId="{571E5FA9-B83F-472B-AE41-7DE03044985C}" dt="2025-04-19T17:39:53.115" v="234" actId="22"/>
-          <ac:picMkLst>
-            <pc:docMk/>
-            <pc:sldMk cId="2555316905" sldId="267"/>
-            <ac:picMk id="3" creationId="{CA2DE50D-B667-6C28-778D-73A34DF069C9}"/>
-          </ac:picMkLst>
-        </pc:picChg>
       </pc:sldChg>
-      <pc:sldChg chg="addSp new mod">
-        <pc:chgData name="German Luis Dagatti" userId="43e7766c8bef1a99" providerId="LiveId" clId="{571E5FA9-B83F-472B-AE41-7DE03044985C}" dt="2025-04-19T17:44:09.676" v="235" actId="22"/>
+      <pc:sldChg chg="addSp new add del mod">
+        <pc:chgData name="German Luis Dagatti" userId="43e7766c8bef1a99" providerId="LiveId" clId="{571E5FA9-B83F-472B-AE41-7DE03044985C}" dt="2025-04-21T02:37:57.584" v="276" actId="34807"/>
         <pc:sldMkLst>
           <pc:docMk/>
           <pc:sldMk cId="3375920547" sldId="268"/>
         </pc:sldMkLst>
-        <pc:picChg chg="add">
-          <ac:chgData name="German Luis Dagatti" userId="43e7766c8bef1a99" providerId="LiveId" clId="{571E5FA9-B83F-472B-AE41-7DE03044985C}" dt="2025-04-19T17:44:09.676" v="235" actId="22"/>
-          <ac:picMkLst>
-            <pc:docMk/>
-            <pc:sldMk cId="3375920547" sldId="268"/>
-            <ac:picMk id="3" creationId="{4DAB8AF3-0DC1-75CA-75DC-49C1FDF71F75}"/>
-          </ac:picMkLst>
-        </pc:picChg>
       </pc:sldChg>
-      <pc:sldChg chg="addSp new mod">
-        <pc:chgData name="German Luis Dagatti" userId="43e7766c8bef1a99" providerId="LiveId" clId="{571E5FA9-B83F-472B-AE41-7DE03044985C}" dt="2025-04-19T17:44:33.418" v="236" actId="22"/>
+      <pc:sldChg chg="addSp new add del mod">
+        <pc:chgData name="German Luis Dagatti" userId="43e7766c8bef1a99" providerId="LiveId" clId="{571E5FA9-B83F-472B-AE41-7DE03044985C}" dt="2025-04-21T02:37:57.584" v="276" actId="34807"/>
         <pc:sldMkLst>
           <pc:docMk/>
           <pc:sldMk cId="4082906994" sldId="269"/>
         </pc:sldMkLst>
-        <pc:picChg chg="add">
-          <ac:chgData name="German Luis Dagatti" userId="43e7766c8bef1a99" providerId="LiveId" clId="{571E5FA9-B83F-472B-AE41-7DE03044985C}" dt="2025-04-19T17:44:33.418" v="236" actId="22"/>
+      </pc:sldChg>
+      <pc:sldChg chg="addSp delSp modSp add del mod setBg modClrScheme addAnim delAnim setClrOvrMap chgLayout">
+        <pc:chgData name="German Luis Dagatti" userId="43e7766c8bef1a99" providerId="LiveId" clId="{571E5FA9-B83F-472B-AE41-7DE03044985C}" dt="2025-04-21T02:28:11.641" v="257" actId="34807"/>
+        <pc:sldMkLst>
+          <pc:docMk/>
+          <pc:sldMk cId="405302534" sldId="2561"/>
+        </pc:sldMkLst>
+        <pc:spChg chg="mod">
+          <ac:chgData name="German Luis Dagatti" userId="43e7766c8bef1a99" providerId="LiveId" clId="{571E5FA9-B83F-472B-AE41-7DE03044985C}" dt="2025-04-21T02:28:11.641" v="257" actId="34807"/>
+          <ac:spMkLst>
+            <pc:docMk/>
+            <pc:sldMk cId="405302534" sldId="2561"/>
+            <ac:spMk id="2" creationId="{1314AA1E-0006-27A2-5EE9-C5860BA9FD76}"/>
+          </ac:spMkLst>
+        </pc:spChg>
+        <pc:spChg chg="mod">
+          <ac:chgData name="German Luis Dagatti" userId="43e7766c8bef1a99" providerId="LiveId" clId="{571E5FA9-B83F-472B-AE41-7DE03044985C}" dt="2025-04-21T02:28:11.641" v="257" actId="34807"/>
+          <ac:spMkLst>
+            <pc:docMk/>
+            <pc:sldMk cId="405302534" sldId="2561"/>
+            <ac:spMk id="3" creationId="{06331450-C9EF-E84D-A6E4-5D2E7449B748}"/>
+          </ac:spMkLst>
+        </pc:spChg>
+        <pc:spChg chg="add del">
+          <ac:chgData name="German Luis Dagatti" userId="43e7766c8bef1a99" providerId="LiveId" clId="{571E5FA9-B83F-472B-AE41-7DE03044985C}" dt="2025-04-21T02:28:11.641" v="257" actId="34807"/>
+          <ac:spMkLst>
+            <pc:docMk/>
+            <pc:sldMk cId="405302534" sldId="2561"/>
+            <ac:spMk id="9" creationId="{19F9BF86-FE94-4517-B97D-026C7515E589}"/>
+          </ac:spMkLst>
+        </pc:spChg>
+        <pc:spChg chg="add del">
+          <ac:chgData name="German Luis Dagatti" userId="43e7766c8bef1a99" providerId="LiveId" clId="{571E5FA9-B83F-472B-AE41-7DE03044985C}" dt="2025-04-21T02:28:11.641" v="257" actId="34807"/>
+          <ac:spMkLst>
+            <pc:docMk/>
+            <pc:sldMk cId="405302534" sldId="2561"/>
+            <ac:spMk id="11" creationId="{36136311-C81B-47C5-AE0A-5641A5A59520}"/>
+          </ac:spMkLst>
+        </pc:spChg>
+        <pc:picChg chg="mod ord">
+          <ac:chgData name="German Luis Dagatti" userId="43e7766c8bef1a99" providerId="LiveId" clId="{571E5FA9-B83F-472B-AE41-7DE03044985C}" dt="2025-04-21T02:28:11.641" v="257" actId="34807"/>
           <ac:picMkLst>
             <pc:docMk/>
-            <pc:sldMk cId="4082906994" sldId="269"/>
-            <ac:picMk id="3" creationId="{599485CC-34A0-3813-BA63-66AF0F637008}"/>
+            <pc:sldMk cId="405302534" sldId="2561"/>
+            <ac:picMk id="4" creationId="{F3CC4CBC-3EB4-45ED-9B77-C454E358C7A1}"/>
           </ac:picMkLst>
         </pc:picChg>
+        <pc:cxnChg chg="add del">
+          <ac:chgData name="German Luis Dagatti" userId="43e7766c8bef1a99" providerId="LiveId" clId="{571E5FA9-B83F-472B-AE41-7DE03044985C}" dt="2025-04-21T02:28:11.641" v="257" actId="34807"/>
+          <ac:cxnSpMkLst>
+            <pc:docMk/>
+            <pc:sldMk cId="405302534" sldId="2561"/>
+            <ac:cxnSpMk id="13" creationId="{7CC73A33-65FF-41A9-A3B0-006753CD1028}"/>
+          </ac:cxnSpMkLst>
+        </pc:cxnChg>
       </pc:sldChg>
+      <pc:sldChg chg="addSp delSp modSp add del mod setBg modClrScheme addAnim delAnim chgLayout">
+        <pc:chgData name="German Luis Dagatti" userId="43e7766c8bef1a99" providerId="LiveId" clId="{571E5FA9-B83F-472B-AE41-7DE03044985C}" dt="2025-04-21T02:37:57.584" v="276" actId="34807"/>
+        <pc:sldMkLst>
+          <pc:docMk/>
+          <pc:sldMk cId="3268867992" sldId="2561"/>
+        </pc:sldMkLst>
+        <pc:spChg chg="mod">
+          <ac:chgData name="German Luis Dagatti" userId="43e7766c8bef1a99" providerId="LiveId" clId="{571E5FA9-B83F-472B-AE41-7DE03044985C}" dt="2025-04-21T02:37:57.584" v="276" actId="34807"/>
+          <ac:spMkLst>
+            <pc:docMk/>
+            <pc:sldMk cId="3268867992" sldId="2561"/>
+            <ac:spMk id="2" creationId="{C86429F6-44D7-D837-BF11-E1A12FFDA57C}"/>
+          </ac:spMkLst>
+        </pc:spChg>
+        <pc:spChg chg="mod">
+          <ac:chgData name="German Luis Dagatti" userId="43e7766c8bef1a99" providerId="LiveId" clId="{571E5FA9-B83F-472B-AE41-7DE03044985C}" dt="2025-04-21T02:37:57.584" v="276" actId="34807"/>
+          <ac:spMkLst>
+            <pc:docMk/>
+            <pc:sldMk cId="3268867992" sldId="2561"/>
+            <ac:spMk id="3" creationId="{E74001F5-727C-5DFE-7B07-715ECAD31285}"/>
+          </ac:spMkLst>
+        </pc:spChg>
+        <pc:spChg chg="add del">
+          <ac:chgData name="German Luis Dagatti" userId="43e7766c8bef1a99" providerId="LiveId" clId="{571E5FA9-B83F-472B-AE41-7DE03044985C}" dt="2025-04-21T02:37:57.584" v="276" actId="34807"/>
+          <ac:spMkLst>
+            <pc:docMk/>
+            <pc:sldMk cId="3268867992" sldId="2561"/>
+            <ac:spMk id="9" creationId="{19F9BF86-FE94-4517-B97D-026C7515E589}"/>
+          </ac:spMkLst>
+        </pc:spChg>
+        <pc:picChg chg="mod">
+          <ac:chgData name="German Luis Dagatti" userId="43e7766c8bef1a99" providerId="LiveId" clId="{571E5FA9-B83F-472B-AE41-7DE03044985C}" dt="2025-04-21T02:37:57.584" v="276" actId="34807"/>
+          <ac:picMkLst>
+            <pc:docMk/>
+            <pc:sldMk cId="3268867992" sldId="2561"/>
+            <ac:picMk id="4" creationId="{C6E0709E-10BA-4ABD-AE84-9B15AE6BD39A}"/>
+          </ac:picMkLst>
+        </pc:picChg>
+        <pc:cxnChg chg="add del">
+          <ac:chgData name="German Luis Dagatti" userId="43e7766c8bef1a99" providerId="LiveId" clId="{571E5FA9-B83F-472B-AE41-7DE03044985C}" dt="2025-04-21T02:37:57.584" v="276" actId="34807"/>
+          <ac:cxnSpMkLst>
+            <pc:docMk/>
+            <pc:sldMk cId="3268867992" sldId="2561"/>
+            <ac:cxnSpMk id="11" creationId="{7CC73A33-65FF-41A9-A3B0-006753CD1028}"/>
+          </ac:cxnSpMkLst>
+        </pc:cxnChg>
+      </pc:sldChg>
+      <pc:sldChg chg="addSp delSp modSp add del mod modTransition setBg modClrScheme addAnim delAnim chgLayout">
+        <pc:chgData name="German Luis Dagatti" userId="43e7766c8bef1a99" providerId="LiveId" clId="{571E5FA9-B83F-472B-AE41-7DE03044985C}" dt="2025-04-21T02:28:11.641" v="257" actId="34807"/>
+        <pc:sldMkLst>
+          <pc:docMk/>
+          <pc:sldMk cId="1585519045" sldId="2562"/>
+        </pc:sldMkLst>
+        <pc:spChg chg="mod">
+          <ac:chgData name="German Luis Dagatti" userId="43e7766c8bef1a99" providerId="LiveId" clId="{571E5FA9-B83F-472B-AE41-7DE03044985C}" dt="2025-04-21T02:28:11.641" v="257" actId="34807"/>
+          <ac:spMkLst>
+            <pc:docMk/>
+            <pc:sldMk cId="1585519045" sldId="2562"/>
+            <ac:spMk id="2" creationId="{970AF41B-7F48-700B-3209-2965862B37D0}"/>
+          </ac:spMkLst>
+        </pc:spChg>
+        <pc:spChg chg="mod">
+          <ac:chgData name="German Luis Dagatti" userId="43e7766c8bef1a99" providerId="LiveId" clId="{571E5FA9-B83F-472B-AE41-7DE03044985C}" dt="2025-04-21T02:28:11.641" v="257" actId="34807"/>
+          <ac:spMkLst>
+            <pc:docMk/>
+            <pc:sldMk cId="1585519045" sldId="2562"/>
+            <ac:spMk id="4" creationId="{4D4C4A4E-EE95-BCD3-4109-B9BE38918F5A}"/>
+          </ac:spMkLst>
+        </pc:spChg>
+        <pc:spChg chg="add del">
+          <ac:chgData name="German Luis Dagatti" userId="43e7766c8bef1a99" providerId="LiveId" clId="{571E5FA9-B83F-472B-AE41-7DE03044985C}" dt="2025-04-21T02:28:11.641" v="257" actId="34807"/>
+          <ac:spMkLst>
+            <pc:docMk/>
+            <pc:sldMk cId="1585519045" sldId="2562"/>
+            <ac:spMk id="12" creationId="{744CAA32-F237-419C-A2DD-43C28D920D3C}"/>
+          </ac:spMkLst>
+        </pc:spChg>
+        <pc:picChg chg="mod">
+          <ac:chgData name="German Luis Dagatti" userId="43e7766c8bef1a99" providerId="LiveId" clId="{571E5FA9-B83F-472B-AE41-7DE03044985C}" dt="2025-04-21T02:28:11.641" v="257" actId="34807"/>
+          <ac:picMkLst>
+            <pc:docMk/>
+            <pc:sldMk cId="1585519045" sldId="2562"/>
+            <ac:picMk id="5" creationId="{3C8015E3-3F3A-4F1D-B52F-3E4FE4B33BD7}"/>
+          </ac:picMkLst>
+        </pc:picChg>
+        <pc:cxnChg chg="add del">
+          <ac:chgData name="German Luis Dagatti" userId="43e7766c8bef1a99" providerId="LiveId" clId="{571E5FA9-B83F-472B-AE41-7DE03044985C}" dt="2025-04-21T02:28:11.641" v="257" actId="34807"/>
+          <ac:cxnSpMkLst>
+            <pc:docMk/>
+            <pc:sldMk cId="1585519045" sldId="2562"/>
+            <ac:cxnSpMk id="10" creationId="{118E06E4-607B-144B-382B-AD3D06B1EE8C}"/>
+          </ac:cxnSpMkLst>
+        </pc:cxnChg>
+        <pc:cxnChg chg="add del">
+          <ac:chgData name="German Luis Dagatti" userId="43e7766c8bef1a99" providerId="LiveId" clId="{571E5FA9-B83F-472B-AE41-7DE03044985C}" dt="2025-04-21T02:28:11.641" v="257" actId="34807"/>
+          <ac:cxnSpMkLst>
+            <pc:docMk/>
+            <pc:sldMk cId="1585519045" sldId="2562"/>
+            <ac:cxnSpMk id="14" creationId="{08052531-D50B-3899-B150-D05525F4F2BC}"/>
+          </ac:cxnSpMkLst>
+        </pc:cxnChg>
+      </pc:sldChg>
+      <pc:sldChg chg="addSp delSp modSp add del mod modTransition setBg modClrScheme addAnim delAnim chgLayout">
+        <pc:chgData name="German Luis Dagatti" userId="43e7766c8bef1a99" providerId="LiveId" clId="{571E5FA9-B83F-472B-AE41-7DE03044985C}" dt="2025-04-21T02:37:57.584" v="276" actId="34807"/>
+        <pc:sldMkLst>
+          <pc:docMk/>
+          <pc:sldMk cId="3442457526" sldId="2562"/>
+        </pc:sldMkLst>
+        <pc:spChg chg="mod">
+          <ac:chgData name="German Luis Dagatti" userId="43e7766c8bef1a99" providerId="LiveId" clId="{571E5FA9-B83F-472B-AE41-7DE03044985C}" dt="2025-04-21T02:37:57.584" v="276" actId="34807"/>
+          <ac:spMkLst>
+            <pc:docMk/>
+            <pc:sldMk cId="3442457526" sldId="2562"/>
+            <ac:spMk id="2" creationId="{7D9F2FFE-0DEE-5A6B-2C86-1BFF01669818}"/>
+          </ac:spMkLst>
+        </pc:spChg>
+        <pc:spChg chg="mod">
+          <ac:chgData name="German Luis Dagatti" userId="43e7766c8bef1a99" providerId="LiveId" clId="{571E5FA9-B83F-472B-AE41-7DE03044985C}" dt="2025-04-21T02:37:57.584" v="276" actId="34807"/>
+          <ac:spMkLst>
+            <pc:docMk/>
+            <pc:sldMk cId="3442457526" sldId="2562"/>
+            <ac:spMk id="4" creationId="{BBFE98C4-3A20-7596-0AC3-3E7BF061A856}"/>
+          </ac:spMkLst>
+        </pc:spChg>
+        <pc:spChg chg="add del">
+          <ac:chgData name="German Luis Dagatti" userId="43e7766c8bef1a99" providerId="LiveId" clId="{571E5FA9-B83F-472B-AE41-7DE03044985C}" dt="2025-04-21T02:37:57.584" v="276" actId="34807"/>
+          <ac:spMkLst>
+            <pc:docMk/>
+            <pc:sldMk cId="3442457526" sldId="2562"/>
+            <ac:spMk id="12" creationId="{744CAA32-F237-419C-A2DD-43C28D920D3C}"/>
+          </ac:spMkLst>
+        </pc:spChg>
+        <pc:picChg chg="mod">
+          <ac:chgData name="German Luis Dagatti" userId="43e7766c8bef1a99" providerId="LiveId" clId="{571E5FA9-B83F-472B-AE41-7DE03044985C}" dt="2025-04-21T02:37:57.584" v="276" actId="34807"/>
+          <ac:picMkLst>
+            <pc:docMk/>
+            <pc:sldMk cId="3442457526" sldId="2562"/>
+            <ac:picMk id="5" creationId="{69FB08F6-137A-4CA4-87F8-0BD0D843151D}"/>
+          </ac:picMkLst>
+        </pc:picChg>
+        <pc:cxnChg chg="add del">
+          <ac:chgData name="German Luis Dagatti" userId="43e7766c8bef1a99" providerId="LiveId" clId="{571E5FA9-B83F-472B-AE41-7DE03044985C}" dt="2025-04-21T02:37:57.584" v="276" actId="34807"/>
+          <ac:cxnSpMkLst>
+            <pc:docMk/>
+            <pc:sldMk cId="3442457526" sldId="2562"/>
+            <ac:cxnSpMk id="10" creationId="{118E06E4-607B-144B-382B-AD3D06B1EE8C}"/>
+          </ac:cxnSpMkLst>
+        </pc:cxnChg>
+        <pc:cxnChg chg="add del">
+          <ac:chgData name="German Luis Dagatti" userId="43e7766c8bef1a99" providerId="LiveId" clId="{571E5FA9-B83F-472B-AE41-7DE03044985C}" dt="2025-04-21T02:37:57.584" v="276" actId="34807"/>
+          <ac:cxnSpMkLst>
+            <pc:docMk/>
+            <pc:sldMk cId="3442457526" sldId="2562"/>
+            <ac:cxnSpMk id="14" creationId="{08052531-D50B-3899-B150-D05525F4F2BC}"/>
+          </ac:cxnSpMkLst>
+        </pc:cxnChg>
+      </pc:sldChg>
+      <pc:sldChg chg="addSp delSp modSp add del mod modTransition setBg modClrScheme addAnim delAnim chgLayout">
+        <pc:chgData name="German Luis Dagatti" userId="43e7766c8bef1a99" providerId="LiveId" clId="{571E5FA9-B83F-472B-AE41-7DE03044985C}" dt="2025-04-21T02:37:57.584" v="276" actId="34807"/>
+        <pc:sldMkLst>
+          <pc:docMk/>
+          <pc:sldMk cId="2511759668" sldId="2563"/>
+        </pc:sldMkLst>
+        <pc:spChg chg="mod">
+          <ac:chgData name="German Luis Dagatti" userId="43e7766c8bef1a99" providerId="LiveId" clId="{571E5FA9-B83F-472B-AE41-7DE03044985C}" dt="2025-04-21T02:37:57.584" v="276" actId="34807"/>
+          <ac:spMkLst>
+            <pc:docMk/>
+            <pc:sldMk cId="2511759668" sldId="2563"/>
+            <ac:spMk id="2" creationId="{056C3087-0768-EDCD-6A1B-3A2EC2FB0E51}"/>
+          </ac:spMkLst>
+        </pc:spChg>
+        <pc:spChg chg="add del">
+          <ac:chgData name="German Luis Dagatti" userId="43e7766c8bef1a99" providerId="LiveId" clId="{571E5FA9-B83F-472B-AE41-7DE03044985C}" dt="2025-04-21T02:37:57.584" v="276" actId="34807"/>
+          <ac:spMkLst>
+            <pc:docMk/>
+            <pc:sldMk cId="2511759668" sldId="2563"/>
+            <ac:spMk id="7" creationId="{46B9231A-B34B-4A29-A6AC-532E1EE81575}"/>
+          </ac:spMkLst>
+        </pc:spChg>
+        <pc:spChg chg="add del">
+          <ac:chgData name="German Luis Dagatti" userId="43e7766c8bef1a99" providerId="LiveId" clId="{571E5FA9-B83F-472B-AE41-7DE03044985C}" dt="2025-04-21T02:37:57.584" v="276" actId="34807"/>
+          <ac:spMkLst>
+            <pc:docMk/>
+            <pc:sldMk cId="2511759668" sldId="2563"/>
+            <ac:spMk id="9" creationId="{19F9BF86-FE94-4517-B97D-026C7515E589}"/>
+          </ac:spMkLst>
+        </pc:spChg>
+        <pc:cxnChg chg="add del">
+          <ac:chgData name="German Luis Dagatti" userId="43e7766c8bef1a99" providerId="LiveId" clId="{571E5FA9-B83F-472B-AE41-7DE03044985C}" dt="2025-04-21T02:37:57.584" v="276" actId="34807"/>
+          <ac:cxnSpMkLst>
+            <pc:docMk/>
+            <pc:sldMk cId="2511759668" sldId="2563"/>
+            <ac:cxnSpMk id="11" creationId="{53C0BBAA-A5EC-5D5D-32E6-9F7EA6048489}"/>
+          </ac:cxnSpMkLst>
+        </pc:cxnChg>
+      </pc:sldChg>
+      <pc:sldChg chg="addSp delSp modSp add del mod modTransition setBg modClrScheme addAnim delAnim chgLayout">
+        <pc:chgData name="German Luis Dagatti" userId="43e7766c8bef1a99" providerId="LiveId" clId="{571E5FA9-B83F-472B-AE41-7DE03044985C}" dt="2025-04-21T02:28:11.641" v="257" actId="34807"/>
+        <pc:sldMkLst>
+          <pc:docMk/>
+          <pc:sldMk cId="2829927854" sldId="2563"/>
+        </pc:sldMkLst>
+        <pc:spChg chg="mod">
+          <ac:chgData name="German Luis Dagatti" userId="43e7766c8bef1a99" providerId="LiveId" clId="{571E5FA9-B83F-472B-AE41-7DE03044985C}" dt="2025-04-21T02:28:11.641" v="257" actId="34807"/>
+          <ac:spMkLst>
+            <pc:docMk/>
+            <pc:sldMk cId="2829927854" sldId="2563"/>
+            <ac:spMk id="2" creationId="{6A196170-B972-21DD-E249-6ED5933B06D8}"/>
+          </ac:spMkLst>
+        </pc:spChg>
+        <pc:spChg chg="add del">
+          <ac:chgData name="German Luis Dagatti" userId="43e7766c8bef1a99" providerId="LiveId" clId="{571E5FA9-B83F-472B-AE41-7DE03044985C}" dt="2025-04-21T02:28:11.641" v="257" actId="34807"/>
+          <ac:spMkLst>
+            <pc:docMk/>
+            <pc:sldMk cId="2829927854" sldId="2563"/>
+            <ac:spMk id="7" creationId="{46B9231A-B34B-4A29-A6AC-532E1EE81575}"/>
+          </ac:spMkLst>
+        </pc:spChg>
+        <pc:spChg chg="add del">
+          <ac:chgData name="German Luis Dagatti" userId="43e7766c8bef1a99" providerId="LiveId" clId="{571E5FA9-B83F-472B-AE41-7DE03044985C}" dt="2025-04-21T02:28:11.641" v="257" actId="34807"/>
+          <ac:spMkLst>
+            <pc:docMk/>
+            <pc:sldMk cId="2829927854" sldId="2563"/>
+            <ac:spMk id="9" creationId="{19F9BF86-FE94-4517-B97D-026C7515E589}"/>
+          </ac:spMkLst>
+        </pc:spChg>
+        <pc:cxnChg chg="add del">
+          <ac:chgData name="German Luis Dagatti" userId="43e7766c8bef1a99" providerId="LiveId" clId="{571E5FA9-B83F-472B-AE41-7DE03044985C}" dt="2025-04-21T02:28:11.641" v="257" actId="34807"/>
+          <ac:cxnSpMkLst>
+            <pc:docMk/>
+            <pc:sldMk cId="2829927854" sldId="2563"/>
+            <ac:cxnSpMk id="11" creationId="{53C0BBAA-A5EC-5D5D-32E6-9F7EA6048489}"/>
+          </ac:cxnSpMkLst>
+        </pc:cxnChg>
+      </pc:sldChg>
+      <pc:sldChg chg="addSp delSp modSp add del mod modTransition setBg modClrScheme addAnim delAnim chgLayout">
+        <pc:chgData name="German Luis Dagatti" userId="43e7766c8bef1a99" providerId="LiveId" clId="{571E5FA9-B83F-472B-AE41-7DE03044985C}" dt="2025-04-21T02:37:57.584" v="276" actId="34807"/>
+        <pc:sldMkLst>
+          <pc:docMk/>
+          <pc:sldMk cId="1372967442" sldId="2564"/>
+        </pc:sldMkLst>
+        <pc:spChg chg="mod">
+          <ac:chgData name="German Luis Dagatti" userId="43e7766c8bef1a99" providerId="LiveId" clId="{571E5FA9-B83F-472B-AE41-7DE03044985C}" dt="2025-04-21T02:37:57.584" v="276" actId="34807"/>
+          <ac:spMkLst>
+            <pc:docMk/>
+            <pc:sldMk cId="1372967442" sldId="2564"/>
+            <ac:spMk id="2" creationId="{7A857F75-C0C6-4D25-7441-6C3DE5D9E9B5}"/>
+          </ac:spMkLst>
+        </pc:spChg>
+        <pc:spChg chg="mod">
+          <ac:chgData name="German Luis Dagatti" userId="43e7766c8bef1a99" providerId="LiveId" clId="{571E5FA9-B83F-472B-AE41-7DE03044985C}" dt="2025-04-21T02:37:57.584" v="276" actId="34807"/>
+          <ac:spMkLst>
+            <pc:docMk/>
+            <pc:sldMk cId="1372967442" sldId="2564"/>
+            <ac:spMk id="4" creationId="{81ADEF59-F0E0-9557-BC68-5A20D681ECE4}"/>
+          </ac:spMkLst>
+        </pc:spChg>
+        <pc:spChg chg="add del">
+          <ac:chgData name="German Luis Dagatti" userId="43e7766c8bef1a99" providerId="LiveId" clId="{571E5FA9-B83F-472B-AE41-7DE03044985C}" dt="2025-04-21T02:37:57.584" v="276" actId="34807"/>
+          <ac:spMkLst>
+            <pc:docMk/>
+            <pc:sldMk cId="1372967442" sldId="2564"/>
+            <ac:spMk id="12" creationId="{744CAA32-F237-419C-A2DD-43C28D920D3C}"/>
+          </ac:spMkLst>
+        </pc:spChg>
+        <pc:picChg chg="mod ord">
+          <ac:chgData name="German Luis Dagatti" userId="43e7766c8bef1a99" providerId="LiveId" clId="{571E5FA9-B83F-472B-AE41-7DE03044985C}" dt="2025-04-21T02:37:57.584" v="276" actId="34807"/>
+          <ac:picMkLst>
+            <pc:docMk/>
+            <pc:sldMk cId="1372967442" sldId="2564"/>
+            <ac:picMk id="5" creationId="{5B1BF9D2-1792-42E1-A9B9-A98AFF6C294F}"/>
+          </ac:picMkLst>
+        </pc:picChg>
+        <pc:cxnChg chg="add del">
+          <ac:chgData name="German Luis Dagatti" userId="43e7766c8bef1a99" providerId="LiveId" clId="{571E5FA9-B83F-472B-AE41-7DE03044985C}" dt="2025-04-21T02:37:57.584" v="276" actId="34807"/>
+          <ac:cxnSpMkLst>
+            <pc:docMk/>
+            <pc:sldMk cId="1372967442" sldId="2564"/>
+            <ac:cxnSpMk id="10" creationId="{118E06E4-607B-144B-382B-AD3D06B1EE8C}"/>
+          </ac:cxnSpMkLst>
+        </pc:cxnChg>
+        <pc:cxnChg chg="add del">
+          <ac:chgData name="German Luis Dagatti" userId="43e7766c8bef1a99" providerId="LiveId" clId="{571E5FA9-B83F-472B-AE41-7DE03044985C}" dt="2025-04-21T02:37:57.584" v="276" actId="34807"/>
+          <ac:cxnSpMkLst>
+            <pc:docMk/>
+            <pc:sldMk cId="1372967442" sldId="2564"/>
+            <ac:cxnSpMk id="14" creationId="{92025DBA-8780-9CA0-2826-FF6E3BD1A0C9}"/>
+          </ac:cxnSpMkLst>
+        </pc:cxnChg>
+      </pc:sldChg>
+      <pc:sldChg chg="addSp delSp modSp add del mod modTransition setBg modClrScheme addAnim delAnim chgLayout">
+        <pc:chgData name="German Luis Dagatti" userId="43e7766c8bef1a99" providerId="LiveId" clId="{571E5FA9-B83F-472B-AE41-7DE03044985C}" dt="2025-04-21T02:28:11.641" v="257" actId="34807"/>
+        <pc:sldMkLst>
+          <pc:docMk/>
+          <pc:sldMk cId="2493165252" sldId="2564"/>
+        </pc:sldMkLst>
+        <pc:spChg chg="mod">
+          <ac:chgData name="German Luis Dagatti" userId="43e7766c8bef1a99" providerId="LiveId" clId="{571E5FA9-B83F-472B-AE41-7DE03044985C}" dt="2025-04-21T02:28:11.641" v="257" actId="34807"/>
+          <ac:spMkLst>
+            <pc:docMk/>
+            <pc:sldMk cId="2493165252" sldId="2564"/>
+            <ac:spMk id="2" creationId="{13A46BC2-A9C2-DB5A-29FE-73EC94C13E6D}"/>
+          </ac:spMkLst>
+        </pc:spChg>
+        <pc:spChg chg="mod">
+          <ac:chgData name="German Luis Dagatti" userId="43e7766c8bef1a99" providerId="LiveId" clId="{571E5FA9-B83F-472B-AE41-7DE03044985C}" dt="2025-04-21T02:28:11.641" v="257" actId="34807"/>
+          <ac:spMkLst>
+            <pc:docMk/>
+            <pc:sldMk cId="2493165252" sldId="2564"/>
+            <ac:spMk id="4" creationId="{6A9634DC-1DCA-A30B-454F-07DDF0ED9C35}"/>
+          </ac:spMkLst>
+        </pc:spChg>
+        <pc:spChg chg="add del">
+          <ac:chgData name="German Luis Dagatti" userId="43e7766c8bef1a99" providerId="LiveId" clId="{571E5FA9-B83F-472B-AE41-7DE03044985C}" dt="2025-04-21T02:28:11.641" v="257" actId="34807"/>
+          <ac:spMkLst>
+            <pc:docMk/>
+            <pc:sldMk cId="2493165252" sldId="2564"/>
+            <ac:spMk id="12" creationId="{744CAA32-F237-419C-A2DD-43C28D920D3C}"/>
+          </ac:spMkLst>
+        </pc:spChg>
+        <pc:picChg chg="mod">
+          <ac:chgData name="German Luis Dagatti" userId="43e7766c8bef1a99" providerId="LiveId" clId="{571E5FA9-B83F-472B-AE41-7DE03044985C}" dt="2025-04-21T02:28:11.641" v="257" actId="34807"/>
+          <ac:picMkLst>
+            <pc:docMk/>
+            <pc:sldMk cId="2493165252" sldId="2564"/>
+            <ac:picMk id="5" creationId="{C7DB1E33-3E2A-46CC-B7E6-3795844C2277}"/>
+          </ac:picMkLst>
+        </pc:picChg>
+        <pc:cxnChg chg="add del">
+          <ac:chgData name="German Luis Dagatti" userId="43e7766c8bef1a99" providerId="LiveId" clId="{571E5FA9-B83F-472B-AE41-7DE03044985C}" dt="2025-04-21T02:28:11.641" v="257" actId="34807"/>
+          <ac:cxnSpMkLst>
+            <pc:docMk/>
+            <pc:sldMk cId="2493165252" sldId="2564"/>
+            <ac:cxnSpMk id="10" creationId="{118E06E4-607B-144B-382B-AD3D06B1EE8C}"/>
+          </ac:cxnSpMkLst>
+        </pc:cxnChg>
+        <pc:cxnChg chg="add del">
+          <ac:chgData name="German Luis Dagatti" userId="43e7766c8bef1a99" providerId="LiveId" clId="{571E5FA9-B83F-472B-AE41-7DE03044985C}" dt="2025-04-21T02:28:11.641" v="257" actId="34807"/>
+          <ac:cxnSpMkLst>
+            <pc:docMk/>
+            <pc:sldMk cId="2493165252" sldId="2564"/>
+            <ac:cxnSpMk id="14" creationId="{08052531-D50B-3899-B150-D05525F4F2BC}"/>
+          </ac:cxnSpMkLst>
+        </pc:cxnChg>
+      </pc:sldChg>
+      <pc:sldChg chg="addSp delSp modSp add del mod modTransition setBg modClrScheme addAnim delAnim chgLayout">
+        <pc:chgData name="German Luis Dagatti" userId="43e7766c8bef1a99" providerId="LiveId" clId="{571E5FA9-B83F-472B-AE41-7DE03044985C}" dt="2025-04-21T02:37:57.584" v="276" actId="34807"/>
+        <pc:sldMkLst>
+          <pc:docMk/>
+          <pc:sldMk cId="27372939" sldId="2565"/>
+        </pc:sldMkLst>
+        <pc:spChg chg="mod">
+          <ac:chgData name="German Luis Dagatti" userId="43e7766c8bef1a99" providerId="LiveId" clId="{571E5FA9-B83F-472B-AE41-7DE03044985C}" dt="2025-04-21T02:37:57.584" v="276" actId="34807"/>
+          <ac:spMkLst>
+            <pc:docMk/>
+            <pc:sldMk cId="27372939" sldId="2565"/>
+            <ac:spMk id="2" creationId="{AA2342F9-C6F5-68F4-5DB8-A21B57A22941}"/>
+          </ac:spMkLst>
+        </pc:spChg>
+        <pc:spChg chg="mod">
+          <ac:chgData name="German Luis Dagatti" userId="43e7766c8bef1a99" providerId="LiveId" clId="{571E5FA9-B83F-472B-AE41-7DE03044985C}" dt="2025-04-21T02:37:57.584" v="276" actId="34807"/>
+          <ac:spMkLst>
+            <pc:docMk/>
+            <pc:sldMk cId="27372939" sldId="2565"/>
+            <ac:spMk id="4" creationId="{0A5C2AA0-1F12-02FA-C5D7-8CAC43E23314}"/>
+          </ac:spMkLst>
+        </pc:spChg>
+        <pc:spChg chg="add del">
+          <ac:chgData name="German Luis Dagatti" userId="43e7766c8bef1a99" providerId="LiveId" clId="{571E5FA9-B83F-472B-AE41-7DE03044985C}" dt="2025-04-21T02:37:57.584" v="276" actId="34807"/>
+          <ac:spMkLst>
+            <pc:docMk/>
+            <pc:sldMk cId="27372939" sldId="2565"/>
+            <ac:spMk id="12" creationId="{744CAA32-F237-419C-A2DD-43C28D920D3C}"/>
+          </ac:spMkLst>
+        </pc:spChg>
+        <pc:picChg chg="mod">
+          <ac:chgData name="German Luis Dagatti" userId="43e7766c8bef1a99" providerId="LiveId" clId="{571E5FA9-B83F-472B-AE41-7DE03044985C}" dt="2025-04-21T02:37:57.584" v="276" actId="34807"/>
+          <ac:picMkLst>
+            <pc:docMk/>
+            <pc:sldMk cId="27372939" sldId="2565"/>
+            <ac:picMk id="5" creationId="{BE5554F5-3FA5-4453-BEA2-FD04533B2973}"/>
+          </ac:picMkLst>
+        </pc:picChg>
+        <pc:cxnChg chg="add del">
+          <ac:chgData name="German Luis Dagatti" userId="43e7766c8bef1a99" providerId="LiveId" clId="{571E5FA9-B83F-472B-AE41-7DE03044985C}" dt="2025-04-21T02:37:57.584" v="276" actId="34807"/>
+          <ac:cxnSpMkLst>
+            <pc:docMk/>
+            <pc:sldMk cId="27372939" sldId="2565"/>
+            <ac:cxnSpMk id="10" creationId="{118E06E4-607B-144B-382B-AD3D06B1EE8C}"/>
+          </ac:cxnSpMkLst>
+        </pc:cxnChg>
+        <pc:cxnChg chg="add del">
+          <ac:chgData name="German Luis Dagatti" userId="43e7766c8bef1a99" providerId="LiveId" clId="{571E5FA9-B83F-472B-AE41-7DE03044985C}" dt="2025-04-21T02:37:57.584" v="276" actId="34807"/>
+          <ac:cxnSpMkLst>
+            <pc:docMk/>
+            <pc:sldMk cId="27372939" sldId="2565"/>
+            <ac:cxnSpMk id="14" creationId="{08052531-D50B-3899-B150-D05525F4F2BC}"/>
+          </ac:cxnSpMkLst>
+        </pc:cxnChg>
+      </pc:sldChg>
+      <pc:sldChg chg="addSp delSp modSp add del mod modTransition setBg modClrScheme addAnim delAnim chgLayout">
+        <pc:chgData name="German Luis Dagatti" userId="43e7766c8bef1a99" providerId="LiveId" clId="{571E5FA9-B83F-472B-AE41-7DE03044985C}" dt="2025-04-21T02:28:11.641" v="257" actId="34807"/>
+        <pc:sldMkLst>
+          <pc:docMk/>
+          <pc:sldMk cId="3949372333" sldId="2565"/>
+        </pc:sldMkLst>
+        <pc:spChg chg="mod">
+          <ac:chgData name="German Luis Dagatti" userId="43e7766c8bef1a99" providerId="LiveId" clId="{571E5FA9-B83F-472B-AE41-7DE03044985C}" dt="2025-04-21T02:28:11.641" v="257" actId="34807"/>
+          <ac:spMkLst>
+            <pc:docMk/>
+            <pc:sldMk cId="3949372333" sldId="2565"/>
+            <ac:spMk id="2" creationId="{459CA52A-1341-2F6E-48BE-39AEF9A015C5}"/>
+          </ac:spMkLst>
+        </pc:spChg>
+        <pc:spChg chg="mod">
+          <ac:chgData name="German Luis Dagatti" userId="43e7766c8bef1a99" providerId="LiveId" clId="{571E5FA9-B83F-472B-AE41-7DE03044985C}" dt="2025-04-21T02:28:11.641" v="257" actId="34807"/>
+          <ac:spMkLst>
+            <pc:docMk/>
+            <pc:sldMk cId="3949372333" sldId="2565"/>
+            <ac:spMk id="4" creationId="{8F97BFF4-4544-270B-035F-DA0B55D193AD}"/>
+          </ac:spMkLst>
+        </pc:spChg>
+        <pc:spChg chg="add del">
+          <ac:chgData name="German Luis Dagatti" userId="43e7766c8bef1a99" providerId="LiveId" clId="{571E5FA9-B83F-472B-AE41-7DE03044985C}" dt="2025-04-21T02:28:11.641" v="257" actId="34807"/>
+          <ac:spMkLst>
+            <pc:docMk/>
+            <pc:sldMk cId="3949372333" sldId="2565"/>
+            <ac:spMk id="12" creationId="{744CAA32-F237-419C-A2DD-43C28D920D3C}"/>
+          </ac:spMkLst>
+        </pc:spChg>
+        <pc:picChg chg="mod">
+          <ac:chgData name="German Luis Dagatti" userId="43e7766c8bef1a99" providerId="LiveId" clId="{571E5FA9-B83F-472B-AE41-7DE03044985C}" dt="2025-04-21T02:28:11.641" v="257" actId="34807"/>
+          <ac:picMkLst>
+            <pc:docMk/>
+            <pc:sldMk cId="3949372333" sldId="2565"/>
+            <ac:picMk id="5" creationId="{7FDC0D9B-F8C3-4A3F-A454-AF8FDB45AB4F}"/>
+          </ac:picMkLst>
+        </pc:picChg>
+        <pc:cxnChg chg="add del">
+          <ac:chgData name="German Luis Dagatti" userId="43e7766c8bef1a99" providerId="LiveId" clId="{571E5FA9-B83F-472B-AE41-7DE03044985C}" dt="2025-04-21T02:28:11.641" v="257" actId="34807"/>
+          <ac:cxnSpMkLst>
+            <pc:docMk/>
+            <pc:sldMk cId="3949372333" sldId="2565"/>
+            <ac:cxnSpMk id="10" creationId="{118E06E4-607B-144B-382B-AD3D06B1EE8C}"/>
+          </ac:cxnSpMkLst>
+        </pc:cxnChg>
+        <pc:cxnChg chg="add del">
+          <ac:chgData name="German Luis Dagatti" userId="43e7766c8bef1a99" providerId="LiveId" clId="{571E5FA9-B83F-472B-AE41-7DE03044985C}" dt="2025-04-21T02:28:11.641" v="257" actId="34807"/>
+          <ac:cxnSpMkLst>
+            <pc:docMk/>
+            <pc:sldMk cId="3949372333" sldId="2565"/>
+            <ac:cxnSpMk id="14" creationId="{08052531-D50B-3899-B150-D05525F4F2BC}"/>
+          </ac:cxnSpMkLst>
+        </pc:cxnChg>
+      </pc:sldChg>
+      <pc:sldChg chg="addSp delSp modSp add del mod modTransition setBg modClrScheme addAnim delAnim chgLayout">
+        <pc:chgData name="German Luis Dagatti" userId="43e7766c8bef1a99" providerId="LiveId" clId="{571E5FA9-B83F-472B-AE41-7DE03044985C}" dt="2025-04-21T02:37:57.584" v="276" actId="34807"/>
+        <pc:sldMkLst>
+          <pc:docMk/>
+          <pc:sldMk cId="181785269" sldId="2566"/>
+        </pc:sldMkLst>
+        <pc:spChg chg="mod">
+          <ac:chgData name="German Luis Dagatti" userId="43e7766c8bef1a99" providerId="LiveId" clId="{571E5FA9-B83F-472B-AE41-7DE03044985C}" dt="2025-04-21T02:37:57.584" v="276" actId="34807"/>
+          <ac:spMkLst>
+            <pc:docMk/>
+            <pc:sldMk cId="181785269" sldId="2566"/>
+            <ac:spMk id="2" creationId="{BAA356F4-1392-66A2-71FB-2719AA68114A}"/>
+          </ac:spMkLst>
+        </pc:spChg>
+        <pc:spChg chg="add del">
+          <ac:chgData name="German Luis Dagatti" userId="43e7766c8bef1a99" providerId="LiveId" clId="{571E5FA9-B83F-472B-AE41-7DE03044985C}" dt="2025-04-21T02:37:57.584" v="276" actId="34807"/>
+          <ac:spMkLst>
+            <pc:docMk/>
+            <pc:sldMk cId="181785269" sldId="2566"/>
+            <ac:spMk id="7" creationId="{46B9231A-B34B-4A29-A6AC-532E1EE81575}"/>
+          </ac:spMkLst>
+        </pc:spChg>
+        <pc:spChg chg="add del">
+          <ac:chgData name="German Luis Dagatti" userId="43e7766c8bef1a99" providerId="LiveId" clId="{571E5FA9-B83F-472B-AE41-7DE03044985C}" dt="2025-04-21T02:37:57.584" v="276" actId="34807"/>
+          <ac:spMkLst>
+            <pc:docMk/>
+            <pc:sldMk cId="181785269" sldId="2566"/>
+            <ac:spMk id="9" creationId="{19F9BF86-FE94-4517-B97D-026C7515E589}"/>
+          </ac:spMkLst>
+        </pc:spChg>
+        <pc:cxnChg chg="add del">
+          <ac:chgData name="German Luis Dagatti" userId="43e7766c8bef1a99" providerId="LiveId" clId="{571E5FA9-B83F-472B-AE41-7DE03044985C}" dt="2025-04-21T02:37:57.584" v="276" actId="34807"/>
+          <ac:cxnSpMkLst>
+            <pc:docMk/>
+            <pc:sldMk cId="181785269" sldId="2566"/>
+            <ac:cxnSpMk id="11" creationId="{53C0BBAA-A5EC-5D5D-32E6-9F7EA6048489}"/>
+          </ac:cxnSpMkLst>
+        </pc:cxnChg>
+      </pc:sldChg>
+      <pc:sldChg chg="addSp delSp modSp add del mod modTransition setBg modClrScheme addAnim delAnim chgLayout">
+        <pc:chgData name="German Luis Dagatti" userId="43e7766c8bef1a99" providerId="LiveId" clId="{571E5FA9-B83F-472B-AE41-7DE03044985C}" dt="2025-04-21T02:28:11.641" v="257" actId="34807"/>
+        <pc:sldMkLst>
+          <pc:docMk/>
+          <pc:sldMk cId="1201361520" sldId="2566"/>
+        </pc:sldMkLst>
+        <pc:spChg chg="mod">
+          <ac:chgData name="German Luis Dagatti" userId="43e7766c8bef1a99" providerId="LiveId" clId="{571E5FA9-B83F-472B-AE41-7DE03044985C}" dt="2025-04-21T02:28:11.641" v="257" actId="34807"/>
+          <ac:spMkLst>
+            <pc:docMk/>
+            <pc:sldMk cId="1201361520" sldId="2566"/>
+            <ac:spMk id="2" creationId="{B99C195F-6B38-8398-B5A6-54CC30A35C51}"/>
+          </ac:spMkLst>
+        </pc:spChg>
+        <pc:spChg chg="mod">
+          <ac:chgData name="German Luis Dagatti" userId="43e7766c8bef1a99" providerId="LiveId" clId="{571E5FA9-B83F-472B-AE41-7DE03044985C}" dt="2025-04-21T02:28:11.641" v="257" actId="34807"/>
+          <ac:spMkLst>
+            <pc:docMk/>
+            <pc:sldMk cId="1201361520" sldId="2566"/>
+            <ac:spMk id="4" creationId="{474157FE-64D6-2FFA-7731-8B1D187F7152}"/>
+          </ac:spMkLst>
+        </pc:spChg>
+        <pc:spChg chg="add del">
+          <ac:chgData name="German Luis Dagatti" userId="43e7766c8bef1a99" providerId="LiveId" clId="{571E5FA9-B83F-472B-AE41-7DE03044985C}" dt="2025-04-21T02:28:11.641" v="257" actId="34807"/>
+          <ac:spMkLst>
+            <pc:docMk/>
+            <pc:sldMk cId="1201361520" sldId="2566"/>
+            <ac:spMk id="12" creationId="{744CAA32-F237-419C-A2DD-43C28D920D3C}"/>
+          </ac:spMkLst>
+        </pc:spChg>
+        <pc:picChg chg="mod">
+          <ac:chgData name="German Luis Dagatti" userId="43e7766c8bef1a99" providerId="LiveId" clId="{571E5FA9-B83F-472B-AE41-7DE03044985C}" dt="2025-04-21T02:28:11.641" v="257" actId="34807"/>
+          <ac:picMkLst>
+            <pc:docMk/>
+            <pc:sldMk cId="1201361520" sldId="2566"/>
+            <ac:picMk id="5" creationId="{FA9DA05B-2A66-4DD3-A42E-4446EC0E7EB0}"/>
+          </ac:picMkLst>
+        </pc:picChg>
+        <pc:cxnChg chg="add del">
+          <ac:chgData name="German Luis Dagatti" userId="43e7766c8bef1a99" providerId="LiveId" clId="{571E5FA9-B83F-472B-AE41-7DE03044985C}" dt="2025-04-21T02:28:11.641" v="257" actId="34807"/>
+          <ac:cxnSpMkLst>
+            <pc:docMk/>
+            <pc:sldMk cId="1201361520" sldId="2566"/>
+            <ac:cxnSpMk id="10" creationId="{118E06E4-607B-144B-382B-AD3D06B1EE8C}"/>
+          </ac:cxnSpMkLst>
+        </pc:cxnChg>
+        <pc:cxnChg chg="add del">
+          <ac:chgData name="German Luis Dagatti" userId="43e7766c8bef1a99" providerId="LiveId" clId="{571E5FA9-B83F-472B-AE41-7DE03044985C}" dt="2025-04-21T02:28:11.641" v="257" actId="34807"/>
+          <ac:cxnSpMkLst>
+            <pc:docMk/>
+            <pc:sldMk cId="1201361520" sldId="2566"/>
+            <ac:cxnSpMk id="14" creationId="{08052531-D50B-3899-B150-D05525F4F2BC}"/>
+          </ac:cxnSpMkLst>
+        </pc:cxnChg>
+      </pc:sldChg>
+      <pc:sldChg chg="addSp delSp modSp add del mod modTransition setBg modClrScheme addAnim delAnim chgLayout">
+        <pc:chgData name="German Luis Dagatti" userId="43e7766c8bef1a99" providerId="LiveId" clId="{571E5FA9-B83F-472B-AE41-7DE03044985C}" dt="2025-04-21T02:37:57.584" v="276" actId="34807"/>
+        <pc:sldMkLst>
+          <pc:docMk/>
+          <pc:sldMk cId="1711182044" sldId="2567"/>
+        </pc:sldMkLst>
+        <pc:spChg chg="mod">
+          <ac:chgData name="German Luis Dagatti" userId="43e7766c8bef1a99" providerId="LiveId" clId="{571E5FA9-B83F-472B-AE41-7DE03044985C}" dt="2025-04-21T02:37:57.584" v="276" actId="34807"/>
+          <ac:spMkLst>
+            <pc:docMk/>
+            <pc:sldMk cId="1711182044" sldId="2567"/>
+            <ac:spMk id="2" creationId="{903A63A7-63F5-E0D1-A61E-C9BA02A760CE}"/>
+          </ac:spMkLst>
+        </pc:spChg>
+        <pc:spChg chg="mod">
+          <ac:chgData name="German Luis Dagatti" userId="43e7766c8bef1a99" providerId="LiveId" clId="{571E5FA9-B83F-472B-AE41-7DE03044985C}" dt="2025-04-21T02:37:57.584" v="276" actId="34807"/>
+          <ac:spMkLst>
+            <pc:docMk/>
+            <pc:sldMk cId="1711182044" sldId="2567"/>
+            <ac:spMk id="4" creationId="{78CFF63D-DF34-097C-E176-044F0373510E}"/>
+          </ac:spMkLst>
+        </pc:spChg>
+        <pc:spChg chg="add del">
+          <ac:chgData name="German Luis Dagatti" userId="43e7766c8bef1a99" providerId="LiveId" clId="{571E5FA9-B83F-472B-AE41-7DE03044985C}" dt="2025-04-21T02:37:57.584" v="276" actId="34807"/>
+          <ac:spMkLst>
+            <pc:docMk/>
+            <pc:sldMk cId="1711182044" sldId="2567"/>
+            <ac:spMk id="12" creationId="{744CAA32-F237-419C-A2DD-43C28D920D3C}"/>
+          </ac:spMkLst>
+        </pc:spChg>
+        <pc:picChg chg="mod">
+          <ac:chgData name="German Luis Dagatti" userId="43e7766c8bef1a99" providerId="LiveId" clId="{571E5FA9-B83F-472B-AE41-7DE03044985C}" dt="2025-04-21T02:37:57.584" v="276" actId="34807"/>
+          <ac:picMkLst>
+            <pc:docMk/>
+            <pc:sldMk cId="1711182044" sldId="2567"/>
+            <ac:picMk id="5" creationId="{878EEBC6-4D89-4711-9A29-F8911EDA35E7}"/>
+          </ac:picMkLst>
+        </pc:picChg>
+        <pc:cxnChg chg="add del">
+          <ac:chgData name="German Luis Dagatti" userId="43e7766c8bef1a99" providerId="LiveId" clId="{571E5FA9-B83F-472B-AE41-7DE03044985C}" dt="2025-04-21T02:37:57.584" v="276" actId="34807"/>
+          <ac:cxnSpMkLst>
+            <pc:docMk/>
+            <pc:sldMk cId="1711182044" sldId="2567"/>
+            <ac:cxnSpMk id="10" creationId="{118E06E4-607B-144B-382B-AD3D06B1EE8C}"/>
+          </ac:cxnSpMkLst>
+        </pc:cxnChg>
+        <pc:cxnChg chg="add del">
+          <ac:chgData name="German Luis Dagatti" userId="43e7766c8bef1a99" providerId="LiveId" clId="{571E5FA9-B83F-472B-AE41-7DE03044985C}" dt="2025-04-21T02:37:57.584" v="276" actId="34807"/>
+          <ac:cxnSpMkLst>
+            <pc:docMk/>
+            <pc:sldMk cId="1711182044" sldId="2567"/>
+            <ac:cxnSpMk id="14" creationId="{08052531-D50B-3899-B150-D05525F4F2BC}"/>
+          </ac:cxnSpMkLst>
+        </pc:cxnChg>
+      </pc:sldChg>
+      <pc:sldChg chg="addSp delSp modSp add del mod modTransition setBg modClrScheme addAnim delAnim chgLayout">
+        <pc:chgData name="German Luis Dagatti" userId="43e7766c8bef1a99" providerId="LiveId" clId="{571E5FA9-B83F-472B-AE41-7DE03044985C}" dt="2025-04-21T02:28:11.641" v="257" actId="34807"/>
+        <pc:sldMkLst>
+          <pc:docMk/>
+          <pc:sldMk cId="1792972683" sldId="2567"/>
+        </pc:sldMkLst>
+        <pc:spChg chg="mod">
+          <ac:chgData name="German Luis Dagatti" userId="43e7766c8bef1a99" providerId="LiveId" clId="{571E5FA9-B83F-472B-AE41-7DE03044985C}" dt="2025-04-21T02:28:11.641" v="257" actId="34807"/>
+          <ac:spMkLst>
+            <pc:docMk/>
+            <pc:sldMk cId="1792972683" sldId="2567"/>
+            <ac:spMk id="2" creationId="{8899B59F-24B0-4656-6361-3D4CB66D231A}"/>
+          </ac:spMkLst>
+        </pc:spChg>
+        <pc:spChg chg="add del">
+          <ac:chgData name="German Luis Dagatti" userId="43e7766c8bef1a99" providerId="LiveId" clId="{571E5FA9-B83F-472B-AE41-7DE03044985C}" dt="2025-04-21T02:28:11.641" v="257" actId="34807"/>
+          <ac:spMkLst>
+            <pc:docMk/>
+            <pc:sldMk cId="1792972683" sldId="2567"/>
+            <ac:spMk id="7" creationId="{46B9231A-B34B-4A29-A6AC-532E1EE81575}"/>
+          </ac:spMkLst>
+        </pc:spChg>
+        <pc:spChg chg="add del">
+          <ac:chgData name="German Luis Dagatti" userId="43e7766c8bef1a99" providerId="LiveId" clId="{571E5FA9-B83F-472B-AE41-7DE03044985C}" dt="2025-04-21T02:28:11.641" v="257" actId="34807"/>
+          <ac:spMkLst>
+            <pc:docMk/>
+            <pc:sldMk cId="1792972683" sldId="2567"/>
+            <ac:spMk id="9" creationId="{19F9BF86-FE94-4517-B97D-026C7515E589}"/>
+          </ac:spMkLst>
+        </pc:spChg>
+        <pc:cxnChg chg="add del">
+          <ac:chgData name="German Luis Dagatti" userId="43e7766c8bef1a99" providerId="LiveId" clId="{571E5FA9-B83F-472B-AE41-7DE03044985C}" dt="2025-04-21T02:28:11.641" v="257" actId="34807"/>
+          <ac:cxnSpMkLst>
+            <pc:docMk/>
+            <pc:sldMk cId="1792972683" sldId="2567"/>
+            <ac:cxnSpMk id="11" creationId="{53C0BBAA-A5EC-5D5D-32E6-9F7EA6048489}"/>
+          </ac:cxnSpMkLst>
+        </pc:cxnChg>
+      </pc:sldChg>
+      <pc:sldChg chg="addSp delSp modSp add del mod modTransition setBg modClrScheme addAnim delAnim chgLayout">
+        <pc:chgData name="German Luis Dagatti" userId="43e7766c8bef1a99" providerId="LiveId" clId="{571E5FA9-B83F-472B-AE41-7DE03044985C}" dt="2025-04-21T02:28:11.641" v="257" actId="34807"/>
+        <pc:sldMkLst>
+          <pc:docMk/>
+          <pc:sldMk cId="475086946" sldId="2568"/>
+        </pc:sldMkLst>
+        <pc:spChg chg="mod">
+          <ac:chgData name="German Luis Dagatti" userId="43e7766c8bef1a99" providerId="LiveId" clId="{571E5FA9-B83F-472B-AE41-7DE03044985C}" dt="2025-04-21T02:28:11.641" v="257" actId="34807"/>
+          <ac:spMkLst>
+            <pc:docMk/>
+            <pc:sldMk cId="475086946" sldId="2568"/>
+            <ac:spMk id="2" creationId="{AA5E9D29-4056-EA79-DB0E-815D956620F4}"/>
+          </ac:spMkLst>
+        </pc:spChg>
+        <pc:spChg chg="mod">
+          <ac:chgData name="German Luis Dagatti" userId="43e7766c8bef1a99" providerId="LiveId" clId="{571E5FA9-B83F-472B-AE41-7DE03044985C}" dt="2025-04-21T02:28:11.641" v="257" actId="34807"/>
+          <ac:spMkLst>
+            <pc:docMk/>
+            <pc:sldMk cId="475086946" sldId="2568"/>
+            <ac:spMk id="4" creationId="{CDAA9F17-0D81-54E8-9398-3F4FAB6BF0B6}"/>
+          </ac:spMkLst>
+        </pc:spChg>
+        <pc:spChg chg="add del">
+          <ac:chgData name="German Luis Dagatti" userId="43e7766c8bef1a99" providerId="LiveId" clId="{571E5FA9-B83F-472B-AE41-7DE03044985C}" dt="2025-04-21T02:28:11.641" v="257" actId="34807"/>
+          <ac:spMkLst>
+            <pc:docMk/>
+            <pc:sldMk cId="475086946" sldId="2568"/>
+            <ac:spMk id="12" creationId="{744CAA32-F237-419C-A2DD-43C28D920D3C}"/>
+          </ac:spMkLst>
+        </pc:spChg>
+        <pc:picChg chg="mod">
+          <ac:chgData name="German Luis Dagatti" userId="43e7766c8bef1a99" providerId="LiveId" clId="{571E5FA9-B83F-472B-AE41-7DE03044985C}" dt="2025-04-21T02:28:11.641" v="257" actId="34807"/>
+          <ac:picMkLst>
+            <pc:docMk/>
+            <pc:sldMk cId="475086946" sldId="2568"/>
+            <ac:picMk id="5" creationId="{3F098EE9-B0C3-45F3-BD3F-4B3DE23138C5}"/>
+          </ac:picMkLst>
+        </pc:picChg>
+        <pc:cxnChg chg="add del">
+          <ac:chgData name="German Luis Dagatti" userId="43e7766c8bef1a99" providerId="LiveId" clId="{571E5FA9-B83F-472B-AE41-7DE03044985C}" dt="2025-04-21T02:28:11.641" v="257" actId="34807"/>
+          <ac:cxnSpMkLst>
+            <pc:docMk/>
+            <pc:sldMk cId="475086946" sldId="2568"/>
+            <ac:cxnSpMk id="10" creationId="{118E06E4-607B-144B-382B-AD3D06B1EE8C}"/>
+          </ac:cxnSpMkLst>
+        </pc:cxnChg>
+        <pc:cxnChg chg="add del">
+          <ac:chgData name="German Luis Dagatti" userId="43e7766c8bef1a99" providerId="LiveId" clId="{571E5FA9-B83F-472B-AE41-7DE03044985C}" dt="2025-04-21T02:28:11.641" v="257" actId="34807"/>
+          <ac:cxnSpMkLst>
+            <pc:docMk/>
+            <pc:sldMk cId="475086946" sldId="2568"/>
+            <ac:cxnSpMk id="14" creationId="{08052531-D50B-3899-B150-D05525F4F2BC}"/>
+          </ac:cxnSpMkLst>
+        </pc:cxnChg>
+      </pc:sldChg>
+      <pc:sldChg chg="addSp delSp modSp add del mod modTransition setBg modClrScheme addAnim delAnim chgLayout">
+        <pc:chgData name="German Luis Dagatti" userId="43e7766c8bef1a99" providerId="LiveId" clId="{571E5FA9-B83F-472B-AE41-7DE03044985C}" dt="2025-04-21T02:37:57.584" v="276" actId="34807"/>
+        <pc:sldMkLst>
+          <pc:docMk/>
+          <pc:sldMk cId="2757882261" sldId="2568"/>
+        </pc:sldMkLst>
+        <pc:spChg chg="mod">
+          <ac:chgData name="German Luis Dagatti" userId="43e7766c8bef1a99" providerId="LiveId" clId="{571E5FA9-B83F-472B-AE41-7DE03044985C}" dt="2025-04-21T02:37:57.584" v="276" actId="34807"/>
+          <ac:spMkLst>
+            <pc:docMk/>
+            <pc:sldMk cId="2757882261" sldId="2568"/>
+            <ac:spMk id="2" creationId="{A26DBAE7-2320-379F-9DC2-020F987D224F}"/>
+          </ac:spMkLst>
+        </pc:spChg>
+        <pc:spChg chg="mod">
+          <ac:chgData name="German Luis Dagatti" userId="43e7766c8bef1a99" providerId="LiveId" clId="{571E5FA9-B83F-472B-AE41-7DE03044985C}" dt="2025-04-21T02:37:57.584" v="276" actId="34807"/>
+          <ac:spMkLst>
+            <pc:docMk/>
+            <pc:sldMk cId="2757882261" sldId="2568"/>
+            <ac:spMk id="4" creationId="{E0B8D00F-AD45-1EB8-18FF-C54EF2456C5D}"/>
+          </ac:spMkLst>
+        </pc:spChg>
+        <pc:spChg chg="add del">
+          <ac:chgData name="German Luis Dagatti" userId="43e7766c8bef1a99" providerId="LiveId" clId="{571E5FA9-B83F-472B-AE41-7DE03044985C}" dt="2025-04-21T02:37:57.584" v="276" actId="34807"/>
+          <ac:spMkLst>
+            <pc:docMk/>
+            <pc:sldMk cId="2757882261" sldId="2568"/>
+            <ac:spMk id="12" creationId="{744CAA32-F237-419C-A2DD-43C28D920D3C}"/>
+          </ac:spMkLst>
+        </pc:spChg>
+        <pc:picChg chg="mod ord">
+          <ac:chgData name="German Luis Dagatti" userId="43e7766c8bef1a99" providerId="LiveId" clId="{571E5FA9-B83F-472B-AE41-7DE03044985C}" dt="2025-04-21T02:37:57.584" v="276" actId="34807"/>
+          <ac:picMkLst>
+            <pc:docMk/>
+            <pc:sldMk cId="2757882261" sldId="2568"/>
+            <ac:picMk id="5" creationId="{EF1CD388-660F-4F92-BD56-A2FE07B3C0FE}"/>
+          </ac:picMkLst>
+        </pc:picChg>
+        <pc:cxnChg chg="add del">
+          <ac:chgData name="German Luis Dagatti" userId="43e7766c8bef1a99" providerId="LiveId" clId="{571E5FA9-B83F-472B-AE41-7DE03044985C}" dt="2025-04-21T02:37:57.584" v="276" actId="34807"/>
+          <ac:cxnSpMkLst>
+            <pc:docMk/>
+            <pc:sldMk cId="2757882261" sldId="2568"/>
+            <ac:cxnSpMk id="10" creationId="{118E06E4-607B-144B-382B-AD3D06B1EE8C}"/>
+          </ac:cxnSpMkLst>
+        </pc:cxnChg>
+        <pc:cxnChg chg="add del">
+          <ac:chgData name="German Luis Dagatti" userId="43e7766c8bef1a99" providerId="LiveId" clId="{571E5FA9-B83F-472B-AE41-7DE03044985C}" dt="2025-04-21T02:37:57.584" v="276" actId="34807"/>
+          <ac:cxnSpMkLst>
+            <pc:docMk/>
+            <pc:sldMk cId="2757882261" sldId="2568"/>
+            <ac:cxnSpMk id="14" creationId="{92025DBA-8780-9CA0-2826-FF6E3BD1A0C9}"/>
+          </ac:cxnSpMkLst>
+        </pc:cxnChg>
+      </pc:sldChg>
+      <pc:sldChg chg="addSp delSp modSp add del mod modTransition setBg modClrScheme addAnim delAnim chgLayout">
+        <pc:chgData name="German Luis Dagatti" userId="43e7766c8bef1a99" providerId="LiveId" clId="{571E5FA9-B83F-472B-AE41-7DE03044985C}" dt="2025-04-21T02:28:11.641" v="257" actId="34807"/>
+        <pc:sldMkLst>
+          <pc:docMk/>
+          <pc:sldMk cId="2075364377" sldId="2569"/>
+        </pc:sldMkLst>
+        <pc:spChg chg="mod">
+          <ac:chgData name="German Luis Dagatti" userId="43e7766c8bef1a99" providerId="LiveId" clId="{571E5FA9-B83F-472B-AE41-7DE03044985C}" dt="2025-04-21T02:28:11.641" v="257" actId="34807"/>
+          <ac:spMkLst>
+            <pc:docMk/>
+            <pc:sldMk cId="2075364377" sldId="2569"/>
+            <ac:spMk id="2" creationId="{570AE1FA-875E-248C-8FF8-F603F45F9C30}"/>
+          </ac:spMkLst>
+        </pc:spChg>
+        <pc:spChg chg="mod">
+          <ac:chgData name="German Luis Dagatti" userId="43e7766c8bef1a99" providerId="LiveId" clId="{571E5FA9-B83F-472B-AE41-7DE03044985C}" dt="2025-04-21T02:28:11.641" v="257" actId="34807"/>
+          <ac:spMkLst>
+            <pc:docMk/>
+            <pc:sldMk cId="2075364377" sldId="2569"/>
+            <ac:spMk id="4" creationId="{22243202-5C7A-EC0F-E336-80368E761EF2}"/>
+          </ac:spMkLst>
+        </pc:spChg>
+        <pc:spChg chg="add del">
+          <ac:chgData name="German Luis Dagatti" userId="43e7766c8bef1a99" providerId="LiveId" clId="{571E5FA9-B83F-472B-AE41-7DE03044985C}" dt="2025-04-21T02:28:11.641" v="257" actId="34807"/>
+          <ac:spMkLst>
+            <pc:docMk/>
+            <pc:sldMk cId="2075364377" sldId="2569"/>
+            <ac:spMk id="12" creationId="{744CAA32-F237-419C-A2DD-43C28D920D3C}"/>
+          </ac:spMkLst>
+        </pc:spChg>
+        <pc:picChg chg="mod">
+          <ac:chgData name="German Luis Dagatti" userId="43e7766c8bef1a99" providerId="LiveId" clId="{571E5FA9-B83F-472B-AE41-7DE03044985C}" dt="2025-04-21T02:28:11.641" v="257" actId="34807"/>
+          <ac:picMkLst>
+            <pc:docMk/>
+            <pc:sldMk cId="2075364377" sldId="2569"/>
+            <ac:picMk id="5" creationId="{CF861445-6BE6-42DE-B851-573253E3CBEB}"/>
+          </ac:picMkLst>
+        </pc:picChg>
+        <pc:cxnChg chg="add del">
+          <ac:chgData name="German Luis Dagatti" userId="43e7766c8bef1a99" providerId="LiveId" clId="{571E5FA9-B83F-472B-AE41-7DE03044985C}" dt="2025-04-21T02:28:11.641" v="257" actId="34807"/>
+          <ac:cxnSpMkLst>
+            <pc:docMk/>
+            <pc:sldMk cId="2075364377" sldId="2569"/>
+            <ac:cxnSpMk id="10" creationId="{118E06E4-607B-144B-382B-AD3D06B1EE8C}"/>
+          </ac:cxnSpMkLst>
+        </pc:cxnChg>
+        <pc:cxnChg chg="add del">
+          <ac:chgData name="German Luis Dagatti" userId="43e7766c8bef1a99" providerId="LiveId" clId="{571E5FA9-B83F-472B-AE41-7DE03044985C}" dt="2025-04-21T02:28:11.641" v="257" actId="34807"/>
+          <ac:cxnSpMkLst>
+            <pc:docMk/>
+            <pc:sldMk cId="2075364377" sldId="2569"/>
+            <ac:cxnSpMk id="14" creationId="{08052531-D50B-3899-B150-D05525F4F2BC}"/>
+          </ac:cxnSpMkLst>
+        </pc:cxnChg>
+      </pc:sldChg>
+      <pc:sldChg chg="addSp delSp modSp add del mod modTransition setBg modClrScheme addAnim delAnim chgLayout">
+        <pc:chgData name="German Luis Dagatti" userId="43e7766c8bef1a99" providerId="LiveId" clId="{571E5FA9-B83F-472B-AE41-7DE03044985C}" dt="2025-04-21T02:37:57.584" v="276" actId="34807"/>
+        <pc:sldMkLst>
+          <pc:docMk/>
+          <pc:sldMk cId="3118136047" sldId="2569"/>
+        </pc:sldMkLst>
+        <pc:spChg chg="mod">
+          <ac:chgData name="German Luis Dagatti" userId="43e7766c8bef1a99" providerId="LiveId" clId="{571E5FA9-B83F-472B-AE41-7DE03044985C}" dt="2025-04-21T02:37:57.584" v="276" actId="34807"/>
+          <ac:spMkLst>
+            <pc:docMk/>
+            <pc:sldMk cId="3118136047" sldId="2569"/>
+            <ac:spMk id="2" creationId="{E77558CD-C252-BB0D-A05A-BDDD82FFBF3F}"/>
+          </ac:spMkLst>
+        </pc:spChg>
+        <pc:spChg chg="mod">
+          <ac:chgData name="German Luis Dagatti" userId="43e7766c8bef1a99" providerId="LiveId" clId="{571E5FA9-B83F-472B-AE41-7DE03044985C}" dt="2025-04-21T02:37:57.584" v="276" actId="34807"/>
+          <ac:spMkLst>
+            <pc:docMk/>
+            <pc:sldMk cId="3118136047" sldId="2569"/>
+            <ac:spMk id="4" creationId="{ADD34CAA-F772-A2CB-00D0-6A185801FA05}"/>
+          </ac:spMkLst>
+        </pc:spChg>
+        <pc:spChg chg="add del">
+          <ac:chgData name="German Luis Dagatti" userId="43e7766c8bef1a99" providerId="LiveId" clId="{571E5FA9-B83F-472B-AE41-7DE03044985C}" dt="2025-04-21T02:37:57.584" v="276" actId="34807"/>
+          <ac:spMkLst>
+            <pc:docMk/>
+            <pc:sldMk cId="3118136047" sldId="2569"/>
+            <ac:spMk id="12" creationId="{744CAA32-F237-419C-A2DD-43C28D920D3C}"/>
+          </ac:spMkLst>
+        </pc:spChg>
+        <pc:picChg chg="mod">
+          <ac:chgData name="German Luis Dagatti" userId="43e7766c8bef1a99" providerId="LiveId" clId="{571E5FA9-B83F-472B-AE41-7DE03044985C}" dt="2025-04-21T02:37:57.584" v="276" actId="34807"/>
+          <ac:picMkLst>
+            <pc:docMk/>
+            <pc:sldMk cId="3118136047" sldId="2569"/>
+            <ac:picMk id="5" creationId="{D0EE5B5A-BCED-4011-9382-0646CF611EF5}"/>
+          </ac:picMkLst>
+        </pc:picChg>
+        <pc:cxnChg chg="add del">
+          <ac:chgData name="German Luis Dagatti" userId="43e7766c8bef1a99" providerId="LiveId" clId="{571E5FA9-B83F-472B-AE41-7DE03044985C}" dt="2025-04-21T02:37:57.584" v="276" actId="34807"/>
+          <ac:cxnSpMkLst>
+            <pc:docMk/>
+            <pc:sldMk cId="3118136047" sldId="2569"/>
+            <ac:cxnSpMk id="10" creationId="{118E06E4-607B-144B-382B-AD3D06B1EE8C}"/>
+          </ac:cxnSpMkLst>
+        </pc:cxnChg>
+        <pc:cxnChg chg="add del">
+          <ac:chgData name="German Luis Dagatti" userId="43e7766c8bef1a99" providerId="LiveId" clId="{571E5FA9-B83F-472B-AE41-7DE03044985C}" dt="2025-04-21T02:37:57.584" v="276" actId="34807"/>
+          <ac:cxnSpMkLst>
+            <pc:docMk/>
+            <pc:sldMk cId="3118136047" sldId="2569"/>
+            <ac:cxnSpMk id="14" creationId="{08052531-D50B-3899-B150-D05525F4F2BC}"/>
+          </ac:cxnSpMkLst>
+        </pc:cxnChg>
+      </pc:sldChg>
+      <pc:sldChg chg="addSp delSp modSp add del mod modTransition setBg modClrScheme addAnim delAnim chgLayout">
+        <pc:chgData name="German Luis Dagatti" userId="43e7766c8bef1a99" providerId="LiveId" clId="{571E5FA9-B83F-472B-AE41-7DE03044985C}" dt="2025-04-21T02:37:57.584" v="276" actId="34807"/>
+        <pc:sldMkLst>
+          <pc:docMk/>
+          <pc:sldMk cId="1390215326" sldId="2570"/>
+        </pc:sldMkLst>
+        <pc:spChg chg="mod">
+          <ac:chgData name="German Luis Dagatti" userId="43e7766c8bef1a99" providerId="LiveId" clId="{571E5FA9-B83F-472B-AE41-7DE03044985C}" dt="2025-04-21T02:37:57.584" v="276" actId="34807"/>
+          <ac:spMkLst>
+            <pc:docMk/>
+            <pc:sldMk cId="1390215326" sldId="2570"/>
+            <ac:spMk id="2" creationId="{891B7F7A-CC2B-37DF-61F4-A25EEFD3B3C6}"/>
+          </ac:spMkLst>
+        </pc:spChg>
+        <pc:spChg chg="add del">
+          <ac:chgData name="German Luis Dagatti" userId="43e7766c8bef1a99" providerId="LiveId" clId="{571E5FA9-B83F-472B-AE41-7DE03044985C}" dt="2025-04-21T02:37:57.584" v="276" actId="34807"/>
+          <ac:spMkLst>
+            <pc:docMk/>
+            <pc:sldMk cId="1390215326" sldId="2570"/>
+            <ac:spMk id="7" creationId="{46B9231A-B34B-4A29-A6AC-532E1EE81575}"/>
+          </ac:spMkLst>
+        </pc:spChg>
+        <pc:spChg chg="add del">
+          <ac:chgData name="German Luis Dagatti" userId="43e7766c8bef1a99" providerId="LiveId" clId="{571E5FA9-B83F-472B-AE41-7DE03044985C}" dt="2025-04-21T02:37:57.584" v="276" actId="34807"/>
+          <ac:spMkLst>
+            <pc:docMk/>
+            <pc:sldMk cId="1390215326" sldId="2570"/>
+            <ac:spMk id="9" creationId="{19F9BF86-FE94-4517-B97D-026C7515E589}"/>
+          </ac:spMkLst>
+        </pc:spChg>
+        <pc:cxnChg chg="add del">
+          <ac:chgData name="German Luis Dagatti" userId="43e7766c8bef1a99" providerId="LiveId" clId="{571E5FA9-B83F-472B-AE41-7DE03044985C}" dt="2025-04-21T02:37:57.584" v="276" actId="34807"/>
+          <ac:cxnSpMkLst>
+            <pc:docMk/>
+            <pc:sldMk cId="1390215326" sldId="2570"/>
+            <ac:cxnSpMk id="11" creationId="{53C0BBAA-A5EC-5D5D-32E6-9F7EA6048489}"/>
+          </ac:cxnSpMkLst>
+        </pc:cxnChg>
+      </pc:sldChg>
+      <pc:sldChg chg="addSp delSp modSp add del mod modTransition setBg modClrScheme addAnim delAnim chgLayout">
+        <pc:chgData name="German Luis Dagatti" userId="43e7766c8bef1a99" providerId="LiveId" clId="{571E5FA9-B83F-472B-AE41-7DE03044985C}" dt="2025-04-21T02:28:11.641" v="257" actId="34807"/>
+        <pc:sldMkLst>
+          <pc:docMk/>
+          <pc:sldMk cId="1559812213" sldId="2570"/>
+        </pc:sldMkLst>
+        <pc:spChg chg="mod">
+          <ac:chgData name="German Luis Dagatti" userId="43e7766c8bef1a99" providerId="LiveId" clId="{571E5FA9-B83F-472B-AE41-7DE03044985C}" dt="2025-04-21T02:28:11.641" v="257" actId="34807"/>
+          <ac:spMkLst>
+            <pc:docMk/>
+            <pc:sldMk cId="1559812213" sldId="2570"/>
+            <ac:spMk id="2" creationId="{E6C3F4D1-471C-6461-1F41-0A9B198D3998}"/>
+          </ac:spMkLst>
+        </pc:spChg>
+        <pc:spChg chg="add del">
+          <ac:chgData name="German Luis Dagatti" userId="43e7766c8bef1a99" providerId="LiveId" clId="{571E5FA9-B83F-472B-AE41-7DE03044985C}" dt="2025-04-21T02:28:11.641" v="257" actId="34807"/>
+          <ac:spMkLst>
+            <pc:docMk/>
+            <pc:sldMk cId="1559812213" sldId="2570"/>
+            <ac:spMk id="7" creationId="{46B9231A-B34B-4A29-A6AC-532E1EE81575}"/>
+          </ac:spMkLst>
+        </pc:spChg>
+        <pc:spChg chg="add del">
+          <ac:chgData name="German Luis Dagatti" userId="43e7766c8bef1a99" providerId="LiveId" clId="{571E5FA9-B83F-472B-AE41-7DE03044985C}" dt="2025-04-21T02:28:11.641" v="257" actId="34807"/>
+          <ac:spMkLst>
+            <pc:docMk/>
+            <pc:sldMk cId="1559812213" sldId="2570"/>
+            <ac:spMk id="9" creationId="{19F9BF86-FE94-4517-B97D-026C7515E589}"/>
+          </ac:spMkLst>
+        </pc:spChg>
+        <pc:cxnChg chg="add del">
+          <ac:chgData name="German Luis Dagatti" userId="43e7766c8bef1a99" providerId="LiveId" clId="{571E5FA9-B83F-472B-AE41-7DE03044985C}" dt="2025-04-21T02:28:11.641" v="257" actId="34807"/>
+          <ac:cxnSpMkLst>
+            <pc:docMk/>
+            <pc:sldMk cId="1559812213" sldId="2570"/>
+            <ac:cxnSpMk id="11" creationId="{53C0BBAA-A5EC-5D5D-32E6-9F7EA6048489}"/>
+          </ac:cxnSpMkLst>
+        </pc:cxnChg>
+      </pc:sldChg>
+      <pc:sldChg chg="addSp delSp modSp add del mod modTransition setBg modClrScheme addAnim delAnim chgLayout">
+        <pc:chgData name="German Luis Dagatti" userId="43e7766c8bef1a99" providerId="LiveId" clId="{571E5FA9-B83F-472B-AE41-7DE03044985C}" dt="2025-04-21T02:37:57.584" v="276" actId="34807"/>
+        <pc:sldMkLst>
+          <pc:docMk/>
+          <pc:sldMk cId="331509745" sldId="2571"/>
+        </pc:sldMkLst>
+        <pc:spChg chg="mod">
+          <ac:chgData name="German Luis Dagatti" userId="43e7766c8bef1a99" providerId="LiveId" clId="{571E5FA9-B83F-472B-AE41-7DE03044985C}" dt="2025-04-21T02:37:57.584" v="276" actId="34807"/>
+          <ac:spMkLst>
+            <pc:docMk/>
+            <pc:sldMk cId="331509745" sldId="2571"/>
+            <ac:spMk id="2" creationId="{10BC7E8F-B2D8-8164-803A-29C2D31C126A}"/>
+          </ac:spMkLst>
+        </pc:spChg>
+        <pc:spChg chg="mod">
+          <ac:chgData name="German Luis Dagatti" userId="43e7766c8bef1a99" providerId="LiveId" clId="{571E5FA9-B83F-472B-AE41-7DE03044985C}" dt="2025-04-21T02:37:57.584" v="276" actId="34807"/>
+          <ac:spMkLst>
+            <pc:docMk/>
+            <pc:sldMk cId="331509745" sldId="2571"/>
+            <ac:spMk id="4" creationId="{03A3B779-146B-627B-7340-8E5B24A57E5C}"/>
+          </ac:spMkLst>
+        </pc:spChg>
+        <pc:spChg chg="add del">
+          <ac:chgData name="German Luis Dagatti" userId="43e7766c8bef1a99" providerId="LiveId" clId="{571E5FA9-B83F-472B-AE41-7DE03044985C}" dt="2025-04-21T02:37:57.584" v="276" actId="34807"/>
+          <ac:spMkLst>
+            <pc:docMk/>
+            <pc:sldMk cId="331509745" sldId="2571"/>
+            <ac:spMk id="12" creationId="{744CAA32-F237-419C-A2DD-43C28D920D3C}"/>
+          </ac:spMkLst>
+        </pc:spChg>
+        <pc:picChg chg="mod ord">
+          <ac:chgData name="German Luis Dagatti" userId="43e7766c8bef1a99" providerId="LiveId" clId="{571E5FA9-B83F-472B-AE41-7DE03044985C}" dt="2025-04-21T02:37:57.584" v="276" actId="34807"/>
+          <ac:picMkLst>
+            <pc:docMk/>
+            <pc:sldMk cId="331509745" sldId="2571"/>
+            <ac:picMk id="5" creationId="{EA8EC3BB-6E25-4435-87DF-DB753A8A053C}"/>
+          </ac:picMkLst>
+        </pc:picChg>
+        <pc:cxnChg chg="add del">
+          <ac:chgData name="German Luis Dagatti" userId="43e7766c8bef1a99" providerId="LiveId" clId="{571E5FA9-B83F-472B-AE41-7DE03044985C}" dt="2025-04-21T02:37:57.584" v="276" actId="34807"/>
+          <ac:cxnSpMkLst>
+            <pc:docMk/>
+            <pc:sldMk cId="331509745" sldId="2571"/>
+            <ac:cxnSpMk id="10" creationId="{118E06E4-607B-144B-382B-AD3D06B1EE8C}"/>
+          </ac:cxnSpMkLst>
+        </pc:cxnChg>
+        <pc:cxnChg chg="add del">
+          <ac:chgData name="German Luis Dagatti" userId="43e7766c8bef1a99" providerId="LiveId" clId="{571E5FA9-B83F-472B-AE41-7DE03044985C}" dt="2025-04-21T02:37:57.584" v="276" actId="34807"/>
+          <ac:cxnSpMkLst>
+            <pc:docMk/>
+            <pc:sldMk cId="331509745" sldId="2571"/>
+            <ac:cxnSpMk id="14" creationId="{92025DBA-8780-9CA0-2826-FF6E3BD1A0C9}"/>
+          </ac:cxnSpMkLst>
+        </pc:cxnChg>
+      </pc:sldChg>
+      <pc:sldChg chg="addSp delSp modSp add del mod modTransition setBg modClrScheme addAnim delAnim chgLayout">
+        <pc:chgData name="German Luis Dagatti" userId="43e7766c8bef1a99" providerId="LiveId" clId="{571E5FA9-B83F-472B-AE41-7DE03044985C}" dt="2025-04-21T02:28:11.641" v="257" actId="34807"/>
+        <pc:sldMkLst>
+          <pc:docMk/>
+          <pc:sldMk cId="1072426033" sldId="2571"/>
+        </pc:sldMkLst>
+        <pc:spChg chg="mod">
+          <ac:chgData name="German Luis Dagatti" userId="43e7766c8bef1a99" providerId="LiveId" clId="{571E5FA9-B83F-472B-AE41-7DE03044985C}" dt="2025-04-21T02:28:11.641" v="257" actId="34807"/>
+          <ac:spMkLst>
+            <pc:docMk/>
+            <pc:sldMk cId="1072426033" sldId="2571"/>
+            <ac:spMk id="2" creationId="{4E0B6C76-69CD-5ED3-FD63-C754506FF604}"/>
+          </ac:spMkLst>
+        </pc:spChg>
+        <pc:spChg chg="mod">
+          <ac:chgData name="German Luis Dagatti" userId="43e7766c8bef1a99" providerId="LiveId" clId="{571E5FA9-B83F-472B-AE41-7DE03044985C}" dt="2025-04-21T02:28:11.641" v="257" actId="34807"/>
+          <ac:spMkLst>
+            <pc:docMk/>
+            <pc:sldMk cId="1072426033" sldId="2571"/>
+            <ac:spMk id="4" creationId="{9915FEFE-8330-429B-D654-92801C6FEDF3}"/>
+          </ac:spMkLst>
+        </pc:spChg>
+        <pc:spChg chg="add del">
+          <ac:chgData name="German Luis Dagatti" userId="43e7766c8bef1a99" providerId="LiveId" clId="{571E5FA9-B83F-472B-AE41-7DE03044985C}" dt="2025-04-21T02:28:11.641" v="257" actId="34807"/>
+          <ac:spMkLst>
+            <pc:docMk/>
+            <pc:sldMk cId="1072426033" sldId="2571"/>
+            <ac:spMk id="12" creationId="{744CAA32-F237-419C-A2DD-43C28D920D3C}"/>
+          </ac:spMkLst>
+        </pc:spChg>
+        <pc:picChg chg="mod ord">
+          <ac:chgData name="German Luis Dagatti" userId="43e7766c8bef1a99" providerId="LiveId" clId="{571E5FA9-B83F-472B-AE41-7DE03044985C}" dt="2025-04-21T02:28:11.641" v="257" actId="34807"/>
+          <ac:picMkLst>
+            <pc:docMk/>
+            <pc:sldMk cId="1072426033" sldId="2571"/>
+            <ac:picMk id="5" creationId="{0ED0CC9E-F89C-4D2B-BA09-36EC5E23ED2A}"/>
+          </ac:picMkLst>
+        </pc:picChg>
+        <pc:cxnChg chg="add del">
+          <ac:chgData name="German Luis Dagatti" userId="43e7766c8bef1a99" providerId="LiveId" clId="{571E5FA9-B83F-472B-AE41-7DE03044985C}" dt="2025-04-21T02:28:11.641" v="257" actId="34807"/>
+          <ac:cxnSpMkLst>
+            <pc:docMk/>
+            <pc:sldMk cId="1072426033" sldId="2571"/>
+            <ac:cxnSpMk id="10" creationId="{118E06E4-607B-144B-382B-AD3D06B1EE8C}"/>
+          </ac:cxnSpMkLst>
+        </pc:cxnChg>
+        <pc:cxnChg chg="add del">
+          <ac:chgData name="German Luis Dagatti" userId="43e7766c8bef1a99" providerId="LiveId" clId="{571E5FA9-B83F-472B-AE41-7DE03044985C}" dt="2025-04-21T02:28:11.641" v="257" actId="34807"/>
+          <ac:cxnSpMkLst>
+            <pc:docMk/>
+            <pc:sldMk cId="1072426033" sldId="2571"/>
+            <ac:cxnSpMk id="14" creationId="{92025DBA-8780-9CA0-2826-FF6E3BD1A0C9}"/>
+          </ac:cxnSpMkLst>
+        </pc:cxnChg>
+      </pc:sldChg>
+      <pc:sldChg chg="addSp delSp modSp add del mod modTransition setBg modClrScheme addAnim delAnim chgLayout">
+        <pc:chgData name="German Luis Dagatti" userId="43e7766c8bef1a99" providerId="LiveId" clId="{571E5FA9-B83F-472B-AE41-7DE03044985C}" dt="2025-04-21T02:37:57.584" v="276" actId="34807"/>
+        <pc:sldMkLst>
+          <pc:docMk/>
+          <pc:sldMk cId="1339481629" sldId="2572"/>
+        </pc:sldMkLst>
+        <pc:spChg chg="mod">
+          <ac:chgData name="German Luis Dagatti" userId="43e7766c8bef1a99" providerId="LiveId" clId="{571E5FA9-B83F-472B-AE41-7DE03044985C}" dt="2025-04-21T02:37:57.584" v="276" actId="34807"/>
+          <ac:spMkLst>
+            <pc:docMk/>
+            <pc:sldMk cId="1339481629" sldId="2572"/>
+            <ac:spMk id="2" creationId="{2093D348-D7AA-47A9-5907-93C672336116}"/>
+          </ac:spMkLst>
+        </pc:spChg>
+        <pc:spChg chg="mod">
+          <ac:chgData name="German Luis Dagatti" userId="43e7766c8bef1a99" providerId="LiveId" clId="{571E5FA9-B83F-472B-AE41-7DE03044985C}" dt="2025-04-21T02:37:57.584" v="276" actId="34807"/>
+          <ac:spMkLst>
+            <pc:docMk/>
+            <pc:sldMk cId="1339481629" sldId="2572"/>
+            <ac:spMk id="4" creationId="{98A9D0F9-53FA-5B6E-667C-3119A6FCE5C9}"/>
+          </ac:spMkLst>
+        </pc:spChg>
+        <pc:spChg chg="add del">
+          <ac:chgData name="German Luis Dagatti" userId="43e7766c8bef1a99" providerId="LiveId" clId="{571E5FA9-B83F-472B-AE41-7DE03044985C}" dt="2025-04-21T02:37:57.584" v="276" actId="34807"/>
+          <ac:spMkLst>
+            <pc:docMk/>
+            <pc:sldMk cId="1339481629" sldId="2572"/>
+            <ac:spMk id="12" creationId="{744CAA32-F237-419C-A2DD-43C28D920D3C}"/>
+          </ac:spMkLst>
+        </pc:spChg>
+        <pc:picChg chg="mod">
+          <ac:chgData name="German Luis Dagatti" userId="43e7766c8bef1a99" providerId="LiveId" clId="{571E5FA9-B83F-472B-AE41-7DE03044985C}" dt="2025-04-21T02:37:57.584" v="276" actId="34807"/>
+          <ac:picMkLst>
+            <pc:docMk/>
+            <pc:sldMk cId="1339481629" sldId="2572"/>
+            <ac:picMk id="5" creationId="{E2AB63DF-9DFB-4597-B914-AA7636BBB5B4}"/>
+          </ac:picMkLst>
+        </pc:picChg>
+        <pc:cxnChg chg="add del">
+          <ac:chgData name="German Luis Dagatti" userId="43e7766c8bef1a99" providerId="LiveId" clId="{571E5FA9-B83F-472B-AE41-7DE03044985C}" dt="2025-04-21T02:37:57.584" v="276" actId="34807"/>
+          <ac:cxnSpMkLst>
+            <pc:docMk/>
+            <pc:sldMk cId="1339481629" sldId="2572"/>
+            <ac:cxnSpMk id="10" creationId="{118E06E4-607B-144B-382B-AD3D06B1EE8C}"/>
+          </ac:cxnSpMkLst>
+        </pc:cxnChg>
+        <pc:cxnChg chg="add del">
+          <ac:chgData name="German Luis Dagatti" userId="43e7766c8bef1a99" providerId="LiveId" clId="{571E5FA9-B83F-472B-AE41-7DE03044985C}" dt="2025-04-21T02:37:57.584" v="276" actId="34807"/>
+          <ac:cxnSpMkLst>
+            <pc:docMk/>
+            <pc:sldMk cId="1339481629" sldId="2572"/>
+            <ac:cxnSpMk id="14" creationId="{08052531-D50B-3899-B150-D05525F4F2BC}"/>
+          </ac:cxnSpMkLst>
+        </pc:cxnChg>
+      </pc:sldChg>
+      <pc:sldChg chg="addSp delSp modSp add del mod modTransition setBg modClrScheme addAnim delAnim chgLayout">
+        <pc:chgData name="German Luis Dagatti" userId="43e7766c8bef1a99" providerId="LiveId" clId="{571E5FA9-B83F-472B-AE41-7DE03044985C}" dt="2025-04-21T02:28:11.641" v="257" actId="34807"/>
+        <pc:sldMkLst>
+          <pc:docMk/>
+          <pc:sldMk cId="1712489481" sldId="2572"/>
+        </pc:sldMkLst>
+        <pc:spChg chg="mod">
+          <ac:chgData name="German Luis Dagatti" userId="43e7766c8bef1a99" providerId="LiveId" clId="{571E5FA9-B83F-472B-AE41-7DE03044985C}" dt="2025-04-21T02:28:11.641" v="257" actId="34807"/>
+          <ac:spMkLst>
+            <pc:docMk/>
+            <pc:sldMk cId="1712489481" sldId="2572"/>
+            <ac:spMk id="2" creationId="{6EB5C5E1-5F52-BB24-3E24-64FFF022E940}"/>
+          </ac:spMkLst>
+        </pc:spChg>
+        <pc:spChg chg="mod">
+          <ac:chgData name="German Luis Dagatti" userId="43e7766c8bef1a99" providerId="LiveId" clId="{571E5FA9-B83F-472B-AE41-7DE03044985C}" dt="2025-04-21T02:28:11.641" v="257" actId="34807"/>
+          <ac:spMkLst>
+            <pc:docMk/>
+            <pc:sldMk cId="1712489481" sldId="2572"/>
+            <ac:spMk id="4" creationId="{360A8BA2-87D3-2802-79EE-B5E055B01569}"/>
+          </ac:spMkLst>
+        </pc:spChg>
+        <pc:spChg chg="add del">
+          <ac:chgData name="German Luis Dagatti" userId="43e7766c8bef1a99" providerId="LiveId" clId="{571E5FA9-B83F-472B-AE41-7DE03044985C}" dt="2025-04-21T02:28:11.641" v="257" actId="34807"/>
+          <ac:spMkLst>
+            <pc:docMk/>
+            <pc:sldMk cId="1712489481" sldId="2572"/>
+            <ac:spMk id="12" creationId="{744CAA32-F237-419C-A2DD-43C28D920D3C}"/>
+          </ac:spMkLst>
+        </pc:spChg>
+        <pc:picChg chg="mod">
+          <ac:chgData name="German Luis Dagatti" userId="43e7766c8bef1a99" providerId="LiveId" clId="{571E5FA9-B83F-472B-AE41-7DE03044985C}" dt="2025-04-21T02:28:11.641" v="257" actId="34807"/>
+          <ac:picMkLst>
+            <pc:docMk/>
+            <pc:sldMk cId="1712489481" sldId="2572"/>
+            <ac:picMk id="5" creationId="{625F9588-AD67-4918-850B-D4B679865E8E}"/>
+          </ac:picMkLst>
+        </pc:picChg>
+        <pc:cxnChg chg="add del">
+          <ac:chgData name="German Luis Dagatti" userId="43e7766c8bef1a99" providerId="LiveId" clId="{571E5FA9-B83F-472B-AE41-7DE03044985C}" dt="2025-04-21T02:28:11.641" v="257" actId="34807"/>
+          <ac:cxnSpMkLst>
+            <pc:docMk/>
+            <pc:sldMk cId="1712489481" sldId="2572"/>
+            <ac:cxnSpMk id="10" creationId="{118E06E4-607B-144B-382B-AD3D06B1EE8C}"/>
+          </ac:cxnSpMkLst>
+        </pc:cxnChg>
+        <pc:cxnChg chg="add del">
+          <ac:chgData name="German Luis Dagatti" userId="43e7766c8bef1a99" providerId="LiveId" clId="{571E5FA9-B83F-472B-AE41-7DE03044985C}" dt="2025-04-21T02:28:11.641" v="257" actId="34807"/>
+          <ac:cxnSpMkLst>
+            <pc:docMk/>
+            <pc:sldMk cId="1712489481" sldId="2572"/>
+            <ac:cxnSpMk id="14" creationId="{08052531-D50B-3899-B150-D05525F4F2BC}"/>
+          </ac:cxnSpMkLst>
+        </pc:cxnChg>
+      </pc:sldChg>
+      <pc:sldChg chg="addSp delSp modSp add del mod modTransition setBg modClrScheme chgLayout">
+        <pc:chgData name="German Luis Dagatti" userId="43e7766c8bef1a99" providerId="LiveId" clId="{571E5FA9-B83F-472B-AE41-7DE03044985C}" dt="2025-04-21T02:37:57.584" v="276" actId="34807"/>
+        <pc:sldMkLst>
+          <pc:docMk/>
+          <pc:sldMk cId="198609071" sldId="2573"/>
+        </pc:sldMkLst>
+        <pc:spChg chg="mod">
+          <ac:chgData name="German Luis Dagatti" userId="43e7766c8bef1a99" providerId="LiveId" clId="{571E5FA9-B83F-472B-AE41-7DE03044985C}" dt="2025-04-21T02:37:57.584" v="276" actId="34807"/>
+          <ac:spMkLst>
+            <pc:docMk/>
+            <pc:sldMk cId="198609071" sldId="2573"/>
+            <ac:spMk id="2" creationId="{FC67DF5E-5A0A-6F39-4871-2DB68D43F286}"/>
+          </ac:spMkLst>
+        </pc:spChg>
+        <pc:spChg chg="add del">
+          <ac:chgData name="German Luis Dagatti" userId="43e7766c8bef1a99" providerId="LiveId" clId="{571E5FA9-B83F-472B-AE41-7DE03044985C}" dt="2025-04-21T02:37:57.584" v="276" actId="34807"/>
+          <ac:spMkLst>
+            <pc:docMk/>
+            <pc:sldMk cId="198609071" sldId="2573"/>
+            <ac:spMk id="9" creationId="{1653AE3C-AC4F-907C-B473-B9A30D21506F}"/>
+          </ac:spMkLst>
+        </pc:spChg>
+        <pc:graphicFrameChg chg="mod modGraphic">
+          <ac:chgData name="German Luis Dagatti" userId="43e7766c8bef1a99" providerId="LiveId" clId="{571E5FA9-B83F-472B-AE41-7DE03044985C}" dt="2025-04-21T02:37:57.584" v="276" actId="34807"/>
+          <ac:graphicFrameMkLst>
+            <pc:docMk/>
+            <pc:sldMk cId="198609071" sldId="2573"/>
+            <ac:graphicFrameMk id="4" creationId="{0755F0D3-EF33-4AA3-8E6D-0511C631A3EA}"/>
+          </ac:graphicFrameMkLst>
+        </pc:graphicFrameChg>
+      </pc:sldChg>
+      <pc:sldChg chg="addSp delSp modSp add del mod modTransition setBg modClrScheme addAnim delAnim chgLayout">
+        <pc:chgData name="German Luis Dagatti" userId="43e7766c8bef1a99" providerId="LiveId" clId="{571E5FA9-B83F-472B-AE41-7DE03044985C}" dt="2025-04-21T02:28:11.641" v="257" actId="34807"/>
+        <pc:sldMkLst>
+          <pc:docMk/>
+          <pc:sldMk cId="2830584289" sldId="2573"/>
+        </pc:sldMkLst>
+        <pc:spChg chg="mod">
+          <ac:chgData name="German Luis Dagatti" userId="43e7766c8bef1a99" providerId="LiveId" clId="{571E5FA9-B83F-472B-AE41-7DE03044985C}" dt="2025-04-21T02:28:11.641" v="257" actId="34807"/>
+          <ac:spMkLst>
+            <pc:docMk/>
+            <pc:sldMk cId="2830584289" sldId="2573"/>
+            <ac:spMk id="2" creationId="{82D19B20-C1D4-433B-9F99-2D4BDCC266F9}"/>
+          </ac:spMkLst>
+        </pc:spChg>
+        <pc:spChg chg="mod">
+          <ac:chgData name="German Luis Dagatti" userId="43e7766c8bef1a99" providerId="LiveId" clId="{571E5FA9-B83F-472B-AE41-7DE03044985C}" dt="2025-04-21T02:28:11.641" v="257" actId="34807"/>
+          <ac:spMkLst>
+            <pc:docMk/>
+            <pc:sldMk cId="2830584289" sldId="2573"/>
+            <ac:spMk id="4" creationId="{796E1C2C-F17E-753F-B119-D6205B1D0A33}"/>
+          </ac:spMkLst>
+        </pc:spChg>
+        <pc:spChg chg="add del">
+          <ac:chgData name="German Luis Dagatti" userId="43e7766c8bef1a99" providerId="LiveId" clId="{571E5FA9-B83F-472B-AE41-7DE03044985C}" dt="2025-04-21T02:28:11.641" v="257" actId="34807"/>
+          <ac:spMkLst>
+            <pc:docMk/>
+            <pc:sldMk cId="2830584289" sldId="2573"/>
+            <ac:spMk id="12" creationId="{744CAA32-F237-419C-A2DD-43C28D920D3C}"/>
+          </ac:spMkLst>
+        </pc:spChg>
+        <pc:picChg chg="mod ord">
+          <ac:chgData name="German Luis Dagatti" userId="43e7766c8bef1a99" providerId="LiveId" clId="{571E5FA9-B83F-472B-AE41-7DE03044985C}" dt="2025-04-21T02:28:11.641" v="257" actId="34807"/>
+          <ac:picMkLst>
+            <pc:docMk/>
+            <pc:sldMk cId="2830584289" sldId="2573"/>
+            <ac:picMk id="5" creationId="{D133274C-E249-4069-A6F5-75F52A6A7028}"/>
+          </ac:picMkLst>
+        </pc:picChg>
+        <pc:cxnChg chg="add del">
+          <ac:chgData name="German Luis Dagatti" userId="43e7766c8bef1a99" providerId="LiveId" clId="{571E5FA9-B83F-472B-AE41-7DE03044985C}" dt="2025-04-21T02:28:11.641" v="257" actId="34807"/>
+          <ac:cxnSpMkLst>
+            <pc:docMk/>
+            <pc:sldMk cId="2830584289" sldId="2573"/>
+            <ac:cxnSpMk id="10" creationId="{118E06E4-607B-144B-382B-AD3D06B1EE8C}"/>
+          </ac:cxnSpMkLst>
+        </pc:cxnChg>
+        <pc:cxnChg chg="add del">
+          <ac:chgData name="German Luis Dagatti" userId="43e7766c8bef1a99" providerId="LiveId" clId="{571E5FA9-B83F-472B-AE41-7DE03044985C}" dt="2025-04-21T02:28:11.641" v="257" actId="34807"/>
+          <ac:cxnSpMkLst>
+            <pc:docMk/>
+            <pc:sldMk cId="2830584289" sldId="2573"/>
+            <ac:cxnSpMk id="14" creationId="{92025DBA-8780-9CA0-2826-FF6E3BD1A0C9}"/>
+          </ac:cxnSpMkLst>
+        </pc:cxnChg>
+      </pc:sldChg>
+      <pc:sldChg chg="addSp delSp modSp add del mod modTransition setBg modClrScheme addAnim delAnim chgLayout">
+        <pc:chgData name="German Luis Dagatti" userId="43e7766c8bef1a99" providerId="LiveId" clId="{571E5FA9-B83F-472B-AE41-7DE03044985C}" dt="2025-04-21T02:28:11.641" v="257" actId="34807"/>
+        <pc:sldMkLst>
+          <pc:docMk/>
+          <pc:sldMk cId="1874111297" sldId="2574"/>
+        </pc:sldMkLst>
+        <pc:spChg chg="mod">
+          <ac:chgData name="German Luis Dagatti" userId="43e7766c8bef1a99" providerId="LiveId" clId="{571E5FA9-B83F-472B-AE41-7DE03044985C}" dt="2025-04-21T02:28:11.641" v="257" actId="34807"/>
+          <ac:spMkLst>
+            <pc:docMk/>
+            <pc:sldMk cId="1874111297" sldId="2574"/>
+            <ac:spMk id="2" creationId="{22DB6140-65D2-F4C4-FC43-6073827177A0}"/>
+          </ac:spMkLst>
+        </pc:spChg>
+        <pc:spChg chg="add del">
+          <ac:chgData name="German Luis Dagatti" userId="43e7766c8bef1a99" providerId="LiveId" clId="{571E5FA9-B83F-472B-AE41-7DE03044985C}" dt="2025-04-21T02:28:11.641" v="257" actId="34807"/>
+          <ac:spMkLst>
+            <pc:docMk/>
+            <pc:sldMk cId="1874111297" sldId="2574"/>
+            <ac:spMk id="7" creationId="{46B9231A-B34B-4A29-A6AC-532E1EE81575}"/>
+          </ac:spMkLst>
+        </pc:spChg>
+        <pc:spChg chg="add del">
+          <ac:chgData name="German Luis Dagatti" userId="43e7766c8bef1a99" providerId="LiveId" clId="{571E5FA9-B83F-472B-AE41-7DE03044985C}" dt="2025-04-21T02:28:11.641" v="257" actId="34807"/>
+          <ac:spMkLst>
+            <pc:docMk/>
+            <pc:sldMk cId="1874111297" sldId="2574"/>
+            <ac:spMk id="9" creationId="{19F9BF86-FE94-4517-B97D-026C7515E589}"/>
+          </ac:spMkLst>
+        </pc:spChg>
+        <pc:cxnChg chg="add del">
+          <ac:chgData name="German Luis Dagatti" userId="43e7766c8bef1a99" providerId="LiveId" clId="{571E5FA9-B83F-472B-AE41-7DE03044985C}" dt="2025-04-21T02:28:11.641" v="257" actId="34807"/>
+          <ac:cxnSpMkLst>
+            <pc:docMk/>
+            <pc:sldMk cId="1874111297" sldId="2574"/>
+            <ac:cxnSpMk id="11" creationId="{53C0BBAA-A5EC-5D5D-32E6-9F7EA6048489}"/>
+          </ac:cxnSpMkLst>
+        </pc:cxnChg>
+      </pc:sldChg>
+      <pc:sldChg chg="addSp delSp modSp add del mod modTransition setBg modClrScheme chgLayout">
+        <pc:chgData name="German Luis Dagatti" userId="43e7766c8bef1a99" providerId="LiveId" clId="{571E5FA9-B83F-472B-AE41-7DE03044985C}" dt="2025-04-21T02:37:57.584" v="276" actId="34807"/>
+        <pc:sldMkLst>
+          <pc:docMk/>
+          <pc:sldMk cId="3696758575" sldId="2574"/>
+        </pc:sldMkLst>
+        <pc:spChg chg="mod">
+          <ac:chgData name="German Luis Dagatti" userId="43e7766c8bef1a99" providerId="LiveId" clId="{571E5FA9-B83F-472B-AE41-7DE03044985C}" dt="2025-04-21T02:37:57.584" v="276" actId="34807"/>
+          <ac:spMkLst>
+            <pc:docMk/>
+            <pc:sldMk cId="3696758575" sldId="2574"/>
+            <ac:spMk id="2" creationId="{54AF88AF-0BB1-33D3-CAAB-8B3DF3F7256C}"/>
+          </ac:spMkLst>
+        </pc:spChg>
+        <pc:spChg chg="add del">
+          <ac:chgData name="German Luis Dagatti" userId="43e7766c8bef1a99" providerId="LiveId" clId="{571E5FA9-B83F-472B-AE41-7DE03044985C}" dt="2025-04-21T02:37:57.584" v="276" actId="34807"/>
+          <ac:spMkLst>
+            <pc:docMk/>
+            <pc:sldMk cId="3696758575" sldId="2574"/>
+            <ac:spMk id="3" creationId="{3CA11935-6BC2-8195-B507-80282E9737DE}"/>
+          </ac:spMkLst>
+        </pc:spChg>
+        <pc:spChg chg="add del">
+          <ac:chgData name="German Luis Dagatti" userId="43e7766c8bef1a99" providerId="LiveId" clId="{571E5FA9-B83F-472B-AE41-7DE03044985C}" dt="2025-04-21T02:37:57.584" v="276" actId="34807"/>
+          <ac:spMkLst>
+            <pc:docMk/>
+            <pc:sldMk cId="3696758575" sldId="2574"/>
+            <ac:spMk id="8" creationId="{DBDA151C-5770-45E4-AAFF-59E7F403866D}"/>
+          </ac:spMkLst>
+        </pc:spChg>
+        <pc:graphicFrameChg chg="add del mod">
+          <ac:chgData name="German Luis Dagatti" userId="43e7766c8bef1a99" providerId="LiveId" clId="{571E5FA9-B83F-472B-AE41-7DE03044985C}" dt="2025-04-21T02:37:57.584" v="276" actId="34807"/>
+          <ac:graphicFrameMkLst>
+            <pc:docMk/>
+            <pc:sldMk cId="3696758575" sldId="2574"/>
+            <ac:graphicFrameMk id="11" creationId="{E410CA96-A495-9409-4E64-30D9130B8955}"/>
+          </ac:graphicFrameMkLst>
+        </pc:graphicFrameChg>
+        <pc:cxnChg chg="add del">
+          <ac:chgData name="German Luis Dagatti" userId="43e7766c8bef1a99" providerId="LiveId" clId="{571E5FA9-B83F-472B-AE41-7DE03044985C}" dt="2025-04-21T02:37:57.584" v="276" actId="34807"/>
+          <ac:cxnSpMkLst>
+            <pc:docMk/>
+            <pc:sldMk cId="3696758575" sldId="2574"/>
+            <ac:cxnSpMk id="10" creationId="{F21FC8CC-145C-8745-889B-6521F9CCB628}"/>
+          </ac:cxnSpMkLst>
+        </pc:cxnChg>
+      </pc:sldChg>
+      <pc:sldChg chg="addSp delSp modSp add del mod modTransition setBg modClrScheme addAnim delAnim chgLayout">
+        <pc:chgData name="German Luis Dagatti" userId="43e7766c8bef1a99" providerId="LiveId" clId="{571E5FA9-B83F-472B-AE41-7DE03044985C}" dt="2025-04-21T02:28:11.641" v="257" actId="34807"/>
+        <pc:sldMkLst>
+          <pc:docMk/>
+          <pc:sldMk cId="3410171415" sldId="2575"/>
+        </pc:sldMkLst>
+        <pc:spChg chg="mod">
+          <ac:chgData name="German Luis Dagatti" userId="43e7766c8bef1a99" providerId="LiveId" clId="{571E5FA9-B83F-472B-AE41-7DE03044985C}" dt="2025-04-21T02:28:11.641" v="257" actId="34807"/>
+          <ac:spMkLst>
+            <pc:docMk/>
+            <pc:sldMk cId="3410171415" sldId="2575"/>
+            <ac:spMk id="2" creationId="{C8EB677E-2715-B88B-E496-1DF33183A260}"/>
+          </ac:spMkLst>
+        </pc:spChg>
+        <pc:spChg chg="mod">
+          <ac:chgData name="German Luis Dagatti" userId="43e7766c8bef1a99" providerId="LiveId" clId="{571E5FA9-B83F-472B-AE41-7DE03044985C}" dt="2025-04-21T02:28:11.641" v="257" actId="34807"/>
+          <ac:spMkLst>
+            <pc:docMk/>
+            <pc:sldMk cId="3410171415" sldId="2575"/>
+            <ac:spMk id="4" creationId="{A1B92CC0-6207-154D-7318-9F8FF0D6DE63}"/>
+          </ac:spMkLst>
+        </pc:spChg>
+        <pc:spChg chg="add del">
+          <ac:chgData name="German Luis Dagatti" userId="43e7766c8bef1a99" providerId="LiveId" clId="{571E5FA9-B83F-472B-AE41-7DE03044985C}" dt="2025-04-21T02:28:11.641" v="257" actId="34807"/>
+          <ac:spMkLst>
+            <pc:docMk/>
+            <pc:sldMk cId="3410171415" sldId="2575"/>
+            <ac:spMk id="12" creationId="{744CAA32-F237-419C-A2DD-43C28D920D3C}"/>
+          </ac:spMkLst>
+        </pc:spChg>
+        <pc:picChg chg="mod">
+          <ac:chgData name="German Luis Dagatti" userId="43e7766c8bef1a99" providerId="LiveId" clId="{571E5FA9-B83F-472B-AE41-7DE03044985C}" dt="2025-04-21T02:28:11.641" v="257" actId="34807"/>
+          <ac:picMkLst>
+            <pc:docMk/>
+            <pc:sldMk cId="3410171415" sldId="2575"/>
+            <ac:picMk id="5" creationId="{17E2DE59-A7EE-4207-84B0-57AF466BF2B1}"/>
+          </ac:picMkLst>
+        </pc:picChg>
+        <pc:cxnChg chg="add del">
+          <ac:chgData name="German Luis Dagatti" userId="43e7766c8bef1a99" providerId="LiveId" clId="{571E5FA9-B83F-472B-AE41-7DE03044985C}" dt="2025-04-21T02:28:11.641" v="257" actId="34807"/>
+          <ac:cxnSpMkLst>
+            <pc:docMk/>
+            <pc:sldMk cId="3410171415" sldId="2575"/>
+            <ac:cxnSpMk id="10" creationId="{118E06E4-607B-144B-382B-AD3D06B1EE8C}"/>
+          </ac:cxnSpMkLst>
+        </pc:cxnChg>
+        <pc:cxnChg chg="add del">
+          <ac:chgData name="German Luis Dagatti" userId="43e7766c8bef1a99" providerId="LiveId" clId="{571E5FA9-B83F-472B-AE41-7DE03044985C}" dt="2025-04-21T02:28:11.641" v="257" actId="34807"/>
+          <ac:cxnSpMkLst>
+            <pc:docMk/>
+            <pc:sldMk cId="3410171415" sldId="2575"/>
+            <ac:cxnSpMk id="14" creationId="{08052531-D50B-3899-B150-D05525F4F2BC}"/>
+          </ac:cxnSpMkLst>
+        </pc:cxnChg>
+      </pc:sldChg>
+      <pc:sldChg chg="addSp delSp modSp add del mod modTransition setBg modClrScheme addAnim delAnim chgLayout">
+        <pc:chgData name="German Luis Dagatti" userId="43e7766c8bef1a99" providerId="LiveId" clId="{571E5FA9-B83F-472B-AE41-7DE03044985C}" dt="2025-04-21T02:28:11.641" v="257" actId="34807"/>
+        <pc:sldMkLst>
+          <pc:docMk/>
+          <pc:sldMk cId="1142579137" sldId="2576"/>
+        </pc:sldMkLst>
+        <pc:spChg chg="mod">
+          <ac:chgData name="German Luis Dagatti" userId="43e7766c8bef1a99" providerId="LiveId" clId="{571E5FA9-B83F-472B-AE41-7DE03044985C}" dt="2025-04-21T02:28:11.641" v="257" actId="34807"/>
+          <ac:spMkLst>
+            <pc:docMk/>
+            <pc:sldMk cId="1142579137" sldId="2576"/>
+            <ac:spMk id="2" creationId="{0BEC183B-42B3-6918-6107-6D0E0D283928}"/>
+          </ac:spMkLst>
+        </pc:spChg>
+        <pc:spChg chg="mod">
+          <ac:chgData name="German Luis Dagatti" userId="43e7766c8bef1a99" providerId="LiveId" clId="{571E5FA9-B83F-472B-AE41-7DE03044985C}" dt="2025-04-21T02:28:11.641" v="257" actId="34807"/>
+          <ac:spMkLst>
+            <pc:docMk/>
+            <pc:sldMk cId="1142579137" sldId="2576"/>
+            <ac:spMk id="4" creationId="{59461783-3855-ECEE-20EF-1CA163C4F266}"/>
+          </ac:spMkLst>
+        </pc:spChg>
+        <pc:spChg chg="add del">
+          <ac:chgData name="German Luis Dagatti" userId="43e7766c8bef1a99" providerId="LiveId" clId="{571E5FA9-B83F-472B-AE41-7DE03044985C}" dt="2025-04-21T02:28:11.641" v="257" actId="34807"/>
+          <ac:spMkLst>
+            <pc:docMk/>
+            <pc:sldMk cId="1142579137" sldId="2576"/>
+            <ac:spMk id="12" creationId="{744CAA32-F237-419C-A2DD-43C28D920D3C}"/>
+          </ac:spMkLst>
+        </pc:spChg>
+        <pc:picChg chg="mod">
+          <ac:chgData name="German Luis Dagatti" userId="43e7766c8bef1a99" providerId="LiveId" clId="{571E5FA9-B83F-472B-AE41-7DE03044985C}" dt="2025-04-21T02:28:11.641" v="257" actId="34807"/>
+          <ac:picMkLst>
+            <pc:docMk/>
+            <pc:sldMk cId="1142579137" sldId="2576"/>
+            <ac:picMk id="5" creationId="{FD06A6EB-E450-4E0E-A2B6-BB1DD731FAFD}"/>
+          </ac:picMkLst>
+        </pc:picChg>
+        <pc:cxnChg chg="add del">
+          <ac:chgData name="German Luis Dagatti" userId="43e7766c8bef1a99" providerId="LiveId" clId="{571E5FA9-B83F-472B-AE41-7DE03044985C}" dt="2025-04-21T02:28:11.641" v="257" actId="34807"/>
+          <ac:cxnSpMkLst>
+            <pc:docMk/>
+            <pc:sldMk cId="1142579137" sldId="2576"/>
+            <ac:cxnSpMk id="10" creationId="{118E06E4-607B-144B-382B-AD3D06B1EE8C}"/>
+          </ac:cxnSpMkLst>
+        </pc:cxnChg>
+        <pc:cxnChg chg="add del">
+          <ac:chgData name="German Luis Dagatti" userId="43e7766c8bef1a99" providerId="LiveId" clId="{571E5FA9-B83F-472B-AE41-7DE03044985C}" dt="2025-04-21T02:28:11.641" v="257" actId="34807"/>
+          <ac:cxnSpMkLst>
+            <pc:docMk/>
+            <pc:sldMk cId="1142579137" sldId="2576"/>
+            <ac:cxnSpMk id="14" creationId="{08052531-D50B-3899-B150-D05525F4F2BC}"/>
+          </ac:cxnSpMkLst>
+        </pc:cxnChg>
+      </pc:sldChg>
+      <pc:sldChg chg="addSp delSp modSp add del mod modTransition setBg modClrScheme chgLayout">
+        <pc:chgData name="German Luis Dagatti" userId="43e7766c8bef1a99" providerId="LiveId" clId="{571E5FA9-B83F-472B-AE41-7DE03044985C}" dt="2025-04-21T02:28:11.641" v="257" actId="34807"/>
+        <pc:sldMkLst>
+          <pc:docMk/>
+          <pc:sldMk cId="577960794" sldId="2577"/>
+        </pc:sldMkLst>
+        <pc:spChg chg="mod">
+          <ac:chgData name="German Luis Dagatti" userId="43e7766c8bef1a99" providerId="LiveId" clId="{571E5FA9-B83F-472B-AE41-7DE03044985C}" dt="2025-04-21T02:28:11.641" v="257" actId="34807"/>
+          <ac:spMkLst>
+            <pc:docMk/>
+            <pc:sldMk cId="577960794" sldId="2577"/>
+            <ac:spMk id="2" creationId="{E7C19BB7-821C-F5DB-A92B-AA72D43E50D3}"/>
+          </ac:spMkLst>
+        </pc:spChg>
+        <pc:spChg chg="add del">
+          <ac:chgData name="German Luis Dagatti" userId="43e7766c8bef1a99" providerId="LiveId" clId="{571E5FA9-B83F-472B-AE41-7DE03044985C}" dt="2025-04-21T02:28:11.641" v="257" actId="34807"/>
+          <ac:spMkLst>
+            <pc:docMk/>
+            <pc:sldMk cId="577960794" sldId="2577"/>
+            <ac:spMk id="9" creationId="{1653AE3C-AC4F-907C-B473-B9A30D21506F}"/>
+          </ac:spMkLst>
+        </pc:spChg>
+        <pc:graphicFrameChg chg="mod modGraphic">
+          <ac:chgData name="German Luis Dagatti" userId="43e7766c8bef1a99" providerId="LiveId" clId="{571E5FA9-B83F-472B-AE41-7DE03044985C}" dt="2025-04-21T02:28:11.641" v="257" actId="34807"/>
+          <ac:graphicFrameMkLst>
+            <pc:docMk/>
+            <pc:sldMk cId="577960794" sldId="2577"/>
+            <ac:graphicFrameMk id="4" creationId="{D48BD6C8-19A4-4367-B76F-1799AAA1C460}"/>
+          </ac:graphicFrameMkLst>
+        </pc:graphicFrameChg>
+      </pc:sldChg>
+      <pc:sldChg chg="addSp delSp modSp add del mod modTransition setBg modClrScheme chgLayout">
+        <pc:chgData name="German Luis Dagatti" userId="43e7766c8bef1a99" providerId="LiveId" clId="{571E5FA9-B83F-472B-AE41-7DE03044985C}" dt="2025-04-21T02:28:11.641" v="257" actId="34807"/>
+        <pc:sldMkLst>
+          <pc:docMk/>
+          <pc:sldMk cId="494232822" sldId="2578"/>
+        </pc:sldMkLst>
+        <pc:spChg chg="mod">
+          <ac:chgData name="German Luis Dagatti" userId="43e7766c8bef1a99" providerId="LiveId" clId="{571E5FA9-B83F-472B-AE41-7DE03044985C}" dt="2025-04-21T02:28:11.641" v="257" actId="34807"/>
+          <ac:spMkLst>
+            <pc:docMk/>
+            <pc:sldMk cId="494232822" sldId="2578"/>
+            <ac:spMk id="2" creationId="{6B937394-9271-0846-1D42-C8E892D874E3}"/>
+          </ac:spMkLst>
+        </pc:spChg>
+        <pc:spChg chg="add del">
+          <ac:chgData name="German Luis Dagatti" userId="43e7766c8bef1a99" providerId="LiveId" clId="{571E5FA9-B83F-472B-AE41-7DE03044985C}" dt="2025-04-21T02:28:11.641" v="257" actId="34807"/>
+          <ac:spMkLst>
+            <pc:docMk/>
+            <pc:sldMk cId="494232822" sldId="2578"/>
+            <ac:spMk id="3" creationId="{8EB5E2AA-2B95-6491-5096-EE2F9EF12E86}"/>
+          </ac:spMkLst>
+        </pc:spChg>
+        <pc:spChg chg="add del">
+          <ac:chgData name="German Luis Dagatti" userId="43e7766c8bef1a99" providerId="LiveId" clId="{571E5FA9-B83F-472B-AE41-7DE03044985C}" dt="2025-04-21T02:28:11.641" v="257" actId="34807"/>
+          <ac:spMkLst>
+            <pc:docMk/>
+            <pc:sldMk cId="494232822" sldId="2578"/>
+            <ac:spMk id="8" creationId="{DBDA151C-5770-45E4-AAFF-59E7F403866D}"/>
+          </ac:spMkLst>
+        </pc:spChg>
+        <pc:graphicFrameChg chg="add del mod">
+          <ac:chgData name="German Luis Dagatti" userId="43e7766c8bef1a99" providerId="LiveId" clId="{571E5FA9-B83F-472B-AE41-7DE03044985C}" dt="2025-04-21T02:28:11.641" v="257" actId="34807"/>
+          <ac:graphicFrameMkLst>
+            <pc:docMk/>
+            <pc:sldMk cId="494232822" sldId="2578"/>
+            <ac:graphicFrameMk id="11" creationId="{74CF4BBB-E756-EBB9-3153-555866B20EE5}"/>
+          </ac:graphicFrameMkLst>
+        </pc:graphicFrameChg>
+        <pc:cxnChg chg="add del">
+          <ac:chgData name="German Luis Dagatti" userId="43e7766c8bef1a99" providerId="LiveId" clId="{571E5FA9-B83F-472B-AE41-7DE03044985C}" dt="2025-04-21T02:28:11.641" v="257" actId="34807"/>
+          <ac:cxnSpMkLst>
+            <pc:docMk/>
+            <pc:sldMk cId="494232822" sldId="2578"/>
+            <ac:cxnSpMk id="10" creationId="{F21FC8CC-145C-8745-889B-6521F9CCB628}"/>
+          </ac:cxnSpMkLst>
+        </pc:cxnChg>
+      </pc:sldChg>
+      <pc:sldMasterChg chg="add del addSldLayout delSldLayout">
+        <pc:chgData name="German Luis Dagatti" userId="43e7766c8bef1a99" providerId="LiveId" clId="{571E5FA9-B83F-472B-AE41-7DE03044985C}" dt="2025-04-21T02:37:57.584" v="276" actId="34807"/>
+        <pc:sldMasterMkLst>
+          <pc:docMk/>
+          <pc:sldMasterMk cId="2074117897" sldId="2147483672"/>
+        </pc:sldMasterMkLst>
+        <pc:sldLayoutChg chg="add del">
+          <pc:chgData name="German Luis Dagatti" userId="43e7766c8bef1a99" providerId="LiveId" clId="{571E5FA9-B83F-472B-AE41-7DE03044985C}" dt="2025-04-21T02:37:57.584" v="276" actId="34807"/>
+          <pc:sldLayoutMkLst>
+            <pc:docMk/>
+            <pc:sldMasterMk cId="2074117897" sldId="2147483672"/>
+            <pc:sldLayoutMk cId="2605275295" sldId="2147483673"/>
+          </pc:sldLayoutMkLst>
+        </pc:sldLayoutChg>
+        <pc:sldLayoutChg chg="add del">
+          <pc:chgData name="German Luis Dagatti" userId="43e7766c8bef1a99" providerId="LiveId" clId="{571E5FA9-B83F-472B-AE41-7DE03044985C}" dt="2025-04-21T02:37:57.584" v="276" actId="34807"/>
+          <pc:sldLayoutMkLst>
+            <pc:docMk/>
+            <pc:sldMasterMk cId="2074117897" sldId="2147483672"/>
+            <pc:sldLayoutMk cId="2726691501" sldId="2147483674"/>
+          </pc:sldLayoutMkLst>
+        </pc:sldLayoutChg>
+        <pc:sldLayoutChg chg="add del">
+          <pc:chgData name="German Luis Dagatti" userId="43e7766c8bef1a99" providerId="LiveId" clId="{571E5FA9-B83F-472B-AE41-7DE03044985C}" dt="2025-04-21T02:37:57.584" v="276" actId="34807"/>
+          <pc:sldLayoutMkLst>
+            <pc:docMk/>
+            <pc:sldMasterMk cId="2074117897" sldId="2147483672"/>
+            <pc:sldLayoutMk cId="3065686196" sldId="2147483675"/>
+          </pc:sldLayoutMkLst>
+        </pc:sldLayoutChg>
+        <pc:sldLayoutChg chg="add del">
+          <pc:chgData name="German Luis Dagatti" userId="43e7766c8bef1a99" providerId="LiveId" clId="{571E5FA9-B83F-472B-AE41-7DE03044985C}" dt="2025-04-21T02:37:57.584" v="276" actId="34807"/>
+          <pc:sldLayoutMkLst>
+            <pc:docMk/>
+            <pc:sldMasterMk cId="2074117897" sldId="2147483672"/>
+            <pc:sldLayoutMk cId="2462813230" sldId="2147483676"/>
+          </pc:sldLayoutMkLst>
+        </pc:sldLayoutChg>
+        <pc:sldLayoutChg chg="add del">
+          <pc:chgData name="German Luis Dagatti" userId="43e7766c8bef1a99" providerId="LiveId" clId="{571E5FA9-B83F-472B-AE41-7DE03044985C}" dt="2025-04-21T02:37:57.584" v="276" actId="34807"/>
+          <pc:sldLayoutMkLst>
+            <pc:docMk/>
+            <pc:sldMasterMk cId="2074117897" sldId="2147483672"/>
+            <pc:sldLayoutMk cId="4162792756" sldId="2147483677"/>
+          </pc:sldLayoutMkLst>
+        </pc:sldLayoutChg>
+        <pc:sldLayoutChg chg="add del">
+          <pc:chgData name="German Luis Dagatti" userId="43e7766c8bef1a99" providerId="LiveId" clId="{571E5FA9-B83F-472B-AE41-7DE03044985C}" dt="2025-04-21T02:37:57.584" v="276" actId="34807"/>
+          <pc:sldLayoutMkLst>
+            <pc:docMk/>
+            <pc:sldMasterMk cId="2074117897" sldId="2147483672"/>
+            <pc:sldLayoutMk cId="247753675" sldId="2147483678"/>
+          </pc:sldLayoutMkLst>
+        </pc:sldLayoutChg>
+        <pc:sldLayoutChg chg="add del">
+          <pc:chgData name="German Luis Dagatti" userId="43e7766c8bef1a99" providerId="LiveId" clId="{571E5FA9-B83F-472B-AE41-7DE03044985C}" dt="2025-04-21T02:37:57.584" v="276" actId="34807"/>
+          <pc:sldLayoutMkLst>
+            <pc:docMk/>
+            <pc:sldMasterMk cId="2074117897" sldId="2147483672"/>
+            <pc:sldLayoutMk cId="3425077133" sldId="2147483679"/>
+          </pc:sldLayoutMkLst>
+        </pc:sldLayoutChg>
+        <pc:sldLayoutChg chg="add del">
+          <pc:chgData name="German Luis Dagatti" userId="43e7766c8bef1a99" providerId="LiveId" clId="{571E5FA9-B83F-472B-AE41-7DE03044985C}" dt="2025-04-21T02:37:57.584" v="276" actId="34807"/>
+          <pc:sldLayoutMkLst>
+            <pc:docMk/>
+            <pc:sldMasterMk cId="2074117897" sldId="2147483672"/>
+            <pc:sldLayoutMk cId="1673958872" sldId="2147483680"/>
+          </pc:sldLayoutMkLst>
+        </pc:sldLayoutChg>
+        <pc:sldLayoutChg chg="add del">
+          <pc:chgData name="German Luis Dagatti" userId="43e7766c8bef1a99" providerId="LiveId" clId="{571E5FA9-B83F-472B-AE41-7DE03044985C}" dt="2025-04-21T02:37:57.584" v="276" actId="34807"/>
+          <pc:sldLayoutMkLst>
+            <pc:docMk/>
+            <pc:sldMasterMk cId="2074117897" sldId="2147483672"/>
+            <pc:sldLayoutMk cId="1566748288" sldId="2147483681"/>
+          </pc:sldLayoutMkLst>
+        </pc:sldLayoutChg>
+        <pc:sldLayoutChg chg="add del">
+          <pc:chgData name="German Luis Dagatti" userId="43e7766c8bef1a99" providerId="LiveId" clId="{571E5FA9-B83F-472B-AE41-7DE03044985C}" dt="2025-04-21T02:37:57.584" v="276" actId="34807"/>
+          <pc:sldLayoutMkLst>
+            <pc:docMk/>
+            <pc:sldMasterMk cId="2074117897" sldId="2147483672"/>
+            <pc:sldLayoutMk cId="556818456" sldId="2147483682"/>
+          </pc:sldLayoutMkLst>
+        </pc:sldLayoutChg>
+        <pc:sldLayoutChg chg="add del">
+          <pc:chgData name="German Luis Dagatti" userId="43e7766c8bef1a99" providerId="LiveId" clId="{571E5FA9-B83F-472B-AE41-7DE03044985C}" dt="2025-04-21T02:37:57.584" v="276" actId="34807"/>
+          <pc:sldLayoutMkLst>
+            <pc:docMk/>
+            <pc:sldMasterMk cId="2074117897" sldId="2147483672"/>
+            <pc:sldLayoutMk cId="557613036" sldId="2147483683"/>
+          </pc:sldLayoutMkLst>
+        </pc:sldLayoutChg>
+      </pc:sldMasterChg>
+      <pc:sldMasterChg chg="add del setBg addSldLayout delSldLayout modSldLayout">
+        <pc:chgData name="German Luis Dagatti" userId="43e7766c8bef1a99" providerId="LiveId" clId="{571E5FA9-B83F-472B-AE41-7DE03044985C}" dt="2025-04-21T02:37:57.584" v="276" actId="34807"/>
+        <pc:sldMasterMkLst>
+          <pc:docMk/>
+          <pc:sldMasterMk cId="2412639180" sldId="2147483684"/>
+        </pc:sldMasterMkLst>
+        <pc:sldLayoutChg chg="add del setBg">
+          <pc:chgData name="German Luis Dagatti" userId="43e7766c8bef1a99" providerId="LiveId" clId="{571E5FA9-B83F-472B-AE41-7DE03044985C}" dt="2025-04-21T02:37:57.584" v="276" actId="34807"/>
+          <pc:sldLayoutMkLst>
+            <pc:docMk/>
+            <pc:sldMasterMk cId="2412639180" sldId="2147483684"/>
+            <pc:sldLayoutMk cId="2453575396" sldId="2147483685"/>
+          </pc:sldLayoutMkLst>
+        </pc:sldLayoutChg>
+        <pc:sldLayoutChg chg="add del setBg">
+          <pc:chgData name="German Luis Dagatti" userId="43e7766c8bef1a99" providerId="LiveId" clId="{571E5FA9-B83F-472B-AE41-7DE03044985C}" dt="2025-04-21T02:37:57.584" v="276" actId="34807"/>
+          <pc:sldLayoutMkLst>
+            <pc:docMk/>
+            <pc:sldMasterMk cId="2412639180" sldId="2147483684"/>
+            <pc:sldLayoutMk cId="3508646156" sldId="2147483686"/>
+          </pc:sldLayoutMkLst>
+        </pc:sldLayoutChg>
+        <pc:sldLayoutChg chg="add del setBg">
+          <pc:chgData name="German Luis Dagatti" userId="43e7766c8bef1a99" providerId="LiveId" clId="{571E5FA9-B83F-472B-AE41-7DE03044985C}" dt="2025-04-21T02:37:57.584" v="276" actId="34807"/>
+          <pc:sldLayoutMkLst>
+            <pc:docMk/>
+            <pc:sldMasterMk cId="2412639180" sldId="2147483684"/>
+            <pc:sldLayoutMk cId="4022080903" sldId="2147483687"/>
+          </pc:sldLayoutMkLst>
+        </pc:sldLayoutChg>
+        <pc:sldLayoutChg chg="add del setBg">
+          <pc:chgData name="German Luis Dagatti" userId="43e7766c8bef1a99" providerId="LiveId" clId="{571E5FA9-B83F-472B-AE41-7DE03044985C}" dt="2025-04-21T02:37:57.584" v="276" actId="34807"/>
+          <pc:sldLayoutMkLst>
+            <pc:docMk/>
+            <pc:sldMasterMk cId="2412639180" sldId="2147483684"/>
+            <pc:sldLayoutMk cId="286364649" sldId="2147483688"/>
+          </pc:sldLayoutMkLst>
+        </pc:sldLayoutChg>
+        <pc:sldLayoutChg chg="add del setBg">
+          <pc:chgData name="German Luis Dagatti" userId="43e7766c8bef1a99" providerId="LiveId" clId="{571E5FA9-B83F-472B-AE41-7DE03044985C}" dt="2025-04-21T02:37:57.584" v="276" actId="34807"/>
+          <pc:sldLayoutMkLst>
+            <pc:docMk/>
+            <pc:sldMasterMk cId="2412639180" sldId="2147483684"/>
+            <pc:sldLayoutMk cId="3396236702" sldId="2147483689"/>
+          </pc:sldLayoutMkLst>
+        </pc:sldLayoutChg>
+        <pc:sldLayoutChg chg="add del setBg">
+          <pc:chgData name="German Luis Dagatti" userId="43e7766c8bef1a99" providerId="LiveId" clId="{571E5FA9-B83F-472B-AE41-7DE03044985C}" dt="2025-04-21T02:37:57.584" v="276" actId="34807"/>
+          <pc:sldLayoutMkLst>
+            <pc:docMk/>
+            <pc:sldMasterMk cId="2412639180" sldId="2147483684"/>
+            <pc:sldLayoutMk cId="680994167" sldId="2147483690"/>
+          </pc:sldLayoutMkLst>
+        </pc:sldLayoutChg>
+        <pc:sldLayoutChg chg="add del setBg">
+          <pc:chgData name="German Luis Dagatti" userId="43e7766c8bef1a99" providerId="LiveId" clId="{571E5FA9-B83F-472B-AE41-7DE03044985C}" dt="2025-04-21T02:37:57.584" v="276" actId="34807"/>
+          <pc:sldLayoutMkLst>
+            <pc:docMk/>
+            <pc:sldMasterMk cId="2412639180" sldId="2147483684"/>
+            <pc:sldLayoutMk cId="3507216380" sldId="2147483691"/>
+          </pc:sldLayoutMkLst>
+        </pc:sldLayoutChg>
+        <pc:sldLayoutChg chg="add del setBg">
+          <pc:chgData name="German Luis Dagatti" userId="43e7766c8bef1a99" providerId="LiveId" clId="{571E5FA9-B83F-472B-AE41-7DE03044985C}" dt="2025-04-21T02:37:57.584" v="276" actId="34807"/>
+          <pc:sldLayoutMkLst>
+            <pc:docMk/>
+            <pc:sldMasterMk cId="2412639180" sldId="2147483684"/>
+            <pc:sldLayoutMk cId="1786531764" sldId="2147483692"/>
+          </pc:sldLayoutMkLst>
+        </pc:sldLayoutChg>
+        <pc:sldLayoutChg chg="add del setBg">
+          <pc:chgData name="German Luis Dagatti" userId="43e7766c8bef1a99" providerId="LiveId" clId="{571E5FA9-B83F-472B-AE41-7DE03044985C}" dt="2025-04-21T02:37:57.584" v="276" actId="34807"/>
+          <pc:sldLayoutMkLst>
+            <pc:docMk/>
+            <pc:sldMasterMk cId="2412639180" sldId="2147483684"/>
+            <pc:sldLayoutMk cId="1154561575" sldId="2147483693"/>
+          </pc:sldLayoutMkLst>
+        </pc:sldLayoutChg>
+        <pc:sldLayoutChg chg="add del setBg">
+          <pc:chgData name="German Luis Dagatti" userId="43e7766c8bef1a99" providerId="LiveId" clId="{571E5FA9-B83F-472B-AE41-7DE03044985C}" dt="2025-04-21T02:37:57.584" v="276" actId="34807"/>
+          <pc:sldLayoutMkLst>
+            <pc:docMk/>
+            <pc:sldMasterMk cId="2412639180" sldId="2147483684"/>
+            <pc:sldLayoutMk cId="2379734630" sldId="2147483694"/>
+          </pc:sldLayoutMkLst>
+        </pc:sldLayoutChg>
+        <pc:sldLayoutChg chg="add del setBg">
+          <pc:chgData name="German Luis Dagatti" userId="43e7766c8bef1a99" providerId="LiveId" clId="{571E5FA9-B83F-472B-AE41-7DE03044985C}" dt="2025-04-21T02:37:57.584" v="276" actId="34807"/>
+          <pc:sldLayoutMkLst>
+            <pc:docMk/>
+            <pc:sldMasterMk cId="2412639180" sldId="2147483684"/>
+            <pc:sldLayoutMk cId="4115543833" sldId="2147483695"/>
+          </pc:sldLayoutMkLst>
+        </pc:sldLayoutChg>
+      </pc:sldMasterChg>
+      <pc:sldMasterChg chg="add del addSldLayout delSldLayout">
+        <pc:chgData name="German Luis Dagatti" userId="43e7766c8bef1a99" providerId="LiveId" clId="{571E5FA9-B83F-472B-AE41-7DE03044985C}" dt="2025-04-21T02:28:11.641" v="257" actId="34807"/>
+        <pc:sldMasterMkLst>
+          <pc:docMk/>
+          <pc:sldMasterMk cId="2554437628" sldId="2147483684"/>
+        </pc:sldMasterMkLst>
+        <pc:sldLayoutChg chg="add del">
+          <pc:chgData name="German Luis Dagatti" userId="43e7766c8bef1a99" providerId="LiveId" clId="{571E5FA9-B83F-472B-AE41-7DE03044985C}" dt="2025-04-21T02:28:11.641" v="257" actId="34807"/>
+          <pc:sldLayoutMkLst>
+            <pc:docMk/>
+            <pc:sldMasterMk cId="2554437628" sldId="2147483684"/>
+            <pc:sldLayoutMk cId="2958924594" sldId="2147483685"/>
+          </pc:sldLayoutMkLst>
+        </pc:sldLayoutChg>
+        <pc:sldLayoutChg chg="add del">
+          <pc:chgData name="German Luis Dagatti" userId="43e7766c8bef1a99" providerId="LiveId" clId="{571E5FA9-B83F-472B-AE41-7DE03044985C}" dt="2025-04-21T02:28:11.641" v="257" actId="34807"/>
+          <pc:sldLayoutMkLst>
+            <pc:docMk/>
+            <pc:sldMasterMk cId="2554437628" sldId="2147483684"/>
+            <pc:sldLayoutMk cId="3842132461" sldId="2147483686"/>
+          </pc:sldLayoutMkLst>
+        </pc:sldLayoutChg>
+        <pc:sldLayoutChg chg="add del">
+          <pc:chgData name="German Luis Dagatti" userId="43e7766c8bef1a99" providerId="LiveId" clId="{571E5FA9-B83F-472B-AE41-7DE03044985C}" dt="2025-04-21T02:28:11.641" v="257" actId="34807"/>
+          <pc:sldLayoutMkLst>
+            <pc:docMk/>
+            <pc:sldMasterMk cId="2554437628" sldId="2147483684"/>
+            <pc:sldLayoutMk cId="1361997327" sldId="2147483687"/>
+          </pc:sldLayoutMkLst>
+        </pc:sldLayoutChg>
+        <pc:sldLayoutChg chg="add del">
+          <pc:chgData name="German Luis Dagatti" userId="43e7766c8bef1a99" providerId="LiveId" clId="{571E5FA9-B83F-472B-AE41-7DE03044985C}" dt="2025-04-21T02:28:11.641" v="257" actId="34807"/>
+          <pc:sldLayoutMkLst>
+            <pc:docMk/>
+            <pc:sldMasterMk cId="2554437628" sldId="2147483684"/>
+            <pc:sldLayoutMk cId="787867863" sldId="2147483688"/>
+          </pc:sldLayoutMkLst>
+        </pc:sldLayoutChg>
+        <pc:sldLayoutChg chg="add del">
+          <pc:chgData name="German Luis Dagatti" userId="43e7766c8bef1a99" providerId="LiveId" clId="{571E5FA9-B83F-472B-AE41-7DE03044985C}" dt="2025-04-21T02:28:11.641" v="257" actId="34807"/>
+          <pc:sldLayoutMkLst>
+            <pc:docMk/>
+            <pc:sldMasterMk cId="2554437628" sldId="2147483684"/>
+            <pc:sldLayoutMk cId="496348569" sldId="2147483689"/>
+          </pc:sldLayoutMkLst>
+        </pc:sldLayoutChg>
+        <pc:sldLayoutChg chg="add del">
+          <pc:chgData name="German Luis Dagatti" userId="43e7766c8bef1a99" providerId="LiveId" clId="{571E5FA9-B83F-472B-AE41-7DE03044985C}" dt="2025-04-21T02:28:11.641" v="257" actId="34807"/>
+          <pc:sldLayoutMkLst>
+            <pc:docMk/>
+            <pc:sldMasterMk cId="2554437628" sldId="2147483684"/>
+            <pc:sldLayoutMk cId="1380580438" sldId="2147483690"/>
+          </pc:sldLayoutMkLst>
+        </pc:sldLayoutChg>
+        <pc:sldLayoutChg chg="add del">
+          <pc:chgData name="German Luis Dagatti" userId="43e7766c8bef1a99" providerId="LiveId" clId="{571E5FA9-B83F-472B-AE41-7DE03044985C}" dt="2025-04-21T02:28:11.641" v="257" actId="34807"/>
+          <pc:sldLayoutMkLst>
+            <pc:docMk/>
+            <pc:sldMasterMk cId="2554437628" sldId="2147483684"/>
+            <pc:sldLayoutMk cId="278226790" sldId="2147483691"/>
+          </pc:sldLayoutMkLst>
+        </pc:sldLayoutChg>
+        <pc:sldLayoutChg chg="add del">
+          <pc:chgData name="German Luis Dagatti" userId="43e7766c8bef1a99" providerId="LiveId" clId="{571E5FA9-B83F-472B-AE41-7DE03044985C}" dt="2025-04-21T02:28:11.641" v="257" actId="34807"/>
+          <pc:sldLayoutMkLst>
+            <pc:docMk/>
+            <pc:sldMasterMk cId="2554437628" sldId="2147483684"/>
+            <pc:sldLayoutMk cId="648664331" sldId="2147483692"/>
+          </pc:sldLayoutMkLst>
+        </pc:sldLayoutChg>
+        <pc:sldLayoutChg chg="add del">
+          <pc:chgData name="German Luis Dagatti" userId="43e7766c8bef1a99" providerId="LiveId" clId="{571E5FA9-B83F-472B-AE41-7DE03044985C}" dt="2025-04-21T02:28:11.641" v="257" actId="34807"/>
+          <pc:sldLayoutMkLst>
+            <pc:docMk/>
+            <pc:sldMasterMk cId="2554437628" sldId="2147483684"/>
+            <pc:sldLayoutMk cId="451397897" sldId="2147483693"/>
+          </pc:sldLayoutMkLst>
+        </pc:sldLayoutChg>
+        <pc:sldLayoutChg chg="add del">
+          <pc:chgData name="German Luis Dagatti" userId="43e7766c8bef1a99" providerId="LiveId" clId="{571E5FA9-B83F-472B-AE41-7DE03044985C}" dt="2025-04-21T02:28:11.641" v="257" actId="34807"/>
+          <pc:sldLayoutMkLst>
+            <pc:docMk/>
+            <pc:sldMasterMk cId="2554437628" sldId="2147483684"/>
+            <pc:sldLayoutMk cId="3595649921" sldId="2147483694"/>
+          </pc:sldLayoutMkLst>
+        </pc:sldLayoutChg>
+        <pc:sldLayoutChg chg="add del">
+          <pc:chgData name="German Luis Dagatti" userId="43e7766c8bef1a99" providerId="LiveId" clId="{571E5FA9-B83F-472B-AE41-7DE03044985C}" dt="2025-04-21T02:28:11.641" v="257" actId="34807"/>
+          <pc:sldLayoutMkLst>
+            <pc:docMk/>
+            <pc:sldMasterMk cId="2554437628" sldId="2147483684"/>
+            <pc:sldLayoutMk cId="3442496965" sldId="2147483695"/>
+          </pc:sldLayoutMkLst>
+        </pc:sldLayoutChg>
+      </pc:sldMasterChg>
     </pc:docChg>
   </pc:docChgLst>
 </pc:chgInfo>
+</file>
+
+<file path=ppt/notesMasters/notesMaster1.xml><?xml version="1.0" encoding="utf-8"?>
+<p:notesMaster xmlns:a="http://schemas.openxmlformats.org/drawingml/2006/main" xmlns:r="http://schemas.openxmlformats.org/officeDocument/2006/relationships" xmlns:p="http://schemas.openxmlformats.org/presentationml/2006/main">
+  <p:cSld>
+    <p:bg>
+      <p:bgRef idx="1001">
+        <a:schemeClr val="bg1"/>
+      </p:bgRef>
+    </p:bg>
+    <p:spTree>
+      <p:nvGrpSpPr>
+        <p:cNvPr id="1" name=""/>
+        <p:cNvGrpSpPr/>
+        <p:nvPr/>
+      </p:nvGrpSpPr>
+      <p:grpSpPr>
+        <a:xfrm>
+          <a:off x="0" y="0"/>
+          <a:ext cx="0" cy="0"/>
+          <a:chOff x="0" y="0"/>
+          <a:chExt cx="0" cy="0"/>
+        </a:xfrm>
+      </p:grpSpPr>
+      <p:sp>
+        <p:nvSpPr>
+          <p:cNvPr id="2" name="Marcador de encabezado 1"/>
+          <p:cNvSpPr>
+            <a:spLocks noGrp="1"/>
+          </p:cNvSpPr>
+          <p:nvPr>
+            <p:ph type="hdr" sz="quarter"/>
+          </p:nvPr>
+        </p:nvSpPr>
+        <p:spPr>
+          <a:xfrm>
+            <a:off x="0" y="0"/>
+            <a:ext cx="2971800" cy="458788"/>
+          </a:xfrm>
+          <a:prstGeom prst="rect">
+            <a:avLst/>
+          </a:prstGeom>
+        </p:spPr>
+        <p:txBody>
+          <a:bodyPr vert="horz" lIns="91440" tIns="45720" rIns="91440" bIns="45720" rtlCol="0"/>
+          <a:lstStyle>
+            <a:lvl1pPr algn="l">
+              <a:defRPr sz="1200"/>
+            </a:lvl1pPr>
+          </a:lstStyle>
+          <a:p>
+            <a:endParaRPr lang="es-AR"/>
+          </a:p>
+        </p:txBody>
+      </p:sp>
+      <p:sp>
+        <p:nvSpPr>
+          <p:cNvPr id="3" name="Marcador de fecha 2"/>
+          <p:cNvSpPr>
+            <a:spLocks noGrp="1"/>
+          </p:cNvSpPr>
+          <p:nvPr>
+            <p:ph type="dt" idx="1"/>
+          </p:nvPr>
+        </p:nvSpPr>
+        <p:spPr>
+          <a:xfrm>
+            <a:off x="3884613" y="0"/>
+            <a:ext cx="2971800" cy="458788"/>
+          </a:xfrm>
+          <a:prstGeom prst="rect">
+            <a:avLst/>
+          </a:prstGeom>
+        </p:spPr>
+        <p:txBody>
+          <a:bodyPr vert="horz" lIns="91440" tIns="45720" rIns="91440" bIns="45720" rtlCol="0"/>
+          <a:lstStyle>
+            <a:lvl1pPr algn="r">
+              <a:defRPr sz="1200"/>
+            </a:lvl1pPr>
+          </a:lstStyle>
+          <a:p>
+            <a:fld id="{0D4D5B49-29D8-4D6B-AF6B-7A1910EF617F}" type="datetimeFigureOut">
+              <a:rPr lang="es-AR" smtClean="0"/>
+              <a:t>20/4/2025</a:t>
+            </a:fld>
+            <a:endParaRPr lang="es-AR"/>
+          </a:p>
+        </p:txBody>
+      </p:sp>
+      <p:sp>
+        <p:nvSpPr>
+          <p:cNvPr id="4" name="Marcador de imagen de diapositiva 3"/>
+          <p:cNvSpPr>
+            <a:spLocks noGrp="1" noRot="1" noChangeAspect="1"/>
+          </p:cNvSpPr>
+          <p:nvPr>
+            <p:ph type="sldImg" idx="2"/>
+          </p:nvPr>
+        </p:nvSpPr>
+        <p:spPr>
+          <a:xfrm>
+            <a:off x="685800" y="1143000"/>
+            <a:ext cx="5486400" cy="3086100"/>
+          </a:xfrm>
+          <a:prstGeom prst="rect">
+            <a:avLst/>
+          </a:prstGeom>
+          <a:noFill/>
+          <a:ln w="12700">
+            <a:solidFill>
+              <a:prstClr val="black"/>
+            </a:solidFill>
+          </a:ln>
+        </p:spPr>
+        <p:txBody>
+          <a:bodyPr vert="horz" lIns="91440" tIns="45720" rIns="91440" bIns="45720" rtlCol="0" anchor="ctr"/>
+          <a:lstStyle/>
+          <a:p>
+            <a:endParaRPr lang="es-AR"/>
+          </a:p>
+        </p:txBody>
+      </p:sp>
+      <p:sp>
+        <p:nvSpPr>
+          <p:cNvPr id="5" name="Marcador de notas 4"/>
+          <p:cNvSpPr>
+            <a:spLocks noGrp="1"/>
+          </p:cNvSpPr>
+          <p:nvPr>
+            <p:ph type="body" sz="quarter" idx="3"/>
+          </p:nvPr>
+        </p:nvSpPr>
+        <p:spPr>
+          <a:xfrm>
+            <a:off x="685800" y="4400550"/>
+            <a:ext cx="5486400" cy="3600450"/>
+          </a:xfrm>
+          <a:prstGeom prst="rect">
+            <a:avLst/>
+          </a:prstGeom>
+        </p:spPr>
+        <p:txBody>
+          <a:bodyPr vert="horz" lIns="91440" tIns="45720" rIns="91440" bIns="45720" rtlCol="0"/>
+          <a:lstStyle/>
+          <a:p>
+            <a:pPr lvl="0"/>
+            <a:r>
+              <a:rPr lang="es-ES"/>
+              <a:t>Haga clic para modificar los estilos de texto del patrón</a:t>
+            </a:r>
+          </a:p>
+          <a:p>
+            <a:pPr lvl="1"/>
+            <a:r>
+              <a:rPr lang="es-ES"/>
+              <a:t>Segundo nivel</a:t>
+            </a:r>
+          </a:p>
+          <a:p>
+            <a:pPr lvl="2"/>
+            <a:r>
+              <a:rPr lang="es-ES"/>
+              <a:t>Tercer nivel</a:t>
+            </a:r>
+          </a:p>
+          <a:p>
+            <a:pPr lvl="3"/>
+            <a:r>
+              <a:rPr lang="es-ES"/>
+              <a:t>Cuarto nivel</a:t>
+            </a:r>
+          </a:p>
+          <a:p>
+            <a:pPr lvl="4"/>
+            <a:r>
+              <a:rPr lang="es-ES"/>
+              <a:t>Quinto nivel</a:t>
+            </a:r>
+            <a:endParaRPr lang="es-AR"/>
+          </a:p>
+        </p:txBody>
+      </p:sp>
+      <p:sp>
+        <p:nvSpPr>
+          <p:cNvPr id="6" name="Marcador de pie de página 5"/>
+          <p:cNvSpPr>
+            <a:spLocks noGrp="1"/>
+          </p:cNvSpPr>
+          <p:nvPr>
+            <p:ph type="ftr" sz="quarter" idx="4"/>
+          </p:nvPr>
+        </p:nvSpPr>
+        <p:spPr>
+          <a:xfrm>
+            <a:off x="0" y="8685213"/>
+            <a:ext cx="2971800" cy="458787"/>
+          </a:xfrm>
+          <a:prstGeom prst="rect">
+            <a:avLst/>
+          </a:prstGeom>
+        </p:spPr>
+        <p:txBody>
+          <a:bodyPr vert="horz" lIns="91440" tIns="45720" rIns="91440" bIns="45720" rtlCol="0" anchor="b"/>
+          <a:lstStyle>
+            <a:lvl1pPr algn="l">
+              <a:defRPr sz="1200"/>
+            </a:lvl1pPr>
+          </a:lstStyle>
+          <a:p>
+            <a:endParaRPr lang="es-AR"/>
+          </a:p>
+        </p:txBody>
+      </p:sp>
+      <p:sp>
+        <p:nvSpPr>
+          <p:cNvPr id="7" name="Marcador de número de diapositiva 6"/>
+          <p:cNvSpPr>
+            <a:spLocks noGrp="1"/>
+          </p:cNvSpPr>
+          <p:nvPr>
+            <p:ph type="sldNum" sz="quarter" idx="5"/>
+          </p:nvPr>
+        </p:nvSpPr>
+        <p:spPr>
+          <a:xfrm>
+            <a:off x="3884613" y="8685213"/>
+            <a:ext cx="2971800" cy="458787"/>
+          </a:xfrm>
+          <a:prstGeom prst="rect">
+            <a:avLst/>
+          </a:prstGeom>
+        </p:spPr>
+        <p:txBody>
+          <a:bodyPr vert="horz" lIns="91440" tIns="45720" rIns="91440" bIns="45720" rtlCol="0" anchor="b"/>
+          <a:lstStyle>
+            <a:lvl1pPr algn="r">
+              <a:defRPr sz="1200"/>
+            </a:lvl1pPr>
+          </a:lstStyle>
+          <a:p>
+            <a:fld id="{1041B7A9-23C3-4704-9FF5-8AE82B20F1AA}" type="slidenum">
+              <a:rPr lang="es-AR" smtClean="0"/>
+              <a:t>‹Nº›</a:t>
+            </a:fld>
+            <a:endParaRPr lang="es-AR"/>
+          </a:p>
+        </p:txBody>
+      </p:sp>
+    </p:spTree>
+    <p:extLst>
+      <p:ext uri="{BB962C8B-B14F-4D97-AF65-F5344CB8AC3E}">
+        <p14:creationId xmlns:p14="http://schemas.microsoft.com/office/powerpoint/2010/main" val="2551828120"/>
+      </p:ext>
+    </p:extLst>
+  </p:cSld>
+  <p:clrMap bg1="lt1" tx1="dk1" bg2="lt2" tx2="dk2" accent1="accent1" accent2="accent2" accent3="accent3" accent4="accent4" accent5="accent5" accent6="accent6" hlink="hlink" folHlink="folHlink"/>
+  <p:notesStyle>
+    <a:lvl1pPr marL="0" algn="l" defTabSz="914400" rtl="0" eaLnBrk="1" latinLnBrk="0" hangingPunct="1">
+      <a:defRPr sz="1200" kern="1200">
+        <a:solidFill>
+          <a:schemeClr val="tx1"/>
+        </a:solidFill>
+        <a:latin typeface="+mn-lt"/>
+        <a:ea typeface="+mn-ea"/>
+        <a:cs typeface="+mn-cs"/>
+      </a:defRPr>
+    </a:lvl1pPr>
+    <a:lvl2pPr marL="457200" algn="l" defTabSz="914400" rtl="0" eaLnBrk="1" latinLnBrk="0" hangingPunct="1">
+      <a:defRPr sz="1200" kern="1200">
+        <a:solidFill>
+          <a:schemeClr val="tx1"/>
+        </a:solidFill>
+        <a:latin typeface="+mn-lt"/>
+        <a:ea typeface="+mn-ea"/>
+        <a:cs typeface="+mn-cs"/>
+      </a:defRPr>
+    </a:lvl2pPr>
+    <a:lvl3pPr marL="914400" algn="l" defTabSz="914400" rtl="0" eaLnBrk="1" latinLnBrk="0" hangingPunct="1">
+      <a:defRPr sz="1200" kern="1200">
+        <a:solidFill>
+          <a:schemeClr val="tx1"/>
+        </a:solidFill>
+        <a:latin typeface="+mn-lt"/>
+        <a:ea typeface="+mn-ea"/>
+        <a:cs typeface="+mn-cs"/>
+      </a:defRPr>
+    </a:lvl3pPr>
+    <a:lvl4pPr marL="1371600" algn="l" defTabSz="914400" rtl="0" eaLnBrk="1" latinLnBrk="0" hangingPunct="1">
+      <a:defRPr sz="1200" kern="1200">
+        <a:solidFill>
+          <a:schemeClr val="tx1"/>
+        </a:solidFill>
+        <a:latin typeface="+mn-lt"/>
+        <a:ea typeface="+mn-ea"/>
+        <a:cs typeface="+mn-cs"/>
+      </a:defRPr>
+    </a:lvl4pPr>
+    <a:lvl5pPr marL="1828800" algn="l" defTabSz="914400" rtl="0" eaLnBrk="1" latinLnBrk="0" hangingPunct="1">
+      <a:defRPr sz="1200" kern="1200">
+        <a:solidFill>
+          <a:schemeClr val="tx1"/>
+        </a:solidFill>
+        <a:latin typeface="+mn-lt"/>
+        <a:ea typeface="+mn-ea"/>
+        <a:cs typeface="+mn-cs"/>
+      </a:defRPr>
+    </a:lvl5pPr>
+    <a:lvl6pPr marL="2286000" algn="l" defTabSz="914400" rtl="0" eaLnBrk="1" latinLnBrk="0" hangingPunct="1">
+      <a:defRPr sz="1200" kern="1200">
+        <a:solidFill>
+          <a:schemeClr val="tx1"/>
+        </a:solidFill>
+        <a:latin typeface="+mn-lt"/>
+        <a:ea typeface="+mn-ea"/>
+        <a:cs typeface="+mn-cs"/>
+      </a:defRPr>
+    </a:lvl6pPr>
+    <a:lvl7pPr marL="2743200" algn="l" defTabSz="914400" rtl="0" eaLnBrk="1" latinLnBrk="0" hangingPunct="1">
+      <a:defRPr sz="1200" kern="1200">
+        <a:solidFill>
+          <a:schemeClr val="tx1"/>
+        </a:solidFill>
+        <a:latin typeface="+mn-lt"/>
+        <a:ea typeface="+mn-ea"/>
+        <a:cs typeface="+mn-cs"/>
+      </a:defRPr>
+    </a:lvl7pPr>
+    <a:lvl8pPr marL="3200400" algn="l" defTabSz="914400" rtl="0" eaLnBrk="1" latinLnBrk="0" hangingPunct="1">
+      <a:defRPr sz="1200" kern="1200">
+        <a:solidFill>
+          <a:schemeClr val="tx1"/>
+        </a:solidFill>
+        <a:latin typeface="+mn-lt"/>
+        <a:ea typeface="+mn-ea"/>
+        <a:cs typeface="+mn-cs"/>
+      </a:defRPr>
+    </a:lvl8pPr>
+    <a:lvl9pPr marL="3657600" algn="l" defTabSz="914400" rtl="0" eaLnBrk="1" latinLnBrk="0" hangingPunct="1">
+      <a:defRPr sz="1200" kern="1200">
+        <a:solidFill>
+          <a:schemeClr val="tx1"/>
+        </a:solidFill>
+        <a:latin typeface="+mn-lt"/>
+        <a:ea typeface="+mn-ea"/>
+        <a:cs typeface="+mn-cs"/>
+      </a:defRPr>
+    </a:lvl9pPr>
+  </p:notesStyle>
+</p:notesMaster>
 </file>
 
 <file path=ppt/slideLayouts/slideLayout1.xml><?xml version="1.0" encoding="utf-8"?>
@@ -4546,4 +6656,319 @@
     </a:ext>
   </a:extLst>
 </a:theme>
+</file>
+
+<file path=ppt/theme/theme2.xml><?xml version="1.0" encoding="utf-8"?>
+<a:theme xmlns:a="http://schemas.openxmlformats.org/drawingml/2006/main" name="Tema de Office">
+  <a:themeElements>
+    <a:clrScheme name="Office">
+      <a:dk1>
+        <a:sysClr val="windowText" lastClr="000000"/>
+      </a:dk1>
+      <a:lt1>
+        <a:sysClr val="window" lastClr="FFFFFF"/>
+      </a:lt1>
+      <a:dk2>
+        <a:srgbClr val="0E2841"/>
+      </a:dk2>
+      <a:lt2>
+        <a:srgbClr val="E8E8E8"/>
+      </a:lt2>
+      <a:accent1>
+        <a:srgbClr val="156082"/>
+      </a:accent1>
+      <a:accent2>
+        <a:srgbClr val="E97132"/>
+      </a:accent2>
+      <a:accent3>
+        <a:srgbClr val="196B24"/>
+      </a:accent3>
+      <a:accent4>
+        <a:srgbClr val="0F9ED5"/>
+      </a:accent4>
+      <a:accent5>
+        <a:srgbClr val="A02B93"/>
+      </a:accent5>
+      <a:accent6>
+        <a:srgbClr val="4EA72E"/>
+      </a:accent6>
+      <a:hlink>
+        <a:srgbClr val="467886"/>
+      </a:hlink>
+      <a:folHlink>
+        <a:srgbClr val="96607D"/>
+      </a:folHlink>
+    </a:clrScheme>
+    <a:fontScheme name="Office">
+      <a:majorFont>
+        <a:latin typeface="Aptos Display" panose="02110004020202020204"/>
+        <a:ea typeface=""/>
+        <a:cs typeface=""/>
+        <a:font script="Jpan" typeface="游ゴシック Light"/>
+        <a:font script="Hang" typeface="맑은 고딕"/>
+        <a:font script="Hans" typeface="等线 Light"/>
+        <a:font script="Hant" typeface="新細明體"/>
+        <a:font script="Arab" typeface="Times New Roman"/>
+        <a:font script="Hebr" typeface="Times New Roman"/>
+        <a:font script="Thai" typeface="Angsana New"/>
+        <a:font script="Ethi" typeface="Nyala"/>
+        <a:font script="Beng" typeface="Vrinda"/>
+        <a:font script="Gujr" typeface="Shruti"/>
+        <a:font script="Khmr" typeface="MoolBoran"/>
+        <a:font script="Knda" typeface="Tunga"/>
+        <a:font script="Guru" typeface="Raavi"/>
+        <a:font script="Cans" typeface="Euphemia"/>
+        <a:font script="Cher" typeface="Plantagenet Cherokee"/>
+        <a:font script="Yiii" typeface="Microsoft Yi Baiti"/>
+        <a:font script="Tibt" typeface="Microsoft Himalaya"/>
+        <a:font script="Thaa" typeface="MV Boli"/>
+        <a:font script="Deva" typeface="Mangal"/>
+        <a:font script="Telu" typeface="Gautami"/>
+        <a:font script="Taml" typeface="Latha"/>
+        <a:font script="Syrc" typeface="Estrangelo Edessa"/>
+        <a:font script="Orya" typeface="Kalinga"/>
+        <a:font script="Mlym" typeface="Kartika"/>
+        <a:font script="Laoo" typeface="DokChampa"/>
+        <a:font script="Sinh" typeface="Iskoola Pota"/>
+        <a:font script="Mong" typeface="Mongolian Baiti"/>
+        <a:font script="Viet" typeface="Times New Roman"/>
+        <a:font script="Uigh" typeface="Microsoft Uighur"/>
+        <a:font script="Geor" typeface="Sylfaen"/>
+        <a:font script="Armn" typeface="Arial"/>
+        <a:font script="Bugi" typeface="Leelawadee UI"/>
+        <a:font script="Bopo" typeface="Microsoft JhengHei"/>
+        <a:font script="Java" typeface="Javanese Text"/>
+        <a:font script="Lisu" typeface="Segoe UI"/>
+        <a:font script="Mymr" typeface="Myanmar Text"/>
+        <a:font script="Nkoo" typeface="Ebrima"/>
+        <a:font script="Olck" typeface="Nirmala UI"/>
+        <a:font script="Osma" typeface="Ebrima"/>
+        <a:font script="Phag" typeface="Phagspa"/>
+        <a:font script="Syrn" typeface="Estrangelo Edessa"/>
+        <a:font script="Syrj" typeface="Estrangelo Edessa"/>
+        <a:font script="Syre" typeface="Estrangelo Edessa"/>
+        <a:font script="Sora" typeface="Nirmala UI"/>
+        <a:font script="Tale" typeface="Microsoft Tai Le"/>
+        <a:font script="Talu" typeface="Microsoft New Tai Lue"/>
+        <a:font script="Tfng" typeface="Ebrima"/>
+      </a:majorFont>
+      <a:minorFont>
+        <a:latin typeface="Aptos" panose="02110004020202020204"/>
+        <a:ea typeface=""/>
+        <a:cs typeface=""/>
+        <a:font script="Jpan" typeface="游ゴシック"/>
+        <a:font script="Hang" typeface="맑은 고딕"/>
+        <a:font script="Hans" typeface="等线"/>
+        <a:font script="Hant" typeface="新細明體"/>
+        <a:font script="Arab" typeface="Arial"/>
+        <a:font script="Hebr" typeface="Arial"/>
+        <a:font script="Thai" typeface="Cordia New"/>
+        <a:font script="Ethi" typeface="Nyala"/>
+        <a:font script="Beng" typeface="Vrinda"/>
+        <a:font script="Gujr" typeface="Shruti"/>
+        <a:font script="Khmr" typeface="DaunPenh"/>
+        <a:font script="Knda" typeface="Tunga"/>
+        <a:font script="Guru" typeface="Raavi"/>
+        <a:font script="Cans" typeface="Euphemia"/>
+        <a:font script="Cher" typeface="Plantagenet Cherokee"/>
+        <a:font script="Yiii" typeface="Microsoft Yi Baiti"/>
+        <a:font script="Tibt" typeface="Microsoft Himalaya"/>
+        <a:font script="Thaa" typeface="MV Boli"/>
+        <a:font script="Deva" typeface="Mangal"/>
+        <a:font script="Telu" typeface="Gautami"/>
+        <a:font script="Taml" typeface="Latha"/>
+        <a:font script="Syrc" typeface="Estrangelo Edessa"/>
+        <a:font script="Orya" typeface="Kalinga"/>
+        <a:font script="Mlym" typeface="Kartika"/>
+        <a:font script="Laoo" typeface="DokChampa"/>
+        <a:font script="Sinh" typeface="Iskoola Pota"/>
+        <a:font script="Mong" typeface="Mongolian Baiti"/>
+        <a:font script="Viet" typeface="Arial"/>
+        <a:font script="Uigh" typeface="Microsoft Uighur"/>
+        <a:font script="Geor" typeface="Sylfaen"/>
+        <a:font script="Armn" typeface="Arial"/>
+        <a:font script="Bugi" typeface="Leelawadee UI"/>
+        <a:font script="Bopo" typeface="Microsoft JhengHei"/>
+        <a:font script="Java" typeface="Javanese Text"/>
+        <a:font script="Lisu" typeface="Segoe UI"/>
+        <a:font script="Mymr" typeface="Myanmar Text"/>
+        <a:font script="Nkoo" typeface="Ebrima"/>
+        <a:font script="Olck" typeface="Nirmala UI"/>
+        <a:font script="Osma" typeface="Ebrima"/>
+        <a:font script="Phag" typeface="Phagspa"/>
+        <a:font script="Syrn" typeface="Estrangelo Edessa"/>
+        <a:font script="Syrj" typeface="Estrangelo Edessa"/>
+        <a:font script="Syre" typeface="Estrangelo Edessa"/>
+        <a:font script="Sora" typeface="Nirmala UI"/>
+        <a:font script="Tale" typeface="Microsoft Tai Le"/>
+        <a:font script="Talu" typeface="Microsoft New Tai Lue"/>
+        <a:font script="Tfng" typeface="Ebrima"/>
+      </a:minorFont>
+    </a:fontScheme>
+    <a:fmtScheme name="Office">
+      <a:fillStyleLst>
+        <a:solidFill>
+          <a:schemeClr val="phClr"/>
+        </a:solidFill>
+        <a:gradFill rotWithShape="1">
+          <a:gsLst>
+            <a:gs pos="0">
+              <a:schemeClr val="phClr">
+                <a:lumMod val="110000"/>
+                <a:satMod val="105000"/>
+                <a:tint val="67000"/>
+              </a:schemeClr>
+            </a:gs>
+            <a:gs pos="50000">
+              <a:schemeClr val="phClr">
+                <a:lumMod val="105000"/>
+                <a:satMod val="103000"/>
+                <a:tint val="73000"/>
+              </a:schemeClr>
+            </a:gs>
+            <a:gs pos="100000">
+              <a:schemeClr val="phClr">
+                <a:lumMod val="105000"/>
+                <a:satMod val="109000"/>
+                <a:tint val="81000"/>
+              </a:schemeClr>
+            </a:gs>
+          </a:gsLst>
+          <a:lin ang="5400000" scaled="0"/>
+        </a:gradFill>
+        <a:gradFill rotWithShape="1">
+          <a:gsLst>
+            <a:gs pos="0">
+              <a:schemeClr val="phClr">
+                <a:satMod val="103000"/>
+                <a:lumMod val="102000"/>
+                <a:tint val="94000"/>
+              </a:schemeClr>
+            </a:gs>
+            <a:gs pos="50000">
+              <a:schemeClr val="phClr">
+                <a:satMod val="110000"/>
+                <a:lumMod val="100000"/>
+                <a:shade val="100000"/>
+              </a:schemeClr>
+            </a:gs>
+            <a:gs pos="100000">
+              <a:schemeClr val="phClr">
+                <a:lumMod val="99000"/>
+                <a:satMod val="120000"/>
+                <a:shade val="78000"/>
+              </a:schemeClr>
+            </a:gs>
+          </a:gsLst>
+          <a:lin ang="5400000" scaled="0"/>
+        </a:gradFill>
+      </a:fillStyleLst>
+      <a:lnStyleLst>
+        <a:ln w="12700" cap="flat" cmpd="sng" algn="ctr">
+          <a:solidFill>
+            <a:schemeClr val="phClr"/>
+          </a:solidFill>
+          <a:prstDash val="solid"/>
+          <a:miter lim="800000"/>
+        </a:ln>
+        <a:ln w="19050" cap="flat" cmpd="sng" algn="ctr">
+          <a:solidFill>
+            <a:schemeClr val="phClr"/>
+          </a:solidFill>
+          <a:prstDash val="solid"/>
+          <a:miter lim="800000"/>
+        </a:ln>
+        <a:ln w="25400" cap="flat" cmpd="sng" algn="ctr">
+          <a:solidFill>
+            <a:schemeClr val="phClr"/>
+          </a:solidFill>
+          <a:prstDash val="solid"/>
+          <a:miter lim="800000"/>
+        </a:ln>
+      </a:lnStyleLst>
+      <a:effectStyleLst>
+        <a:effectStyle>
+          <a:effectLst/>
+        </a:effectStyle>
+        <a:effectStyle>
+          <a:effectLst/>
+        </a:effectStyle>
+        <a:effectStyle>
+          <a:effectLst>
+            <a:outerShdw blurRad="57150" dist="19050" dir="5400000" algn="ctr" rotWithShape="0">
+              <a:srgbClr val="000000">
+                <a:alpha val="63000"/>
+              </a:srgbClr>
+            </a:outerShdw>
+          </a:effectLst>
+        </a:effectStyle>
+      </a:effectStyleLst>
+      <a:bgFillStyleLst>
+        <a:solidFill>
+          <a:schemeClr val="phClr"/>
+        </a:solidFill>
+        <a:solidFill>
+          <a:schemeClr val="phClr">
+            <a:tint val="95000"/>
+            <a:satMod val="170000"/>
+          </a:schemeClr>
+        </a:solidFill>
+        <a:gradFill rotWithShape="1">
+          <a:gsLst>
+            <a:gs pos="0">
+              <a:schemeClr val="phClr">
+                <a:tint val="93000"/>
+                <a:satMod val="150000"/>
+                <a:shade val="98000"/>
+                <a:lumMod val="102000"/>
+              </a:schemeClr>
+            </a:gs>
+            <a:gs pos="50000">
+              <a:schemeClr val="phClr">
+                <a:tint val="98000"/>
+                <a:satMod val="130000"/>
+                <a:shade val="90000"/>
+                <a:lumMod val="103000"/>
+              </a:schemeClr>
+            </a:gs>
+            <a:gs pos="100000">
+              <a:schemeClr val="phClr">
+                <a:shade val="63000"/>
+                <a:satMod val="120000"/>
+              </a:schemeClr>
+            </a:gs>
+          </a:gsLst>
+          <a:lin ang="5400000" scaled="0"/>
+        </a:gradFill>
+      </a:bgFillStyleLst>
+    </a:fmtScheme>
+  </a:themeElements>
+  <a:objectDefaults>
+    <a:lnDef>
+      <a:spPr/>
+      <a:bodyPr/>
+      <a:lstStyle/>
+      <a:style>
+        <a:lnRef idx="2">
+          <a:schemeClr val="accent1"/>
+        </a:lnRef>
+        <a:fillRef idx="0">
+          <a:schemeClr val="accent1"/>
+        </a:fillRef>
+        <a:effectRef idx="1">
+          <a:schemeClr val="accent1"/>
+        </a:effectRef>
+        <a:fontRef idx="minor">
+          <a:schemeClr val="tx1"/>
+        </a:fontRef>
+      </a:style>
+    </a:lnDef>
+  </a:objectDefaults>
+  <a:extraClrSchemeLst/>
+  <a:extLst>
+    <a:ext uri="{05A4C25C-085E-4340-85A3-A5531E510DB2}">
+      <thm15:themeFamily xmlns:thm15="http://schemas.microsoft.com/office/thememl/2012/main" name="Office Theme" id="{2E142A2C-CD16-42D6-873A-C26D2A0506FA}" vid="{1BDDFF52-6CD6-40A5-AB3C-68EB2F1E4D0A}"/>
+    </a:ext>
+  </a:extLst>
+</a:theme>
 </file>
</xml_diff>

<commit_message>
Se agregan detalles a pptx - Se genera pdf con historial de cambio
</commit_message>
<xml_diff>
--- a/HistorialDeCambios.pptx
+++ b/HistorialDeCambios.pptx
@@ -14,8 +14,8 @@
     <p:sldId id="261" r:id="rId5"/>
     <p:sldId id="262" r:id="rId6"/>
     <p:sldId id="263" r:id="rId7"/>
-    <p:sldId id="264" r:id="rId8"/>
-    <p:sldId id="265" r:id="rId9"/>
+    <p:sldId id="265" r:id="rId8"/>
+    <p:sldId id="264" r:id="rId9"/>
     <p:sldId id="266" r:id="rId10"/>
     <p:sldId id="267" r:id="rId11"/>
     <p:sldId id="268" r:id="rId12"/>
@@ -118,13 +118,18 @@
       </a:defRPr>
     </a:lvl9pPr>
   </p:defaultTextStyle>
+  <p:extLst>
+    <p:ext uri="{EFAFB233-063F-42B5-8137-9DF3F51BA10A}">
+      <p15:sldGuideLst xmlns:p15="http://schemas.microsoft.com/office/powerpoint/2012/main"/>
+    </p:ext>
+  </p:extLst>
 </p:presentation>
 </file>
 
 <file path=ppt/revisionInfo.xml><?xml version="1.0" encoding="utf-8"?>
 <p1510:revInfo xmlns:a="http://schemas.openxmlformats.org/drawingml/2006/main" xmlns:r="http://schemas.openxmlformats.org/officeDocument/2006/relationships" xmlns:p1510="http://schemas.microsoft.com/office/powerpoint/2015/10/main">
   <p1510:revLst>
-    <p1510:client id="{571E5FA9-B83F-472B-AE41-7DE03044985C}" v="6" dt="2025-04-21T02:37:54.423"/>
+    <p1510:client id="{571E5FA9-B83F-472B-AE41-7DE03044985C}" v="14" dt="2025-04-28T01:21:04.265"/>
   </p1510:revLst>
 </p1510:revInfo>
 </file>
@@ -133,8 +138,8 @@
 <pc:chgInfo xmlns:a="http://schemas.openxmlformats.org/drawingml/2006/main" xmlns:r="http://schemas.openxmlformats.org/officeDocument/2006/relationships" xmlns:ac="http://schemas.microsoft.com/office/drawing/2013/main/command" xmlns:pc="http://schemas.microsoft.com/office/powerpoint/2013/main/command">
   <pc:docChgLst>
     <pc:chgData name="German Luis Dagatti" userId="43e7766c8bef1a99" providerId="LiveId" clId="{571E5FA9-B83F-472B-AE41-7DE03044985C}"/>
-    <pc:docChg chg="undo custSel addSld delSld modSld addMainMaster delMainMaster modMainMaster addSection delSection">
-      <pc:chgData name="German Luis Dagatti" userId="43e7766c8bef1a99" providerId="LiveId" clId="{571E5FA9-B83F-472B-AE41-7DE03044985C}" dt="2025-04-21T02:37:57.584" v="276" actId="34807"/>
+    <pc:docChg chg="undo custSel addSld delSld modSld sldOrd addMainMaster delMainMaster modMainMaster addSection delSection">
+      <pc:chgData name="German Luis Dagatti" userId="43e7766c8bef1a99" providerId="LiveId" clId="{571E5FA9-B83F-472B-AE41-7DE03044985C}" dt="2025-04-28T01:23:04.209" v="944" actId="1582"/>
       <pc:docMkLst>
         <pc:docMk/>
       </pc:docMkLst>
@@ -166,33 +171,89 @@
           <pc:sldMk cId="1408610806" sldId="261"/>
         </pc:sldMkLst>
       </pc:sldChg>
-      <pc:sldChg chg="addSp new add del mod">
-        <pc:chgData name="German Luis Dagatti" userId="43e7766c8bef1a99" providerId="LiveId" clId="{571E5FA9-B83F-472B-AE41-7DE03044985C}" dt="2025-04-21T02:37:57.584" v="276" actId="34807"/>
+      <pc:sldChg chg="addSp modSp new add del mod">
+        <pc:chgData name="German Luis Dagatti" userId="43e7766c8bef1a99" providerId="LiveId" clId="{571E5FA9-B83F-472B-AE41-7DE03044985C}" dt="2025-04-28T00:55:43.963" v="327" actId="1076"/>
         <pc:sldMkLst>
           <pc:docMk/>
           <pc:sldMk cId="3617571959" sldId="262"/>
         </pc:sldMkLst>
+        <pc:spChg chg="add mod">
+          <ac:chgData name="German Luis Dagatti" userId="43e7766c8bef1a99" providerId="LiveId" clId="{571E5FA9-B83F-472B-AE41-7DE03044985C}" dt="2025-04-28T00:55:43.963" v="327" actId="1076"/>
+          <ac:spMkLst>
+            <pc:docMk/>
+            <pc:sldMk cId="3617571959" sldId="262"/>
+            <ac:spMk id="2" creationId="{DD98688C-AC38-6129-916C-678B6A0BDD5F}"/>
+          </ac:spMkLst>
+        </pc:spChg>
       </pc:sldChg>
-      <pc:sldChg chg="addSp new add del mod">
-        <pc:chgData name="German Luis Dagatti" userId="43e7766c8bef1a99" providerId="LiveId" clId="{571E5FA9-B83F-472B-AE41-7DE03044985C}" dt="2025-04-21T02:37:57.584" v="276" actId="34807"/>
+      <pc:sldChg chg="addSp delSp modSp new add del mod">
+        <pc:chgData name="German Luis Dagatti" userId="43e7766c8bef1a99" providerId="LiveId" clId="{571E5FA9-B83F-472B-AE41-7DE03044985C}" dt="2025-04-28T01:14:15.729" v="433" actId="1076"/>
         <pc:sldMkLst>
           <pc:docMk/>
           <pc:sldMk cId="4277338908" sldId="263"/>
         </pc:sldMkLst>
+        <pc:spChg chg="add mod">
+          <ac:chgData name="German Luis Dagatti" userId="43e7766c8bef1a99" providerId="LiveId" clId="{571E5FA9-B83F-472B-AE41-7DE03044985C}" dt="2025-04-28T01:14:15.729" v="433" actId="1076"/>
+          <ac:spMkLst>
+            <pc:docMk/>
+            <pc:sldMk cId="4277338908" sldId="263"/>
+            <ac:spMk id="4" creationId="{1F30F306-263B-CF4F-B4D9-4AD2A85A7F44}"/>
+          </ac:spMkLst>
+        </pc:spChg>
+        <pc:picChg chg="add del">
+          <ac:chgData name="German Luis Dagatti" userId="43e7766c8bef1a99" providerId="LiveId" clId="{571E5FA9-B83F-472B-AE41-7DE03044985C}" dt="2025-04-28T00:56:02.270" v="329" actId="478"/>
+          <ac:picMkLst>
+            <pc:docMk/>
+            <pc:sldMk cId="4277338908" sldId="263"/>
+            <ac:picMk id="2" creationId="{991C4E6C-C66E-239C-1711-98463B06005A}"/>
+          </ac:picMkLst>
+        </pc:picChg>
       </pc:sldChg>
-      <pc:sldChg chg="addSp new add del mod">
-        <pc:chgData name="German Luis Dagatti" userId="43e7766c8bef1a99" providerId="LiveId" clId="{571E5FA9-B83F-472B-AE41-7DE03044985C}" dt="2025-04-21T02:37:57.584" v="276" actId="34807"/>
+      <pc:sldChg chg="addSp modSp new add del mod">
+        <pc:chgData name="German Luis Dagatti" userId="43e7766c8bef1a99" providerId="LiveId" clId="{571E5FA9-B83F-472B-AE41-7DE03044985C}" dt="2025-04-28T01:20:05.522" v="738" actId="14100"/>
         <pc:sldMkLst>
           <pc:docMk/>
           <pc:sldMk cId="3021590399" sldId="264"/>
         </pc:sldMkLst>
+        <pc:spChg chg="add mod">
+          <ac:chgData name="German Luis Dagatti" userId="43e7766c8bef1a99" providerId="LiveId" clId="{571E5FA9-B83F-472B-AE41-7DE03044985C}" dt="2025-04-28T01:19:15.773" v="731" actId="20577"/>
+          <ac:spMkLst>
+            <pc:docMk/>
+            <pc:sldMk cId="3021590399" sldId="264"/>
+            <ac:spMk id="4" creationId="{DEE0833A-4A9A-34B2-71B9-6AD0E8F8F94F}"/>
+          </ac:spMkLst>
+        </pc:spChg>
+        <pc:spChg chg="add mod">
+          <ac:chgData name="German Luis Dagatti" userId="43e7766c8bef1a99" providerId="LiveId" clId="{571E5FA9-B83F-472B-AE41-7DE03044985C}" dt="2025-04-28T01:20:05.522" v="738" actId="14100"/>
+          <ac:spMkLst>
+            <pc:docMk/>
+            <pc:sldMk cId="3021590399" sldId="264"/>
+            <ac:spMk id="5" creationId="{C5F233E5-1255-D11F-4CE4-5C202B4B9843}"/>
+          </ac:spMkLst>
+        </pc:spChg>
+        <pc:picChg chg="add">
+          <ac:chgData name="German Luis Dagatti" userId="43e7766c8bef1a99" providerId="LiveId" clId="{571E5FA9-B83F-472B-AE41-7DE03044985C}" dt="2025-04-28T01:16:01.608" v="441"/>
+          <ac:picMkLst>
+            <pc:docMk/>
+            <pc:sldMk cId="3021590399" sldId="264"/>
+            <ac:picMk id="2" creationId="{D945DCFD-53E8-69B5-7082-905F9735D8D2}"/>
+          </ac:picMkLst>
+        </pc:picChg>
       </pc:sldChg>
-      <pc:sldChg chg="addSp new add del mod">
-        <pc:chgData name="German Luis Dagatti" userId="43e7766c8bef1a99" providerId="LiveId" clId="{571E5FA9-B83F-472B-AE41-7DE03044985C}" dt="2025-04-21T02:37:57.584" v="276" actId="34807"/>
+      <pc:sldChg chg="addSp modSp new add del mod ord">
+        <pc:chgData name="German Luis Dagatti" userId="43e7766c8bef1a99" providerId="LiveId" clId="{571E5FA9-B83F-472B-AE41-7DE03044985C}" dt="2025-04-28T01:15:52.444" v="440" actId="13926"/>
         <pc:sldMkLst>
           <pc:docMk/>
           <pc:sldMk cId="2948101576" sldId="265"/>
         </pc:sldMkLst>
+        <pc:spChg chg="add mod">
+          <ac:chgData name="German Luis Dagatti" userId="43e7766c8bef1a99" providerId="LiveId" clId="{571E5FA9-B83F-472B-AE41-7DE03044985C}" dt="2025-04-28T01:15:52.444" v="440" actId="13926"/>
+          <ac:spMkLst>
+            <pc:docMk/>
+            <pc:sldMk cId="2948101576" sldId="265"/>
+            <ac:spMk id="2" creationId="{64512DE4-A359-BC9C-FD9F-C36E05ED4398}"/>
+          </ac:spMkLst>
+        </pc:spChg>
       </pc:sldChg>
       <pc:sldChg chg="addSp new add del mod">
         <pc:chgData name="German Luis Dagatti" userId="43e7766c8bef1a99" providerId="LiveId" clId="{571E5FA9-B83F-472B-AE41-7DE03044985C}" dt="2025-04-21T02:37:57.584" v="276" actId="34807"/>
@@ -208,12 +269,28 @@
           <pc:sldMk cId="2555316905" sldId="267"/>
         </pc:sldMkLst>
       </pc:sldChg>
-      <pc:sldChg chg="addSp new add del mod">
-        <pc:chgData name="German Luis Dagatti" userId="43e7766c8bef1a99" providerId="LiveId" clId="{571E5FA9-B83F-472B-AE41-7DE03044985C}" dt="2025-04-21T02:37:57.584" v="276" actId="34807"/>
+      <pc:sldChg chg="addSp modSp new add del mod">
+        <pc:chgData name="German Luis Dagatti" userId="43e7766c8bef1a99" providerId="LiveId" clId="{571E5FA9-B83F-472B-AE41-7DE03044985C}" dt="2025-04-28T01:23:04.209" v="944" actId="1582"/>
         <pc:sldMkLst>
           <pc:docMk/>
           <pc:sldMk cId="3375920547" sldId="268"/>
         </pc:sldMkLst>
+        <pc:spChg chg="add mod">
+          <ac:chgData name="German Luis Dagatti" userId="43e7766c8bef1a99" providerId="LiveId" clId="{571E5FA9-B83F-472B-AE41-7DE03044985C}" dt="2025-04-28T01:22:45.522" v="941" actId="1076"/>
+          <ac:spMkLst>
+            <pc:docMk/>
+            <pc:sldMk cId="3375920547" sldId="268"/>
+            <ac:spMk id="2" creationId="{2468AFBD-FD56-DCC0-8D0A-46F3E4253539}"/>
+          </ac:spMkLst>
+        </pc:spChg>
+        <pc:cxnChg chg="add mod">
+          <ac:chgData name="German Luis Dagatti" userId="43e7766c8bef1a99" providerId="LiveId" clId="{571E5FA9-B83F-472B-AE41-7DE03044985C}" dt="2025-04-28T01:23:04.209" v="944" actId="1582"/>
+          <ac:cxnSpMkLst>
+            <pc:docMk/>
+            <pc:sldMk cId="3375920547" sldId="268"/>
+            <ac:cxnSpMk id="5" creationId="{A8870A2D-5BFF-5882-019F-C62D217ABA57}"/>
+          </ac:cxnSpMkLst>
+        </pc:cxnChg>
       </pc:sldChg>
       <pc:sldChg chg="addSp new add del mod">
         <pc:chgData name="German Luis Dagatti" userId="43e7766c8bef1a99" providerId="LiveId" clId="{571E5FA9-B83F-472B-AE41-7DE03044985C}" dt="2025-04-21T02:37:57.584" v="276" actId="34807"/>
@@ -228,54 +305,6 @@
           <pc:docMk/>
           <pc:sldMk cId="405302534" sldId="2561"/>
         </pc:sldMkLst>
-        <pc:spChg chg="mod">
-          <ac:chgData name="German Luis Dagatti" userId="43e7766c8bef1a99" providerId="LiveId" clId="{571E5FA9-B83F-472B-AE41-7DE03044985C}" dt="2025-04-21T02:28:11.641" v="257" actId="34807"/>
-          <ac:spMkLst>
-            <pc:docMk/>
-            <pc:sldMk cId="405302534" sldId="2561"/>
-            <ac:spMk id="2" creationId="{1314AA1E-0006-27A2-5EE9-C5860BA9FD76}"/>
-          </ac:spMkLst>
-        </pc:spChg>
-        <pc:spChg chg="mod">
-          <ac:chgData name="German Luis Dagatti" userId="43e7766c8bef1a99" providerId="LiveId" clId="{571E5FA9-B83F-472B-AE41-7DE03044985C}" dt="2025-04-21T02:28:11.641" v="257" actId="34807"/>
-          <ac:spMkLst>
-            <pc:docMk/>
-            <pc:sldMk cId="405302534" sldId="2561"/>
-            <ac:spMk id="3" creationId="{06331450-C9EF-E84D-A6E4-5D2E7449B748}"/>
-          </ac:spMkLst>
-        </pc:spChg>
-        <pc:spChg chg="add del">
-          <ac:chgData name="German Luis Dagatti" userId="43e7766c8bef1a99" providerId="LiveId" clId="{571E5FA9-B83F-472B-AE41-7DE03044985C}" dt="2025-04-21T02:28:11.641" v="257" actId="34807"/>
-          <ac:spMkLst>
-            <pc:docMk/>
-            <pc:sldMk cId="405302534" sldId="2561"/>
-            <ac:spMk id="9" creationId="{19F9BF86-FE94-4517-B97D-026C7515E589}"/>
-          </ac:spMkLst>
-        </pc:spChg>
-        <pc:spChg chg="add del">
-          <ac:chgData name="German Luis Dagatti" userId="43e7766c8bef1a99" providerId="LiveId" clId="{571E5FA9-B83F-472B-AE41-7DE03044985C}" dt="2025-04-21T02:28:11.641" v="257" actId="34807"/>
-          <ac:spMkLst>
-            <pc:docMk/>
-            <pc:sldMk cId="405302534" sldId="2561"/>
-            <ac:spMk id="11" creationId="{36136311-C81B-47C5-AE0A-5641A5A59520}"/>
-          </ac:spMkLst>
-        </pc:spChg>
-        <pc:picChg chg="mod ord">
-          <ac:chgData name="German Luis Dagatti" userId="43e7766c8bef1a99" providerId="LiveId" clId="{571E5FA9-B83F-472B-AE41-7DE03044985C}" dt="2025-04-21T02:28:11.641" v="257" actId="34807"/>
-          <ac:picMkLst>
-            <pc:docMk/>
-            <pc:sldMk cId="405302534" sldId="2561"/>
-            <ac:picMk id="4" creationId="{F3CC4CBC-3EB4-45ED-9B77-C454E358C7A1}"/>
-          </ac:picMkLst>
-        </pc:picChg>
-        <pc:cxnChg chg="add del">
-          <ac:chgData name="German Luis Dagatti" userId="43e7766c8bef1a99" providerId="LiveId" clId="{571E5FA9-B83F-472B-AE41-7DE03044985C}" dt="2025-04-21T02:28:11.641" v="257" actId="34807"/>
-          <ac:cxnSpMkLst>
-            <pc:docMk/>
-            <pc:sldMk cId="405302534" sldId="2561"/>
-            <ac:cxnSpMk id="13" creationId="{7CC73A33-65FF-41A9-A3B0-006753CD1028}"/>
-          </ac:cxnSpMkLst>
-        </pc:cxnChg>
       </pc:sldChg>
       <pc:sldChg chg="addSp delSp modSp add del mod setBg modClrScheme addAnim delAnim chgLayout">
         <pc:chgData name="German Luis Dagatti" userId="43e7766c8bef1a99" providerId="LiveId" clId="{571E5FA9-B83F-472B-AE41-7DE03044985C}" dt="2025-04-21T02:37:57.584" v="276" actId="34807"/>
@@ -283,46 +312,6 @@
           <pc:docMk/>
           <pc:sldMk cId="3268867992" sldId="2561"/>
         </pc:sldMkLst>
-        <pc:spChg chg="mod">
-          <ac:chgData name="German Luis Dagatti" userId="43e7766c8bef1a99" providerId="LiveId" clId="{571E5FA9-B83F-472B-AE41-7DE03044985C}" dt="2025-04-21T02:37:57.584" v="276" actId="34807"/>
-          <ac:spMkLst>
-            <pc:docMk/>
-            <pc:sldMk cId="3268867992" sldId="2561"/>
-            <ac:spMk id="2" creationId="{C86429F6-44D7-D837-BF11-E1A12FFDA57C}"/>
-          </ac:spMkLst>
-        </pc:spChg>
-        <pc:spChg chg="mod">
-          <ac:chgData name="German Luis Dagatti" userId="43e7766c8bef1a99" providerId="LiveId" clId="{571E5FA9-B83F-472B-AE41-7DE03044985C}" dt="2025-04-21T02:37:57.584" v="276" actId="34807"/>
-          <ac:spMkLst>
-            <pc:docMk/>
-            <pc:sldMk cId="3268867992" sldId="2561"/>
-            <ac:spMk id="3" creationId="{E74001F5-727C-5DFE-7B07-715ECAD31285}"/>
-          </ac:spMkLst>
-        </pc:spChg>
-        <pc:spChg chg="add del">
-          <ac:chgData name="German Luis Dagatti" userId="43e7766c8bef1a99" providerId="LiveId" clId="{571E5FA9-B83F-472B-AE41-7DE03044985C}" dt="2025-04-21T02:37:57.584" v="276" actId="34807"/>
-          <ac:spMkLst>
-            <pc:docMk/>
-            <pc:sldMk cId="3268867992" sldId="2561"/>
-            <ac:spMk id="9" creationId="{19F9BF86-FE94-4517-B97D-026C7515E589}"/>
-          </ac:spMkLst>
-        </pc:spChg>
-        <pc:picChg chg="mod">
-          <ac:chgData name="German Luis Dagatti" userId="43e7766c8bef1a99" providerId="LiveId" clId="{571E5FA9-B83F-472B-AE41-7DE03044985C}" dt="2025-04-21T02:37:57.584" v="276" actId="34807"/>
-          <ac:picMkLst>
-            <pc:docMk/>
-            <pc:sldMk cId="3268867992" sldId="2561"/>
-            <ac:picMk id="4" creationId="{C6E0709E-10BA-4ABD-AE84-9B15AE6BD39A}"/>
-          </ac:picMkLst>
-        </pc:picChg>
-        <pc:cxnChg chg="add del">
-          <ac:chgData name="German Luis Dagatti" userId="43e7766c8bef1a99" providerId="LiveId" clId="{571E5FA9-B83F-472B-AE41-7DE03044985C}" dt="2025-04-21T02:37:57.584" v="276" actId="34807"/>
-          <ac:cxnSpMkLst>
-            <pc:docMk/>
-            <pc:sldMk cId="3268867992" sldId="2561"/>
-            <ac:cxnSpMk id="11" creationId="{7CC73A33-65FF-41A9-A3B0-006753CD1028}"/>
-          </ac:cxnSpMkLst>
-        </pc:cxnChg>
       </pc:sldChg>
       <pc:sldChg chg="addSp delSp modSp add del mod modTransition setBg modClrScheme addAnim delAnim chgLayout">
         <pc:chgData name="German Luis Dagatti" userId="43e7766c8bef1a99" providerId="LiveId" clId="{571E5FA9-B83F-472B-AE41-7DE03044985C}" dt="2025-04-21T02:28:11.641" v="257" actId="34807"/>
@@ -330,54 +319,6 @@
           <pc:docMk/>
           <pc:sldMk cId="1585519045" sldId="2562"/>
         </pc:sldMkLst>
-        <pc:spChg chg="mod">
-          <ac:chgData name="German Luis Dagatti" userId="43e7766c8bef1a99" providerId="LiveId" clId="{571E5FA9-B83F-472B-AE41-7DE03044985C}" dt="2025-04-21T02:28:11.641" v="257" actId="34807"/>
-          <ac:spMkLst>
-            <pc:docMk/>
-            <pc:sldMk cId="1585519045" sldId="2562"/>
-            <ac:spMk id="2" creationId="{970AF41B-7F48-700B-3209-2965862B37D0}"/>
-          </ac:spMkLst>
-        </pc:spChg>
-        <pc:spChg chg="mod">
-          <ac:chgData name="German Luis Dagatti" userId="43e7766c8bef1a99" providerId="LiveId" clId="{571E5FA9-B83F-472B-AE41-7DE03044985C}" dt="2025-04-21T02:28:11.641" v="257" actId="34807"/>
-          <ac:spMkLst>
-            <pc:docMk/>
-            <pc:sldMk cId="1585519045" sldId="2562"/>
-            <ac:spMk id="4" creationId="{4D4C4A4E-EE95-BCD3-4109-B9BE38918F5A}"/>
-          </ac:spMkLst>
-        </pc:spChg>
-        <pc:spChg chg="add del">
-          <ac:chgData name="German Luis Dagatti" userId="43e7766c8bef1a99" providerId="LiveId" clId="{571E5FA9-B83F-472B-AE41-7DE03044985C}" dt="2025-04-21T02:28:11.641" v="257" actId="34807"/>
-          <ac:spMkLst>
-            <pc:docMk/>
-            <pc:sldMk cId="1585519045" sldId="2562"/>
-            <ac:spMk id="12" creationId="{744CAA32-F237-419C-A2DD-43C28D920D3C}"/>
-          </ac:spMkLst>
-        </pc:spChg>
-        <pc:picChg chg="mod">
-          <ac:chgData name="German Luis Dagatti" userId="43e7766c8bef1a99" providerId="LiveId" clId="{571E5FA9-B83F-472B-AE41-7DE03044985C}" dt="2025-04-21T02:28:11.641" v="257" actId="34807"/>
-          <ac:picMkLst>
-            <pc:docMk/>
-            <pc:sldMk cId="1585519045" sldId="2562"/>
-            <ac:picMk id="5" creationId="{3C8015E3-3F3A-4F1D-B52F-3E4FE4B33BD7}"/>
-          </ac:picMkLst>
-        </pc:picChg>
-        <pc:cxnChg chg="add del">
-          <ac:chgData name="German Luis Dagatti" userId="43e7766c8bef1a99" providerId="LiveId" clId="{571E5FA9-B83F-472B-AE41-7DE03044985C}" dt="2025-04-21T02:28:11.641" v="257" actId="34807"/>
-          <ac:cxnSpMkLst>
-            <pc:docMk/>
-            <pc:sldMk cId="1585519045" sldId="2562"/>
-            <ac:cxnSpMk id="10" creationId="{118E06E4-607B-144B-382B-AD3D06B1EE8C}"/>
-          </ac:cxnSpMkLst>
-        </pc:cxnChg>
-        <pc:cxnChg chg="add del">
-          <ac:chgData name="German Luis Dagatti" userId="43e7766c8bef1a99" providerId="LiveId" clId="{571E5FA9-B83F-472B-AE41-7DE03044985C}" dt="2025-04-21T02:28:11.641" v="257" actId="34807"/>
-          <ac:cxnSpMkLst>
-            <pc:docMk/>
-            <pc:sldMk cId="1585519045" sldId="2562"/>
-            <ac:cxnSpMk id="14" creationId="{08052531-D50B-3899-B150-D05525F4F2BC}"/>
-          </ac:cxnSpMkLst>
-        </pc:cxnChg>
       </pc:sldChg>
       <pc:sldChg chg="addSp delSp modSp add del mod modTransition setBg modClrScheme addAnim delAnim chgLayout">
         <pc:chgData name="German Luis Dagatti" userId="43e7766c8bef1a99" providerId="LiveId" clId="{571E5FA9-B83F-472B-AE41-7DE03044985C}" dt="2025-04-21T02:37:57.584" v="276" actId="34807"/>
@@ -385,54 +326,6 @@
           <pc:docMk/>
           <pc:sldMk cId="3442457526" sldId="2562"/>
         </pc:sldMkLst>
-        <pc:spChg chg="mod">
-          <ac:chgData name="German Luis Dagatti" userId="43e7766c8bef1a99" providerId="LiveId" clId="{571E5FA9-B83F-472B-AE41-7DE03044985C}" dt="2025-04-21T02:37:57.584" v="276" actId="34807"/>
-          <ac:spMkLst>
-            <pc:docMk/>
-            <pc:sldMk cId="3442457526" sldId="2562"/>
-            <ac:spMk id="2" creationId="{7D9F2FFE-0DEE-5A6B-2C86-1BFF01669818}"/>
-          </ac:spMkLst>
-        </pc:spChg>
-        <pc:spChg chg="mod">
-          <ac:chgData name="German Luis Dagatti" userId="43e7766c8bef1a99" providerId="LiveId" clId="{571E5FA9-B83F-472B-AE41-7DE03044985C}" dt="2025-04-21T02:37:57.584" v="276" actId="34807"/>
-          <ac:spMkLst>
-            <pc:docMk/>
-            <pc:sldMk cId="3442457526" sldId="2562"/>
-            <ac:spMk id="4" creationId="{BBFE98C4-3A20-7596-0AC3-3E7BF061A856}"/>
-          </ac:spMkLst>
-        </pc:spChg>
-        <pc:spChg chg="add del">
-          <ac:chgData name="German Luis Dagatti" userId="43e7766c8bef1a99" providerId="LiveId" clId="{571E5FA9-B83F-472B-AE41-7DE03044985C}" dt="2025-04-21T02:37:57.584" v="276" actId="34807"/>
-          <ac:spMkLst>
-            <pc:docMk/>
-            <pc:sldMk cId="3442457526" sldId="2562"/>
-            <ac:spMk id="12" creationId="{744CAA32-F237-419C-A2DD-43C28D920D3C}"/>
-          </ac:spMkLst>
-        </pc:spChg>
-        <pc:picChg chg="mod">
-          <ac:chgData name="German Luis Dagatti" userId="43e7766c8bef1a99" providerId="LiveId" clId="{571E5FA9-B83F-472B-AE41-7DE03044985C}" dt="2025-04-21T02:37:57.584" v="276" actId="34807"/>
-          <ac:picMkLst>
-            <pc:docMk/>
-            <pc:sldMk cId="3442457526" sldId="2562"/>
-            <ac:picMk id="5" creationId="{69FB08F6-137A-4CA4-87F8-0BD0D843151D}"/>
-          </ac:picMkLst>
-        </pc:picChg>
-        <pc:cxnChg chg="add del">
-          <ac:chgData name="German Luis Dagatti" userId="43e7766c8bef1a99" providerId="LiveId" clId="{571E5FA9-B83F-472B-AE41-7DE03044985C}" dt="2025-04-21T02:37:57.584" v="276" actId="34807"/>
-          <ac:cxnSpMkLst>
-            <pc:docMk/>
-            <pc:sldMk cId="3442457526" sldId="2562"/>
-            <ac:cxnSpMk id="10" creationId="{118E06E4-607B-144B-382B-AD3D06B1EE8C}"/>
-          </ac:cxnSpMkLst>
-        </pc:cxnChg>
-        <pc:cxnChg chg="add del">
-          <ac:chgData name="German Luis Dagatti" userId="43e7766c8bef1a99" providerId="LiveId" clId="{571E5FA9-B83F-472B-AE41-7DE03044985C}" dt="2025-04-21T02:37:57.584" v="276" actId="34807"/>
-          <ac:cxnSpMkLst>
-            <pc:docMk/>
-            <pc:sldMk cId="3442457526" sldId="2562"/>
-            <ac:cxnSpMk id="14" creationId="{08052531-D50B-3899-B150-D05525F4F2BC}"/>
-          </ac:cxnSpMkLst>
-        </pc:cxnChg>
       </pc:sldChg>
       <pc:sldChg chg="addSp delSp modSp add del mod modTransition setBg modClrScheme addAnim delAnim chgLayout">
         <pc:chgData name="German Luis Dagatti" userId="43e7766c8bef1a99" providerId="LiveId" clId="{571E5FA9-B83F-472B-AE41-7DE03044985C}" dt="2025-04-21T02:37:57.584" v="276" actId="34807"/>
@@ -440,38 +333,6 @@
           <pc:docMk/>
           <pc:sldMk cId="2511759668" sldId="2563"/>
         </pc:sldMkLst>
-        <pc:spChg chg="mod">
-          <ac:chgData name="German Luis Dagatti" userId="43e7766c8bef1a99" providerId="LiveId" clId="{571E5FA9-B83F-472B-AE41-7DE03044985C}" dt="2025-04-21T02:37:57.584" v="276" actId="34807"/>
-          <ac:spMkLst>
-            <pc:docMk/>
-            <pc:sldMk cId="2511759668" sldId="2563"/>
-            <ac:spMk id="2" creationId="{056C3087-0768-EDCD-6A1B-3A2EC2FB0E51}"/>
-          </ac:spMkLst>
-        </pc:spChg>
-        <pc:spChg chg="add del">
-          <ac:chgData name="German Luis Dagatti" userId="43e7766c8bef1a99" providerId="LiveId" clId="{571E5FA9-B83F-472B-AE41-7DE03044985C}" dt="2025-04-21T02:37:57.584" v="276" actId="34807"/>
-          <ac:spMkLst>
-            <pc:docMk/>
-            <pc:sldMk cId="2511759668" sldId="2563"/>
-            <ac:spMk id="7" creationId="{46B9231A-B34B-4A29-A6AC-532E1EE81575}"/>
-          </ac:spMkLst>
-        </pc:spChg>
-        <pc:spChg chg="add del">
-          <ac:chgData name="German Luis Dagatti" userId="43e7766c8bef1a99" providerId="LiveId" clId="{571E5FA9-B83F-472B-AE41-7DE03044985C}" dt="2025-04-21T02:37:57.584" v="276" actId="34807"/>
-          <ac:spMkLst>
-            <pc:docMk/>
-            <pc:sldMk cId="2511759668" sldId="2563"/>
-            <ac:spMk id="9" creationId="{19F9BF86-FE94-4517-B97D-026C7515E589}"/>
-          </ac:spMkLst>
-        </pc:spChg>
-        <pc:cxnChg chg="add del">
-          <ac:chgData name="German Luis Dagatti" userId="43e7766c8bef1a99" providerId="LiveId" clId="{571E5FA9-B83F-472B-AE41-7DE03044985C}" dt="2025-04-21T02:37:57.584" v="276" actId="34807"/>
-          <ac:cxnSpMkLst>
-            <pc:docMk/>
-            <pc:sldMk cId="2511759668" sldId="2563"/>
-            <ac:cxnSpMk id="11" creationId="{53C0BBAA-A5EC-5D5D-32E6-9F7EA6048489}"/>
-          </ac:cxnSpMkLst>
-        </pc:cxnChg>
       </pc:sldChg>
       <pc:sldChg chg="addSp delSp modSp add del mod modTransition setBg modClrScheme addAnim delAnim chgLayout">
         <pc:chgData name="German Luis Dagatti" userId="43e7766c8bef1a99" providerId="LiveId" clId="{571E5FA9-B83F-472B-AE41-7DE03044985C}" dt="2025-04-21T02:28:11.641" v="257" actId="34807"/>
@@ -479,38 +340,6 @@
           <pc:docMk/>
           <pc:sldMk cId="2829927854" sldId="2563"/>
         </pc:sldMkLst>
-        <pc:spChg chg="mod">
-          <ac:chgData name="German Luis Dagatti" userId="43e7766c8bef1a99" providerId="LiveId" clId="{571E5FA9-B83F-472B-AE41-7DE03044985C}" dt="2025-04-21T02:28:11.641" v="257" actId="34807"/>
-          <ac:spMkLst>
-            <pc:docMk/>
-            <pc:sldMk cId="2829927854" sldId="2563"/>
-            <ac:spMk id="2" creationId="{6A196170-B972-21DD-E249-6ED5933B06D8}"/>
-          </ac:spMkLst>
-        </pc:spChg>
-        <pc:spChg chg="add del">
-          <ac:chgData name="German Luis Dagatti" userId="43e7766c8bef1a99" providerId="LiveId" clId="{571E5FA9-B83F-472B-AE41-7DE03044985C}" dt="2025-04-21T02:28:11.641" v="257" actId="34807"/>
-          <ac:spMkLst>
-            <pc:docMk/>
-            <pc:sldMk cId="2829927854" sldId="2563"/>
-            <ac:spMk id="7" creationId="{46B9231A-B34B-4A29-A6AC-532E1EE81575}"/>
-          </ac:spMkLst>
-        </pc:spChg>
-        <pc:spChg chg="add del">
-          <ac:chgData name="German Luis Dagatti" userId="43e7766c8bef1a99" providerId="LiveId" clId="{571E5FA9-B83F-472B-AE41-7DE03044985C}" dt="2025-04-21T02:28:11.641" v="257" actId="34807"/>
-          <ac:spMkLst>
-            <pc:docMk/>
-            <pc:sldMk cId="2829927854" sldId="2563"/>
-            <ac:spMk id="9" creationId="{19F9BF86-FE94-4517-B97D-026C7515E589}"/>
-          </ac:spMkLst>
-        </pc:spChg>
-        <pc:cxnChg chg="add del">
-          <ac:chgData name="German Luis Dagatti" userId="43e7766c8bef1a99" providerId="LiveId" clId="{571E5FA9-B83F-472B-AE41-7DE03044985C}" dt="2025-04-21T02:28:11.641" v="257" actId="34807"/>
-          <ac:cxnSpMkLst>
-            <pc:docMk/>
-            <pc:sldMk cId="2829927854" sldId="2563"/>
-            <ac:cxnSpMk id="11" creationId="{53C0BBAA-A5EC-5D5D-32E6-9F7EA6048489}"/>
-          </ac:cxnSpMkLst>
-        </pc:cxnChg>
       </pc:sldChg>
       <pc:sldChg chg="addSp delSp modSp add del mod modTransition setBg modClrScheme addAnim delAnim chgLayout">
         <pc:chgData name="German Luis Dagatti" userId="43e7766c8bef1a99" providerId="LiveId" clId="{571E5FA9-B83F-472B-AE41-7DE03044985C}" dt="2025-04-21T02:37:57.584" v="276" actId="34807"/>
@@ -518,54 +347,6 @@
           <pc:docMk/>
           <pc:sldMk cId="1372967442" sldId="2564"/>
         </pc:sldMkLst>
-        <pc:spChg chg="mod">
-          <ac:chgData name="German Luis Dagatti" userId="43e7766c8bef1a99" providerId="LiveId" clId="{571E5FA9-B83F-472B-AE41-7DE03044985C}" dt="2025-04-21T02:37:57.584" v="276" actId="34807"/>
-          <ac:spMkLst>
-            <pc:docMk/>
-            <pc:sldMk cId="1372967442" sldId="2564"/>
-            <ac:spMk id="2" creationId="{7A857F75-C0C6-4D25-7441-6C3DE5D9E9B5}"/>
-          </ac:spMkLst>
-        </pc:spChg>
-        <pc:spChg chg="mod">
-          <ac:chgData name="German Luis Dagatti" userId="43e7766c8bef1a99" providerId="LiveId" clId="{571E5FA9-B83F-472B-AE41-7DE03044985C}" dt="2025-04-21T02:37:57.584" v="276" actId="34807"/>
-          <ac:spMkLst>
-            <pc:docMk/>
-            <pc:sldMk cId="1372967442" sldId="2564"/>
-            <ac:spMk id="4" creationId="{81ADEF59-F0E0-9557-BC68-5A20D681ECE4}"/>
-          </ac:spMkLst>
-        </pc:spChg>
-        <pc:spChg chg="add del">
-          <ac:chgData name="German Luis Dagatti" userId="43e7766c8bef1a99" providerId="LiveId" clId="{571E5FA9-B83F-472B-AE41-7DE03044985C}" dt="2025-04-21T02:37:57.584" v="276" actId="34807"/>
-          <ac:spMkLst>
-            <pc:docMk/>
-            <pc:sldMk cId="1372967442" sldId="2564"/>
-            <ac:spMk id="12" creationId="{744CAA32-F237-419C-A2DD-43C28D920D3C}"/>
-          </ac:spMkLst>
-        </pc:spChg>
-        <pc:picChg chg="mod ord">
-          <ac:chgData name="German Luis Dagatti" userId="43e7766c8bef1a99" providerId="LiveId" clId="{571E5FA9-B83F-472B-AE41-7DE03044985C}" dt="2025-04-21T02:37:57.584" v="276" actId="34807"/>
-          <ac:picMkLst>
-            <pc:docMk/>
-            <pc:sldMk cId="1372967442" sldId="2564"/>
-            <ac:picMk id="5" creationId="{5B1BF9D2-1792-42E1-A9B9-A98AFF6C294F}"/>
-          </ac:picMkLst>
-        </pc:picChg>
-        <pc:cxnChg chg="add del">
-          <ac:chgData name="German Luis Dagatti" userId="43e7766c8bef1a99" providerId="LiveId" clId="{571E5FA9-B83F-472B-AE41-7DE03044985C}" dt="2025-04-21T02:37:57.584" v="276" actId="34807"/>
-          <ac:cxnSpMkLst>
-            <pc:docMk/>
-            <pc:sldMk cId="1372967442" sldId="2564"/>
-            <ac:cxnSpMk id="10" creationId="{118E06E4-607B-144B-382B-AD3D06B1EE8C}"/>
-          </ac:cxnSpMkLst>
-        </pc:cxnChg>
-        <pc:cxnChg chg="add del">
-          <ac:chgData name="German Luis Dagatti" userId="43e7766c8bef1a99" providerId="LiveId" clId="{571E5FA9-B83F-472B-AE41-7DE03044985C}" dt="2025-04-21T02:37:57.584" v="276" actId="34807"/>
-          <ac:cxnSpMkLst>
-            <pc:docMk/>
-            <pc:sldMk cId="1372967442" sldId="2564"/>
-            <ac:cxnSpMk id="14" creationId="{92025DBA-8780-9CA0-2826-FF6E3BD1A0C9}"/>
-          </ac:cxnSpMkLst>
-        </pc:cxnChg>
       </pc:sldChg>
       <pc:sldChg chg="addSp delSp modSp add del mod modTransition setBg modClrScheme addAnim delAnim chgLayout">
         <pc:chgData name="German Luis Dagatti" userId="43e7766c8bef1a99" providerId="LiveId" clId="{571E5FA9-B83F-472B-AE41-7DE03044985C}" dt="2025-04-21T02:28:11.641" v="257" actId="34807"/>
@@ -573,54 +354,6 @@
           <pc:docMk/>
           <pc:sldMk cId="2493165252" sldId="2564"/>
         </pc:sldMkLst>
-        <pc:spChg chg="mod">
-          <ac:chgData name="German Luis Dagatti" userId="43e7766c8bef1a99" providerId="LiveId" clId="{571E5FA9-B83F-472B-AE41-7DE03044985C}" dt="2025-04-21T02:28:11.641" v="257" actId="34807"/>
-          <ac:spMkLst>
-            <pc:docMk/>
-            <pc:sldMk cId="2493165252" sldId="2564"/>
-            <ac:spMk id="2" creationId="{13A46BC2-A9C2-DB5A-29FE-73EC94C13E6D}"/>
-          </ac:spMkLst>
-        </pc:spChg>
-        <pc:spChg chg="mod">
-          <ac:chgData name="German Luis Dagatti" userId="43e7766c8bef1a99" providerId="LiveId" clId="{571E5FA9-B83F-472B-AE41-7DE03044985C}" dt="2025-04-21T02:28:11.641" v="257" actId="34807"/>
-          <ac:spMkLst>
-            <pc:docMk/>
-            <pc:sldMk cId="2493165252" sldId="2564"/>
-            <ac:spMk id="4" creationId="{6A9634DC-1DCA-A30B-454F-07DDF0ED9C35}"/>
-          </ac:spMkLst>
-        </pc:spChg>
-        <pc:spChg chg="add del">
-          <ac:chgData name="German Luis Dagatti" userId="43e7766c8bef1a99" providerId="LiveId" clId="{571E5FA9-B83F-472B-AE41-7DE03044985C}" dt="2025-04-21T02:28:11.641" v="257" actId="34807"/>
-          <ac:spMkLst>
-            <pc:docMk/>
-            <pc:sldMk cId="2493165252" sldId="2564"/>
-            <ac:spMk id="12" creationId="{744CAA32-F237-419C-A2DD-43C28D920D3C}"/>
-          </ac:spMkLst>
-        </pc:spChg>
-        <pc:picChg chg="mod">
-          <ac:chgData name="German Luis Dagatti" userId="43e7766c8bef1a99" providerId="LiveId" clId="{571E5FA9-B83F-472B-AE41-7DE03044985C}" dt="2025-04-21T02:28:11.641" v="257" actId="34807"/>
-          <ac:picMkLst>
-            <pc:docMk/>
-            <pc:sldMk cId="2493165252" sldId="2564"/>
-            <ac:picMk id="5" creationId="{C7DB1E33-3E2A-46CC-B7E6-3795844C2277}"/>
-          </ac:picMkLst>
-        </pc:picChg>
-        <pc:cxnChg chg="add del">
-          <ac:chgData name="German Luis Dagatti" userId="43e7766c8bef1a99" providerId="LiveId" clId="{571E5FA9-B83F-472B-AE41-7DE03044985C}" dt="2025-04-21T02:28:11.641" v="257" actId="34807"/>
-          <ac:cxnSpMkLst>
-            <pc:docMk/>
-            <pc:sldMk cId="2493165252" sldId="2564"/>
-            <ac:cxnSpMk id="10" creationId="{118E06E4-607B-144B-382B-AD3D06B1EE8C}"/>
-          </ac:cxnSpMkLst>
-        </pc:cxnChg>
-        <pc:cxnChg chg="add del">
-          <ac:chgData name="German Luis Dagatti" userId="43e7766c8bef1a99" providerId="LiveId" clId="{571E5FA9-B83F-472B-AE41-7DE03044985C}" dt="2025-04-21T02:28:11.641" v="257" actId="34807"/>
-          <ac:cxnSpMkLst>
-            <pc:docMk/>
-            <pc:sldMk cId="2493165252" sldId="2564"/>
-            <ac:cxnSpMk id="14" creationId="{08052531-D50B-3899-B150-D05525F4F2BC}"/>
-          </ac:cxnSpMkLst>
-        </pc:cxnChg>
       </pc:sldChg>
       <pc:sldChg chg="addSp delSp modSp add del mod modTransition setBg modClrScheme addAnim delAnim chgLayout">
         <pc:chgData name="German Luis Dagatti" userId="43e7766c8bef1a99" providerId="LiveId" clId="{571E5FA9-B83F-472B-AE41-7DE03044985C}" dt="2025-04-21T02:37:57.584" v="276" actId="34807"/>
@@ -628,54 +361,6 @@
           <pc:docMk/>
           <pc:sldMk cId="27372939" sldId="2565"/>
         </pc:sldMkLst>
-        <pc:spChg chg="mod">
-          <ac:chgData name="German Luis Dagatti" userId="43e7766c8bef1a99" providerId="LiveId" clId="{571E5FA9-B83F-472B-AE41-7DE03044985C}" dt="2025-04-21T02:37:57.584" v="276" actId="34807"/>
-          <ac:spMkLst>
-            <pc:docMk/>
-            <pc:sldMk cId="27372939" sldId="2565"/>
-            <ac:spMk id="2" creationId="{AA2342F9-C6F5-68F4-5DB8-A21B57A22941}"/>
-          </ac:spMkLst>
-        </pc:spChg>
-        <pc:spChg chg="mod">
-          <ac:chgData name="German Luis Dagatti" userId="43e7766c8bef1a99" providerId="LiveId" clId="{571E5FA9-B83F-472B-AE41-7DE03044985C}" dt="2025-04-21T02:37:57.584" v="276" actId="34807"/>
-          <ac:spMkLst>
-            <pc:docMk/>
-            <pc:sldMk cId="27372939" sldId="2565"/>
-            <ac:spMk id="4" creationId="{0A5C2AA0-1F12-02FA-C5D7-8CAC43E23314}"/>
-          </ac:spMkLst>
-        </pc:spChg>
-        <pc:spChg chg="add del">
-          <ac:chgData name="German Luis Dagatti" userId="43e7766c8bef1a99" providerId="LiveId" clId="{571E5FA9-B83F-472B-AE41-7DE03044985C}" dt="2025-04-21T02:37:57.584" v="276" actId="34807"/>
-          <ac:spMkLst>
-            <pc:docMk/>
-            <pc:sldMk cId="27372939" sldId="2565"/>
-            <ac:spMk id="12" creationId="{744CAA32-F237-419C-A2DD-43C28D920D3C}"/>
-          </ac:spMkLst>
-        </pc:spChg>
-        <pc:picChg chg="mod">
-          <ac:chgData name="German Luis Dagatti" userId="43e7766c8bef1a99" providerId="LiveId" clId="{571E5FA9-B83F-472B-AE41-7DE03044985C}" dt="2025-04-21T02:37:57.584" v="276" actId="34807"/>
-          <ac:picMkLst>
-            <pc:docMk/>
-            <pc:sldMk cId="27372939" sldId="2565"/>
-            <ac:picMk id="5" creationId="{BE5554F5-3FA5-4453-BEA2-FD04533B2973}"/>
-          </ac:picMkLst>
-        </pc:picChg>
-        <pc:cxnChg chg="add del">
-          <ac:chgData name="German Luis Dagatti" userId="43e7766c8bef1a99" providerId="LiveId" clId="{571E5FA9-B83F-472B-AE41-7DE03044985C}" dt="2025-04-21T02:37:57.584" v="276" actId="34807"/>
-          <ac:cxnSpMkLst>
-            <pc:docMk/>
-            <pc:sldMk cId="27372939" sldId="2565"/>
-            <ac:cxnSpMk id="10" creationId="{118E06E4-607B-144B-382B-AD3D06B1EE8C}"/>
-          </ac:cxnSpMkLst>
-        </pc:cxnChg>
-        <pc:cxnChg chg="add del">
-          <ac:chgData name="German Luis Dagatti" userId="43e7766c8bef1a99" providerId="LiveId" clId="{571E5FA9-B83F-472B-AE41-7DE03044985C}" dt="2025-04-21T02:37:57.584" v="276" actId="34807"/>
-          <ac:cxnSpMkLst>
-            <pc:docMk/>
-            <pc:sldMk cId="27372939" sldId="2565"/>
-            <ac:cxnSpMk id="14" creationId="{08052531-D50B-3899-B150-D05525F4F2BC}"/>
-          </ac:cxnSpMkLst>
-        </pc:cxnChg>
       </pc:sldChg>
       <pc:sldChg chg="addSp delSp modSp add del mod modTransition setBg modClrScheme addAnim delAnim chgLayout">
         <pc:chgData name="German Luis Dagatti" userId="43e7766c8bef1a99" providerId="LiveId" clId="{571E5FA9-B83F-472B-AE41-7DE03044985C}" dt="2025-04-21T02:28:11.641" v="257" actId="34807"/>
@@ -683,54 +368,6 @@
           <pc:docMk/>
           <pc:sldMk cId="3949372333" sldId="2565"/>
         </pc:sldMkLst>
-        <pc:spChg chg="mod">
-          <ac:chgData name="German Luis Dagatti" userId="43e7766c8bef1a99" providerId="LiveId" clId="{571E5FA9-B83F-472B-AE41-7DE03044985C}" dt="2025-04-21T02:28:11.641" v="257" actId="34807"/>
-          <ac:spMkLst>
-            <pc:docMk/>
-            <pc:sldMk cId="3949372333" sldId="2565"/>
-            <ac:spMk id="2" creationId="{459CA52A-1341-2F6E-48BE-39AEF9A015C5}"/>
-          </ac:spMkLst>
-        </pc:spChg>
-        <pc:spChg chg="mod">
-          <ac:chgData name="German Luis Dagatti" userId="43e7766c8bef1a99" providerId="LiveId" clId="{571E5FA9-B83F-472B-AE41-7DE03044985C}" dt="2025-04-21T02:28:11.641" v="257" actId="34807"/>
-          <ac:spMkLst>
-            <pc:docMk/>
-            <pc:sldMk cId="3949372333" sldId="2565"/>
-            <ac:spMk id="4" creationId="{8F97BFF4-4544-270B-035F-DA0B55D193AD}"/>
-          </ac:spMkLst>
-        </pc:spChg>
-        <pc:spChg chg="add del">
-          <ac:chgData name="German Luis Dagatti" userId="43e7766c8bef1a99" providerId="LiveId" clId="{571E5FA9-B83F-472B-AE41-7DE03044985C}" dt="2025-04-21T02:28:11.641" v="257" actId="34807"/>
-          <ac:spMkLst>
-            <pc:docMk/>
-            <pc:sldMk cId="3949372333" sldId="2565"/>
-            <ac:spMk id="12" creationId="{744CAA32-F237-419C-A2DD-43C28D920D3C}"/>
-          </ac:spMkLst>
-        </pc:spChg>
-        <pc:picChg chg="mod">
-          <ac:chgData name="German Luis Dagatti" userId="43e7766c8bef1a99" providerId="LiveId" clId="{571E5FA9-B83F-472B-AE41-7DE03044985C}" dt="2025-04-21T02:28:11.641" v="257" actId="34807"/>
-          <ac:picMkLst>
-            <pc:docMk/>
-            <pc:sldMk cId="3949372333" sldId="2565"/>
-            <ac:picMk id="5" creationId="{7FDC0D9B-F8C3-4A3F-A454-AF8FDB45AB4F}"/>
-          </ac:picMkLst>
-        </pc:picChg>
-        <pc:cxnChg chg="add del">
-          <ac:chgData name="German Luis Dagatti" userId="43e7766c8bef1a99" providerId="LiveId" clId="{571E5FA9-B83F-472B-AE41-7DE03044985C}" dt="2025-04-21T02:28:11.641" v="257" actId="34807"/>
-          <ac:cxnSpMkLst>
-            <pc:docMk/>
-            <pc:sldMk cId="3949372333" sldId="2565"/>
-            <ac:cxnSpMk id="10" creationId="{118E06E4-607B-144B-382B-AD3D06B1EE8C}"/>
-          </ac:cxnSpMkLst>
-        </pc:cxnChg>
-        <pc:cxnChg chg="add del">
-          <ac:chgData name="German Luis Dagatti" userId="43e7766c8bef1a99" providerId="LiveId" clId="{571E5FA9-B83F-472B-AE41-7DE03044985C}" dt="2025-04-21T02:28:11.641" v="257" actId="34807"/>
-          <ac:cxnSpMkLst>
-            <pc:docMk/>
-            <pc:sldMk cId="3949372333" sldId="2565"/>
-            <ac:cxnSpMk id="14" creationId="{08052531-D50B-3899-B150-D05525F4F2BC}"/>
-          </ac:cxnSpMkLst>
-        </pc:cxnChg>
       </pc:sldChg>
       <pc:sldChg chg="addSp delSp modSp add del mod modTransition setBg modClrScheme addAnim delAnim chgLayout">
         <pc:chgData name="German Luis Dagatti" userId="43e7766c8bef1a99" providerId="LiveId" clId="{571E5FA9-B83F-472B-AE41-7DE03044985C}" dt="2025-04-21T02:37:57.584" v="276" actId="34807"/>
@@ -738,38 +375,6 @@
           <pc:docMk/>
           <pc:sldMk cId="181785269" sldId="2566"/>
         </pc:sldMkLst>
-        <pc:spChg chg="mod">
-          <ac:chgData name="German Luis Dagatti" userId="43e7766c8bef1a99" providerId="LiveId" clId="{571E5FA9-B83F-472B-AE41-7DE03044985C}" dt="2025-04-21T02:37:57.584" v="276" actId="34807"/>
-          <ac:spMkLst>
-            <pc:docMk/>
-            <pc:sldMk cId="181785269" sldId="2566"/>
-            <ac:spMk id="2" creationId="{BAA356F4-1392-66A2-71FB-2719AA68114A}"/>
-          </ac:spMkLst>
-        </pc:spChg>
-        <pc:spChg chg="add del">
-          <ac:chgData name="German Luis Dagatti" userId="43e7766c8bef1a99" providerId="LiveId" clId="{571E5FA9-B83F-472B-AE41-7DE03044985C}" dt="2025-04-21T02:37:57.584" v="276" actId="34807"/>
-          <ac:spMkLst>
-            <pc:docMk/>
-            <pc:sldMk cId="181785269" sldId="2566"/>
-            <ac:spMk id="7" creationId="{46B9231A-B34B-4A29-A6AC-532E1EE81575}"/>
-          </ac:spMkLst>
-        </pc:spChg>
-        <pc:spChg chg="add del">
-          <ac:chgData name="German Luis Dagatti" userId="43e7766c8bef1a99" providerId="LiveId" clId="{571E5FA9-B83F-472B-AE41-7DE03044985C}" dt="2025-04-21T02:37:57.584" v="276" actId="34807"/>
-          <ac:spMkLst>
-            <pc:docMk/>
-            <pc:sldMk cId="181785269" sldId="2566"/>
-            <ac:spMk id="9" creationId="{19F9BF86-FE94-4517-B97D-026C7515E589}"/>
-          </ac:spMkLst>
-        </pc:spChg>
-        <pc:cxnChg chg="add del">
-          <ac:chgData name="German Luis Dagatti" userId="43e7766c8bef1a99" providerId="LiveId" clId="{571E5FA9-B83F-472B-AE41-7DE03044985C}" dt="2025-04-21T02:37:57.584" v="276" actId="34807"/>
-          <ac:cxnSpMkLst>
-            <pc:docMk/>
-            <pc:sldMk cId="181785269" sldId="2566"/>
-            <ac:cxnSpMk id="11" creationId="{53C0BBAA-A5EC-5D5D-32E6-9F7EA6048489}"/>
-          </ac:cxnSpMkLst>
-        </pc:cxnChg>
       </pc:sldChg>
       <pc:sldChg chg="addSp delSp modSp add del mod modTransition setBg modClrScheme addAnim delAnim chgLayout">
         <pc:chgData name="German Luis Dagatti" userId="43e7766c8bef1a99" providerId="LiveId" clId="{571E5FA9-B83F-472B-AE41-7DE03044985C}" dt="2025-04-21T02:28:11.641" v="257" actId="34807"/>
@@ -777,54 +382,6 @@
           <pc:docMk/>
           <pc:sldMk cId="1201361520" sldId="2566"/>
         </pc:sldMkLst>
-        <pc:spChg chg="mod">
-          <ac:chgData name="German Luis Dagatti" userId="43e7766c8bef1a99" providerId="LiveId" clId="{571E5FA9-B83F-472B-AE41-7DE03044985C}" dt="2025-04-21T02:28:11.641" v="257" actId="34807"/>
-          <ac:spMkLst>
-            <pc:docMk/>
-            <pc:sldMk cId="1201361520" sldId="2566"/>
-            <ac:spMk id="2" creationId="{B99C195F-6B38-8398-B5A6-54CC30A35C51}"/>
-          </ac:spMkLst>
-        </pc:spChg>
-        <pc:spChg chg="mod">
-          <ac:chgData name="German Luis Dagatti" userId="43e7766c8bef1a99" providerId="LiveId" clId="{571E5FA9-B83F-472B-AE41-7DE03044985C}" dt="2025-04-21T02:28:11.641" v="257" actId="34807"/>
-          <ac:spMkLst>
-            <pc:docMk/>
-            <pc:sldMk cId="1201361520" sldId="2566"/>
-            <ac:spMk id="4" creationId="{474157FE-64D6-2FFA-7731-8B1D187F7152}"/>
-          </ac:spMkLst>
-        </pc:spChg>
-        <pc:spChg chg="add del">
-          <ac:chgData name="German Luis Dagatti" userId="43e7766c8bef1a99" providerId="LiveId" clId="{571E5FA9-B83F-472B-AE41-7DE03044985C}" dt="2025-04-21T02:28:11.641" v="257" actId="34807"/>
-          <ac:spMkLst>
-            <pc:docMk/>
-            <pc:sldMk cId="1201361520" sldId="2566"/>
-            <ac:spMk id="12" creationId="{744CAA32-F237-419C-A2DD-43C28D920D3C}"/>
-          </ac:spMkLst>
-        </pc:spChg>
-        <pc:picChg chg="mod">
-          <ac:chgData name="German Luis Dagatti" userId="43e7766c8bef1a99" providerId="LiveId" clId="{571E5FA9-B83F-472B-AE41-7DE03044985C}" dt="2025-04-21T02:28:11.641" v="257" actId="34807"/>
-          <ac:picMkLst>
-            <pc:docMk/>
-            <pc:sldMk cId="1201361520" sldId="2566"/>
-            <ac:picMk id="5" creationId="{FA9DA05B-2A66-4DD3-A42E-4446EC0E7EB0}"/>
-          </ac:picMkLst>
-        </pc:picChg>
-        <pc:cxnChg chg="add del">
-          <ac:chgData name="German Luis Dagatti" userId="43e7766c8bef1a99" providerId="LiveId" clId="{571E5FA9-B83F-472B-AE41-7DE03044985C}" dt="2025-04-21T02:28:11.641" v="257" actId="34807"/>
-          <ac:cxnSpMkLst>
-            <pc:docMk/>
-            <pc:sldMk cId="1201361520" sldId="2566"/>
-            <ac:cxnSpMk id="10" creationId="{118E06E4-607B-144B-382B-AD3D06B1EE8C}"/>
-          </ac:cxnSpMkLst>
-        </pc:cxnChg>
-        <pc:cxnChg chg="add del">
-          <ac:chgData name="German Luis Dagatti" userId="43e7766c8bef1a99" providerId="LiveId" clId="{571E5FA9-B83F-472B-AE41-7DE03044985C}" dt="2025-04-21T02:28:11.641" v="257" actId="34807"/>
-          <ac:cxnSpMkLst>
-            <pc:docMk/>
-            <pc:sldMk cId="1201361520" sldId="2566"/>
-            <ac:cxnSpMk id="14" creationId="{08052531-D50B-3899-B150-D05525F4F2BC}"/>
-          </ac:cxnSpMkLst>
-        </pc:cxnChg>
       </pc:sldChg>
       <pc:sldChg chg="addSp delSp modSp add del mod modTransition setBg modClrScheme addAnim delAnim chgLayout">
         <pc:chgData name="German Luis Dagatti" userId="43e7766c8bef1a99" providerId="LiveId" clId="{571E5FA9-B83F-472B-AE41-7DE03044985C}" dt="2025-04-21T02:37:57.584" v="276" actId="34807"/>
@@ -832,54 +389,6 @@
           <pc:docMk/>
           <pc:sldMk cId="1711182044" sldId="2567"/>
         </pc:sldMkLst>
-        <pc:spChg chg="mod">
-          <ac:chgData name="German Luis Dagatti" userId="43e7766c8bef1a99" providerId="LiveId" clId="{571E5FA9-B83F-472B-AE41-7DE03044985C}" dt="2025-04-21T02:37:57.584" v="276" actId="34807"/>
-          <ac:spMkLst>
-            <pc:docMk/>
-            <pc:sldMk cId="1711182044" sldId="2567"/>
-            <ac:spMk id="2" creationId="{903A63A7-63F5-E0D1-A61E-C9BA02A760CE}"/>
-          </ac:spMkLst>
-        </pc:spChg>
-        <pc:spChg chg="mod">
-          <ac:chgData name="German Luis Dagatti" userId="43e7766c8bef1a99" providerId="LiveId" clId="{571E5FA9-B83F-472B-AE41-7DE03044985C}" dt="2025-04-21T02:37:57.584" v="276" actId="34807"/>
-          <ac:spMkLst>
-            <pc:docMk/>
-            <pc:sldMk cId="1711182044" sldId="2567"/>
-            <ac:spMk id="4" creationId="{78CFF63D-DF34-097C-E176-044F0373510E}"/>
-          </ac:spMkLst>
-        </pc:spChg>
-        <pc:spChg chg="add del">
-          <ac:chgData name="German Luis Dagatti" userId="43e7766c8bef1a99" providerId="LiveId" clId="{571E5FA9-B83F-472B-AE41-7DE03044985C}" dt="2025-04-21T02:37:57.584" v="276" actId="34807"/>
-          <ac:spMkLst>
-            <pc:docMk/>
-            <pc:sldMk cId="1711182044" sldId="2567"/>
-            <ac:spMk id="12" creationId="{744CAA32-F237-419C-A2DD-43C28D920D3C}"/>
-          </ac:spMkLst>
-        </pc:spChg>
-        <pc:picChg chg="mod">
-          <ac:chgData name="German Luis Dagatti" userId="43e7766c8bef1a99" providerId="LiveId" clId="{571E5FA9-B83F-472B-AE41-7DE03044985C}" dt="2025-04-21T02:37:57.584" v="276" actId="34807"/>
-          <ac:picMkLst>
-            <pc:docMk/>
-            <pc:sldMk cId="1711182044" sldId="2567"/>
-            <ac:picMk id="5" creationId="{878EEBC6-4D89-4711-9A29-F8911EDA35E7}"/>
-          </ac:picMkLst>
-        </pc:picChg>
-        <pc:cxnChg chg="add del">
-          <ac:chgData name="German Luis Dagatti" userId="43e7766c8bef1a99" providerId="LiveId" clId="{571E5FA9-B83F-472B-AE41-7DE03044985C}" dt="2025-04-21T02:37:57.584" v="276" actId="34807"/>
-          <ac:cxnSpMkLst>
-            <pc:docMk/>
-            <pc:sldMk cId="1711182044" sldId="2567"/>
-            <ac:cxnSpMk id="10" creationId="{118E06E4-607B-144B-382B-AD3D06B1EE8C}"/>
-          </ac:cxnSpMkLst>
-        </pc:cxnChg>
-        <pc:cxnChg chg="add del">
-          <ac:chgData name="German Luis Dagatti" userId="43e7766c8bef1a99" providerId="LiveId" clId="{571E5FA9-B83F-472B-AE41-7DE03044985C}" dt="2025-04-21T02:37:57.584" v="276" actId="34807"/>
-          <ac:cxnSpMkLst>
-            <pc:docMk/>
-            <pc:sldMk cId="1711182044" sldId="2567"/>
-            <ac:cxnSpMk id="14" creationId="{08052531-D50B-3899-B150-D05525F4F2BC}"/>
-          </ac:cxnSpMkLst>
-        </pc:cxnChg>
       </pc:sldChg>
       <pc:sldChg chg="addSp delSp modSp add del mod modTransition setBg modClrScheme addAnim delAnim chgLayout">
         <pc:chgData name="German Luis Dagatti" userId="43e7766c8bef1a99" providerId="LiveId" clId="{571E5FA9-B83F-472B-AE41-7DE03044985C}" dt="2025-04-21T02:28:11.641" v="257" actId="34807"/>
@@ -887,38 +396,6 @@
           <pc:docMk/>
           <pc:sldMk cId="1792972683" sldId="2567"/>
         </pc:sldMkLst>
-        <pc:spChg chg="mod">
-          <ac:chgData name="German Luis Dagatti" userId="43e7766c8bef1a99" providerId="LiveId" clId="{571E5FA9-B83F-472B-AE41-7DE03044985C}" dt="2025-04-21T02:28:11.641" v="257" actId="34807"/>
-          <ac:spMkLst>
-            <pc:docMk/>
-            <pc:sldMk cId="1792972683" sldId="2567"/>
-            <ac:spMk id="2" creationId="{8899B59F-24B0-4656-6361-3D4CB66D231A}"/>
-          </ac:spMkLst>
-        </pc:spChg>
-        <pc:spChg chg="add del">
-          <ac:chgData name="German Luis Dagatti" userId="43e7766c8bef1a99" providerId="LiveId" clId="{571E5FA9-B83F-472B-AE41-7DE03044985C}" dt="2025-04-21T02:28:11.641" v="257" actId="34807"/>
-          <ac:spMkLst>
-            <pc:docMk/>
-            <pc:sldMk cId="1792972683" sldId="2567"/>
-            <ac:spMk id="7" creationId="{46B9231A-B34B-4A29-A6AC-532E1EE81575}"/>
-          </ac:spMkLst>
-        </pc:spChg>
-        <pc:spChg chg="add del">
-          <ac:chgData name="German Luis Dagatti" userId="43e7766c8bef1a99" providerId="LiveId" clId="{571E5FA9-B83F-472B-AE41-7DE03044985C}" dt="2025-04-21T02:28:11.641" v="257" actId="34807"/>
-          <ac:spMkLst>
-            <pc:docMk/>
-            <pc:sldMk cId="1792972683" sldId="2567"/>
-            <ac:spMk id="9" creationId="{19F9BF86-FE94-4517-B97D-026C7515E589}"/>
-          </ac:spMkLst>
-        </pc:spChg>
-        <pc:cxnChg chg="add del">
-          <ac:chgData name="German Luis Dagatti" userId="43e7766c8bef1a99" providerId="LiveId" clId="{571E5FA9-B83F-472B-AE41-7DE03044985C}" dt="2025-04-21T02:28:11.641" v="257" actId="34807"/>
-          <ac:cxnSpMkLst>
-            <pc:docMk/>
-            <pc:sldMk cId="1792972683" sldId="2567"/>
-            <ac:cxnSpMk id="11" creationId="{53C0BBAA-A5EC-5D5D-32E6-9F7EA6048489}"/>
-          </ac:cxnSpMkLst>
-        </pc:cxnChg>
       </pc:sldChg>
       <pc:sldChg chg="addSp delSp modSp add del mod modTransition setBg modClrScheme addAnim delAnim chgLayout">
         <pc:chgData name="German Luis Dagatti" userId="43e7766c8bef1a99" providerId="LiveId" clId="{571E5FA9-B83F-472B-AE41-7DE03044985C}" dt="2025-04-21T02:28:11.641" v="257" actId="34807"/>
@@ -926,54 +403,6 @@
           <pc:docMk/>
           <pc:sldMk cId="475086946" sldId="2568"/>
         </pc:sldMkLst>
-        <pc:spChg chg="mod">
-          <ac:chgData name="German Luis Dagatti" userId="43e7766c8bef1a99" providerId="LiveId" clId="{571E5FA9-B83F-472B-AE41-7DE03044985C}" dt="2025-04-21T02:28:11.641" v="257" actId="34807"/>
-          <ac:spMkLst>
-            <pc:docMk/>
-            <pc:sldMk cId="475086946" sldId="2568"/>
-            <ac:spMk id="2" creationId="{AA5E9D29-4056-EA79-DB0E-815D956620F4}"/>
-          </ac:spMkLst>
-        </pc:spChg>
-        <pc:spChg chg="mod">
-          <ac:chgData name="German Luis Dagatti" userId="43e7766c8bef1a99" providerId="LiveId" clId="{571E5FA9-B83F-472B-AE41-7DE03044985C}" dt="2025-04-21T02:28:11.641" v="257" actId="34807"/>
-          <ac:spMkLst>
-            <pc:docMk/>
-            <pc:sldMk cId="475086946" sldId="2568"/>
-            <ac:spMk id="4" creationId="{CDAA9F17-0D81-54E8-9398-3F4FAB6BF0B6}"/>
-          </ac:spMkLst>
-        </pc:spChg>
-        <pc:spChg chg="add del">
-          <ac:chgData name="German Luis Dagatti" userId="43e7766c8bef1a99" providerId="LiveId" clId="{571E5FA9-B83F-472B-AE41-7DE03044985C}" dt="2025-04-21T02:28:11.641" v="257" actId="34807"/>
-          <ac:spMkLst>
-            <pc:docMk/>
-            <pc:sldMk cId="475086946" sldId="2568"/>
-            <ac:spMk id="12" creationId="{744CAA32-F237-419C-A2DD-43C28D920D3C}"/>
-          </ac:spMkLst>
-        </pc:spChg>
-        <pc:picChg chg="mod">
-          <ac:chgData name="German Luis Dagatti" userId="43e7766c8bef1a99" providerId="LiveId" clId="{571E5FA9-B83F-472B-AE41-7DE03044985C}" dt="2025-04-21T02:28:11.641" v="257" actId="34807"/>
-          <ac:picMkLst>
-            <pc:docMk/>
-            <pc:sldMk cId="475086946" sldId="2568"/>
-            <ac:picMk id="5" creationId="{3F098EE9-B0C3-45F3-BD3F-4B3DE23138C5}"/>
-          </ac:picMkLst>
-        </pc:picChg>
-        <pc:cxnChg chg="add del">
-          <ac:chgData name="German Luis Dagatti" userId="43e7766c8bef1a99" providerId="LiveId" clId="{571E5FA9-B83F-472B-AE41-7DE03044985C}" dt="2025-04-21T02:28:11.641" v="257" actId="34807"/>
-          <ac:cxnSpMkLst>
-            <pc:docMk/>
-            <pc:sldMk cId="475086946" sldId="2568"/>
-            <ac:cxnSpMk id="10" creationId="{118E06E4-607B-144B-382B-AD3D06B1EE8C}"/>
-          </ac:cxnSpMkLst>
-        </pc:cxnChg>
-        <pc:cxnChg chg="add del">
-          <ac:chgData name="German Luis Dagatti" userId="43e7766c8bef1a99" providerId="LiveId" clId="{571E5FA9-B83F-472B-AE41-7DE03044985C}" dt="2025-04-21T02:28:11.641" v="257" actId="34807"/>
-          <ac:cxnSpMkLst>
-            <pc:docMk/>
-            <pc:sldMk cId="475086946" sldId="2568"/>
-            <ac:cxnSpMk id="14" creationId="{08052531-D50B-3899-B150-D05525F4F2BC}"/>
-          </ac:cxnSpMkLst>
-        </pc:cxnChg>
       </pc:sldChg>
       <pc:sldChg chg="addSp delSp modSp add del mod modTransition setBg modClrScheme addAnim delAnim chgLayout">
         <pc:chgData name="German Luis Dagatti" userId="43e7766c8bef1a99" providerId="LiveId" clId="{571E5FA9-B83F-472B-AE41-7DE03044985C}" dt="2025-04-21T02:37:57.584" v="276" actId="34807"/>
@@ -981,54 +410,6 @@
           <pc:docMk/>
           <pc:sldMk cId="2757882261" sldId="2568"/>
         </pc:sldMkLst>
-        <pc:spChg chg="mod">
-          <ac:chgData name="German Luis Dagatti" userId="43e7766c8bef1a99" providerId="LiveId" clId="{571E5FA9-B83F-472B-AE41-7DE03044985C}" dt="2025-04-21T02:37:57.584" v="276" actId="34807"/>
-          <ac:spMkLst>
-            <pc:docMk/>
-            <pc:sldMk cId="2757882261" sldId="2568"/>
-            <ac:spMk id="2" creationId="{A26DBAE7-2320-379F-9DC2-020F987D224F}"/>
-          </ac:spMkLst>
-        </pc:spChg>
-        <pc:spChg chg="mod">
-          <ac:chgData name="German Luis Dagatti" userId="43e7766c8bef1a99" providerId="LiveId" clId="{571E5FA9-B83F-472B-AE41-7DE03044985C}" dt="2025-04-21T02:37:57.584" v="276" actId="34807"/>
-          <ac:spMkLst>
-            <pc:docMk/>
-            <pc:sldMk cId="2757882261" sldId="2568"/>
-            <ac:spMk id="4" creationId="{E0B8D00F-AD45-1EB8-18FF-C54EF2456C5D}"/>
-          </ac:spMkLst>
-        </pc:spChg>
-        <pc:spChg chg="add del">
-          <ac:chgData name="German Luis Dagatti" userId="43e7766c8bef1a99" providerId="LiveId" clId="{571E5FA9-B83F-472B-AE41-7DE03044985C}" dt="2025-04-21T02:37:57.584" v="276" actId="34807"/>
-          <ac:spMkLst>
-            <pc:docMk/>
-            <pc:sldMk cId="2757882261" sldId="2568"/>
-            <ac:spMk id="12" creationId="{744CAA32-F237-419C-A2DD-43C28D920D3C}"/>
-          </ac:spMkLst>
-        </pc:spChg>
-        <pc:picChg chg="mod ord">
-          <ac:chgData name="German Luis Dagatti" userId="43e7766c8bef1a99" providerId="LiveId" clId="{571E5FA9-B83F-472B-AE41-7DE03044985C}" dt="2025-04-21T02:37:57.584" v="276" actId="34807"/>
-          <ac:picMkLst>
-            <pc:docMk/>
-            <pc:sldMk cId="2757882261" sldId="2568"/>
-            <ac:picMk id="5" creationId="{EF1CD388-660F-4F92-BD56-A2FE07B3C0FE}"/>
-          </ac:picMkLst>
-        </pc:picChg>
-        <pc:cxnChg chg="add del">
-          <ac:chgData name="German Luis Dagatti" userId="43e7766c8bef1a99" providerId="LiveId" clId="{571E5FA9-B83F-472B-AE41-7DE03044985C}" dt="2025-04-21T02:37:57.584" v="276" actId="34807"/>
-          <ac:cxnSpMkLst>
-            <pc:docMk/>
-            <pc:sldMk cId="2757882261" sldId="2568"/>
-            <ac:cxnSpMk id="10" creationId="{118E06E4-607B-144B-382B-AD3D06B1EE8C}"/>
-          </ac:cxnSpMkLst>
-        </pc:cxnChg>
-        <pc:cxnChg chg="add del">
-          <ac:chgData name="German Luis Dagatti" userId="43e7766c8bef1a99" providerId="LiveId" clId="{571E5FA9-B83F-472B-AE41-7DE03044985C}" dt="2025-04-21T02:37:57.584" v="276" actId="34807"/>
-          <ac:cxnSpMkLst>
-            <pc:docMk/>
-            <pc:sldMk cId="2757882261" sldId="2568"/>
-            <ac:cxnSpMk id="14" creationId="{92025DBA-8780-9CA0-2826-FF6E3BD1A0C9}"/>
-          </ac:cxnSpMkLst>
-        </pc:cxnChg>
       </pc:sldChg>
       <pc:sldChg chg="addSp delSp modSp add del mod modTransition setBg modClrScheme addAnim delAnim chgLayout">
         <pc:chgData name="German Luis Dagatti" userId="43e7766c8bef1a99" providerId="LiveId" clId="{571E5FA9-B83F-472B-AE41-7DE03044985C}" dt="2025-04-21T02:28:11.641" v="257" actId="34807"/>
@@ -1036,54 +417,6 @@
           <pc:docMk/>
           <pc:sldMk cId="2075364377" sldId="2569"/>
         </pc:sldMkLst>
-        <pc:spChg chg="mod">
-          <ac:chgData name="German Luis Dagatti" userId="43e7766c8bef1a99" providerId="LiveId" clId="{571E5FA9-B83F-472B-AE41-7DE03044985C}" dt="2025-04-21T02:28:11.641" v="257" actId="34807"/>
-          <ac:spMkLst>
-            <pc:docMk/>
-            <pc:sldMk cId="2075364377" sldId="2569"/>
-            <ac:spMk id="2" creationId="{570AE1FA-875E-248C-8FF8-F603F45F9C30}"/>
-          </ac:spMkLst>
-        </pc:spChg>
-        <pc:spChg chg="mod">
-          <ac:chgData name="German Luis Dagatti" userId="43e7766c8bef1a99" providerId="LiveId" clId="{571E5FA9-B83F-472B-AE41-7DE03044985C}" dt="2025-04-21T02:28:11.641" v="257" actId="34807"/>
-          <ac:spMkLst>
-            <pc:docMk/>
-            <pc:sldMk cId="2075364377" sldId="2569"/>
-            <ac:spMk id="4" creationId="{22243202-5C7A-EC0F-E336-80368E761EF2}"/>
-          </ac:spMkLst>
-        </pc:spChg>
-        <pc:spChg chg="add del">
-          <ac:chgData name="German Luis Dagatti" userId="43e7766c8bef1a99" providerId="LiveId" clId="{571E5FA9-B83F-472B-AE41-7DE03044985C}" dt="2025-04-21T02:28:11.641" v="257" actId="34807"/>
-          <ac:spMkLst>
-            <pc:docMk/>
-            <pc:sldMk cId="2075364377" sldId="2569"/>
-            <ac:spMk id="12" creationId="{744CAA32-F237-419C-A2DD-43C28D920D3C}"/>
-          </ac:spMkLst>
-        </pc:spChg>
-        <pc:picChg chg="mod">
-          <ac:chgData name="German Luis Dagatti" userId="43e7766c8bef1a99" providerId="LiveId" clId="{571E5FA9-B83F-472B-AE41-7DE03044985C}" dt="2025-04-21T02:28:11.641" v="257" actId="34807"/>
-          <ac:picMkLst>
-            <pc:docMk/>
-            <pc:sldMk cId="2075364377" sldId="2569"/>
-            <ac:picMk id="5" creationId="{CF861445-6BE6-42DE-B851-573253E3CBEB}"/>
-          </ac:picMkLst>
-        </pc:picChg>
-        <pc:cxnChg chg="add del">
-          <ac:chgData name="German Luis Dagatti" userId="43e7766c8bef1a99" providerId="LiveId" clId="{571E5FA9-B83F-472B-AE41-7DE03044985C}" dt="2025-04-21T02:28:11.641" v="257" actId="34807"/>
-          <ac:cxnSpMkLst>
-            <pc:docMk/>
-            <pc:sldMk cId="2075364377" sldId="2569"/>
-            <ac:cxnSpMk id="10" creationId="{118E06E4-607B-144B-382B-AD3D06B1EE8C}"/>
-          </ac:cxnSpMkLst>
-        </pc:cxnChg>
-        <pc:cxnChg chg="add del">
-          <ac:chgData name="German Luis Dagatti" userId="43e7766c8bef1a99" providerId="LiveId" clId="{571E5FA9-B83F-472B-AE41-7DE03044985C}" dt="2025-04-21T02:28:11.641" v="257" actId="34807"/>
-          <ac:cxnSpMkLst>
-            <pc:docMk/>
-            <pc:sldMk cId="2075364377" sldId="2569"/>
-            <ac:cxnSpMk id="14" creationId="{08052531-D50B-3899-B150-D05525F4F2BC}"/>
-          </ac:cxnSpMkLst>
-        </pc:cxnChg>
       </pc:sldChg>
       <pc:sldChg chg="addSp delSp modSp add del mod modTransition setBg modClrScheme addAnim delAnim chgLayout">
         <pc:chgData name="German Luis Dagatti" userId="43e7766c8bef1a99" providerId="LiveId" clId="{571E5FA9-B83F-472B-AE41-7DE03044985C}" dt="2025-04-21T02:37:57.584" v="276" actId="34807"/>
@@ -1091,54 +424,6 @@
           <pc:docMk/>
           <pc:sldMk cId="3118136047" sldId="2569"/>
         </pc:sldMkLst>
-        <pc:spChg chg="mod">
-          <ac:chgData name="German Luis Dagatti" userId="43e7766c8bef1a99" providerId="LiveId" clId="{571E5FA9-B83F-472B-AE41-7DE03044985C}" dt="2025-04-21T02:37:57.584" v="276" actId="34807"/>
-          <ac:spMkLst>
-            <pc:docMk/>
-            <pc:sldMk cId="3118136047" sldId="2569"/>
-            <ac:spMk id="2" creationId="{E77558CD-C252-BB0D-A05A-BDDD82FFBF3F}"/>
-          </ac:spMkLst>
-        </pc:spChg>
-        <pc:spChg chg="mod">
-          <ac:chgData name="German Luis Dagatti" userId="43e7766c8bef1a99" providerId="LiveId" clId="{571E5FA9-B83F-472B-AE41-7DE03044985C}" dt="2025-04-21T02:37:57.584" v="276" actId="34807"/>
-          <ac:spMkLst>
-            <pc:docMk/>
-            <pc:sldMk cId="3118136047" sldId="2569"/>
-            <ac:spMk id="4" creationId="{ADD34CAA-F772-A2CB-00D0-6A185801FA05}"/>
-          </ac:spMkLst>
-        </pc:spChg>
-        <pc:spChg chg="add del">
-          <ac:chgData name="German Luis Dagatti" userId="43e7766c8bef1a99" providerId="LiveId" clId="{571E5FA9-B83F-472B-AE41-7DE03044985C}" dt="2025-04-21T02:37:57.584" v="276" actId="34807"/>
-          <ac:spMkLst>
-            <pc:docMk/>
-            <pc:sldMk cId="3118136047" sldId="2569"/>
-            <ac:spMk id="12" creationId="{744CAA32-F237-419C-A2DD-43C28D920D3C}"/>
-          </ac:spMkLst>
-        </pc:spChg>
-        <pc:picChg chg="mod">
-          <ac:chgData name="German Luis Dagatti" userId="43e7766c8bef1a99" providerId="LiveId" clId="{571E5FA9-B83F-472B-AE41-7DE03044985C}" dt="2025-04-21T02:37:57.584" v="276" actId="34807"/>
-          <ac:picMkLst>
-            <pc:docMk/>
-            <pc:sldMk cId="3118136047" sldId="2569"/>
-            <ac:picMk id="5" creationId="{D0EE5B5A-BCED-4011-9382-0646CF611EF5}"/>
-          </ac:picMkLst>
-        </pc:picChg>
-        <pc:cxnChg chg="add del">
-          <ac:chgData name="German Luis Dagatti" userId="43e7766c8bef1a99" providerId="LiveId" clId="{571E5FA9-B83F-472B-AE41-7DE03044985C}" dt="2025-04-21T02:37:57.584" v="276" actId="34807"/>
-          <ac:cxnSpMkLst>
-            <pc:docMk/>
-            <pc:sldMk cId="3118136047" sldId="2569"/>
-            <ac:cxnSpMk id="10" creationId="{118E06E4-607B-144B-382B-AD3D06B1EE8C}"/>
-          </ac:cxnSpMkLst>
-        </pc:cxnChg>
-        <pc:cxnChg chg="add del">
-          <ac:chgData name="German Luis Dagatti" userId="43e7766c8bef1a99" providerId="LiveId" clId="{571E5FA9-B83F-472B-AE41-7DE03044985C}" dt="2025-04-21T02:37:57.584" v="276" actId="34807"/>
-          <ac:cxnSpMkLst>
-            <pc:docMk/>
-            <pc:sldMk cId="3118136047" sldId="2569"/>
-            <ac:cxnSpMk id="14" creationId="{08052531-D50B-3899-B150-D05525F4F2BC}"/>
-          </ac:cxnSpMkLst>
-        </pc:cxnChg>
       </pc:sldChg>
       <pc:sldChg chg="addSp delSp modSp add del mod modTransition setBg modClrScheme addAnim delAnim chgLayout">
         <pc:chgData name="German Luis Dagatti" userId="43e7766c8bef1a99" providerId="LiveId" clId="{571E5FA9-B83F-472B-AE41-7DE03044985C}" dt="2025-04-21T02:37:57.584" v="276" actId="34807"/>
@@ -1146,38 +431,6 @@
           <pc:docMk/>
           <pc:sldMk cId="1390215326" sldId="2570"/>
         </pc:sldMkLst>
-        <pc:spChg chg="mod">
-          <ac:chgData name="German Luis Dagatti" userId="43e7766c8bef1a99" providerId="LiveId" clId="{571E5FA9-B83F-472B-AE41-7DE03044985C}" dt="2025-04-21T02:37:57.584" v="276" actId="34807"/>
-          <ac:spMkLst>
-            <pc:docMk/>
-            <pc:sldMk cId="1390215326" sldId="2570"/>
-            <ac:spMk id="2" creationId="{891B7F7A-CC2B-37DF-61F4-A25EEFD3B3C6}"/>
-          </ac:spMkLst>
-        </pc:spChg>
-        <pc:spChg chg="add del">
-          <ac:chgData name="German Luis Dagatti" userId="43e7766c8bef1a99" providerId="LiveId" clId="{571E5FA9-B83F-472B-AE41-7DE03044985C}" dt="2025-04-21T02:37:57.584" v="276" actId="34807"/>
-          <ac:spMkLst>
-            <pc:docMk/>
-            <pc:sldMk cId="1390215326" sldId="2570"/>
-            <ac:spMk id="7" creationId="{46B9231A-B34B-4A29-A6AC-532E1EE81575}"/>
-          </ac:spMkLst>
-        </pc:spChg>
-        <pc:spChg chg="add del">
-          <ac:chgData name="German Luis Dagatti" userId="43e7766c8bef1a99" providerId="LiveId" clId="{571E5FA9-B83F-472B-AE41-7DE03044985C}" dt="2025-04-21T02:37:57.584" v="276" actId="34807"/>
-          <ac:spMkLst>
-            <pc:docMk/>
-            <pc:sldMk cId="1390215326" sldId="2570"/>
-            <ac:spMk id="9" creationId="{19F9BF86-FE94-4517-B97D-026C7515E589}"/>
-          </ac:spMkLst>
-        </pc:spChg>
-        <pc:cxnChg chg="add del">
-          <ac:chgData name="German Luis Dagatti" userId="43e7766c8bef1a99" providerId="LiveId" clId="{571E5FA9-B83F-472B-AE41-7DE03044985C}" dt="2025-04-21T02:37:57.584" v="276" actId="34807"/>
-          <ac:cxnSpMkLst>
-            <pc:docMk/>
-            <pc:sldMk cId="1390215326" sldId="2570"/>
-            <ac:cxnSpMk id="11" creationId="{53C0BBAA-A5EC-5D5D-32E6-9F7EA6048489}"/>
-          </ac:cxnSpMkLst>
-        </pc:cxnChg>
       </pc:sldChg>
       <pc:sldChg chg="addSp delSp modSp add del mod modTransition setBg modClrScheme addAnim delAnim chgLayout">
         <pc:chgData name="German Luis Dagatti" userId="43e7766c8bef1a99" providerId="LiveId" clId="{571E5FA9-B83F-472B-AE41-7DE03044985C}" dt="2025-04-21T02:28:11.641" v="257" actId="34807"/>
@@ -1185,38 +438,6 @@
           <pc:docMk/>
           <pc:sldMk cId="1559812213" sldId="2570"/>
         </pc:sldMkLst>
-        <pc:spChg chg="mod">
-          <ac:chgData name="German Luis Dagatti" userId="43e7766c8bef1a99" providerId="LiveId" clId="{571E5FA9-B83F-472B-AE41-7DE03044985C}" dt="2025-04-21T02:28:11.641" v="257" actId="34807"/>
-          <ac:spMkLst>
-            <pc:docMk/>
-            <pc:sldMk cId="1559812213" sldId="2570"/>
-            <ac:spMk id="2" creationId="{E6C3F4D1-471C-6461-1F41-0A9B198D3998}"/>
-          </ac:spMkLst>
-        </pc:spChg>
-        <pc:spChg chg="add del">
-          <ac:chgData name="German Luis Dagatti" userId="43e7766c8bef1a99" providerId="LiveId" clId="{571E5FA9-B83F-472B-AE41-7DE03044985C}" dt="2025-04-21T02:28:11.641" v="257" actId="34807"/>
-          <ac:spMkLst>
-            <pc:docMk/>
-            <pc:sldMk cId="1559812213" sldId="2570"/>
-            <ac:spMk id="7" creationId="{46B9231A-B34B-4A29-A6AC-532E1EE81575}"/>
-          </ac:spMkLst>
-        </pc:spChg>
-        <pc:spChg chg="add del">
-          <ac:chgData name="German Luis Dagatti" userId="43e7766c8bef1a99" providerId="LiveId" clId="{571E5FA9-B83F-472B-AE41-7DE03044985C}" dt="2025-04-21T02:28:11.641" v="257" actId="34807"/>
-          <ac:spMkLst>
-            <pc:docMk/>
-            <pc:sldMk cId="1559812213" sldId="2570"/>
-            <ac:spMk id="9" creationId="{19F9BF86-FE94-4517-B97D-026C7515E589}"/>
-          </ac:spMkLst>
-        </pc:spChg>
-        <pc:cxnChg chg="add del">
-          <ac:chgData name="German Luis Dagatti" userId="43e7766c8bef1a99" providerId="LiveId" clId="{571E5FA9-B83F-472B-AE41-7DE03044985C}" dt="2025-04-21T02:28:11.641" v="257" actId="34807"/>
-          <ac:cxnSpMkLst>
-            <pc:docMk/>
-            <pc:sldMk cId="1559812213" sldId="2570"/>
-            <ac:cxnSpMk id="11" creationId="{53C0BBAA-A5EC-5D5D-32E6-9F7EA6048489}"/>
-          </ac:cxnSpMkLst>
-        </pc:cxnChg>
       </pc:sldChg>
       <pc:sldChg chg="addSp delSp modSp add del mod modTransition setBg modClrScheme addAnim delAnim chgLayout">
         <pc:chgData name="German Luis Dagatti" userId="43e7766c8bef1a99" providerId="LiveId" clId="{571E5FA9-B83F-472B-AE41-7DE03044985C}" dt="2025-04-21T02:37:57.584" v="276" actId="34807"/>
@@ -1224,54 +445,6 @@
           <pc:docMk/>
           <pc:sldMk cId="331509745" sldId="2571"/>
         </pc:sldMkLst>
-        <pc:spChg chg="mod">
-          <ac:chgData name="German Luis Dagatti" userId="43e7766c8bef1a99" providerId="LiveId" clId="{571E5FA9-B83F-472B-AE41-7DE03044985C}" dt="2025-04-21T02:37:57.584" v="276" actId="34807"/>
-          <ac:spMkLst>
-            <pc:docMk/>
-            <pc:sldMk cId="331509745" sldId="2571"/>
-            <ac:spMk id="2" creationId="{10BC7E8F-B2D8-8164-803A-29C2D31C126A}"/>
-          </ac:spMkLst>
-        </pc:spChg>
-        <pc:spChg chg="mod">
-          <ac:chgData name="German Luis Dagatti" userId="43e7766c8bef1a99" providerId="LiveId" clId="{571E5FA9-B83F-472B-AE41-7DE03044985C}" dt="2025-04-21T02:37:57.584" v="276" actId="34807"/>
-          <ac:spMkLst>
-            <pc:docMk/>
-            <pc:sldMk cId="331509745" sldId="2571"/>
-            <ac:spMk id="4" creationId="{03A3B779-146B-627B-7340-8E5B24A57E5C}"/>
-          </ac:spMkLst>
-        </pc:spChg>
-        <pc:spChg chg="add del">
-          <ac:chgData name="German Luis Dagatti" userId="43e7766c8bef1a99" providerId="LiveId" clId="{571E5FA9-B83F-472B-AE41-7DE03044985C}" dt="2025-04-21T02:37:57.584" v="276" actId="34807"/>
-          <ac:spMkLst>
-            <pc:docMk/>
-            <pc:sldMk cId="331509745" sldId="2571"/>
-            <ac:spMk id="12" creationId="{744CAA32-F237-419C-A2DD-43C28D920D3C}"/>
-          </ac:spMkLst>
-        </pc:spChg>
-        <pc:picChg chg="mod ord">
-          <ac:chgData name="German Luis Dagatti" userId="43e7766c8bef1a99" providerId="LiveId" clId="{571E5FA9-B83F-472B-AE41-7DE03044985C}" dt="2025-04-21T02:37:57.584" v="276" actId="34807"/>
-          <ac:picMkLst>
-            <pc:docMk/>
-            <pc:sldMk cId="331509745" sldId="2571"/>
-            <ac:picMk id="5" creationId="{EA8EC3BB-6E25-4435-87DF-DB753A8A053C}"/>
-          </ac:picMkLst>
-        </pc:picChg>
-        <pc:cxnChg chg="add del">
-          <ac:chgData name="German Luis Dagatti" userId="43e7766c8bef1a99" providerId="LiveId" clId="{571E5FA9-B83F-472B-AE41-7DE03044985C}" dt="2025-04-21T02:37:57.584" v="276" actId="34807"/>
-          <ac:cxnSpMkLst>
-            <pc:docMk/>
-            <pc:sldMk cId="331509745" sldId="2571"/>
-            <ac:cxnSpMk id="10" creationId="{118E06E4-607B-144B-382B-AD3D06B1EE8C}"/>
-          </ac:cxnSpMkLst>
-        </pc:cxnChg>
-        <pc:cxnChg chg="add del">
-          <ac:chgData name="German Luis Dagatti" userId="43e7766c8bef1a99" providerId="LiveId" clId="{571E5FA9-B83F-472B-AE41-7DE03044985C}" dt="2025-04-21T02:37:57.584" v="276" actId="34807"/>
-          <ac:cxnSpMkLst>
-            <pc:docMk/>
-            <pc:sldMk cId="331509745" sldId="2571"/>
-            <ac:cxnSpMk id="14" creationId="{92025DBA-8780-9CA0-2826-FF6E3BD1A0C9}"/>
-          </ac:cxnSpMkLst>
-        </pc:cxnChg>
       </pc:sldChg>
       <pc:sldChg chg="addSp delSp modSp add del mod modTransition setBg modClrScheme addAnim delAnim chgLayout">
         <pc:chgData name="German Luis Dagatti" userId="43e7766c8bef1a99" providerId="LiveId" clId="{571E5FA9-B83F-472B-AE41-7DE03044985C}" dt="2025-04-21T02:28:11.641" v="257" actId="34807"/>
@@ -1279,54 +452,6 @@
           <pc:docMk/>
           <pc:sldMk cId="1072426033" sldId="2571"/>
         </pc:sldMkLst>
-        <pc:spChg chg="mod">
-          <ac:chgData name="German Luis Dagatti" userId="43e7766c8bef1a99" providerId="LiveId" clId="{571E5FA9-B83F-472B-AE41-7DE03044985C}" dt="2025-04-21T02:28:11.641" v="257" actId="34807"/>
-          <ac:spMkLst>
-            <pc:docMk/>
-            <pc:sldMk cId="1072426033" sldId="2571"/>
-            <ac:spMk id="2" creationId="{4E0B6C76-69CD-5ED3-FD63-C754506FF604}"/>
-          </ac:spMkLst>
-        </pc:spChg>
-        <pc:spChg chg="mod">
-          <ac:chgData name="German Luis Dagatti" userId="43e7766c8bef1a99" providerId="LiveId" clId="{571E5FA9-B83F-472B-AE41-7DE03044985C}" dt="2025-04-21T02:28:11.641" v="257" actId="34807"/>
-          <ac:spMkLst>
-            <pc:docMk/>
-            <pc:sldMk cId="1072426033" sldId="2571"/>
-            <ac:spMk id="4" creationId="{9915FEFE-8330-429B-D654-92801C6FEDF3}"/>
-          </ac:spMkLst>
-        </pc:spChg>
-        <pc:spChg chg="add del">
-          <ac:chgData name="German Luis Dagatti" userId="43e7766c8bef1a99" providerId="LiveId" clId="{571E5FA9-B83F-472B-AE41-7DE03044985C}" dt="2025-04-21T02:28:11.641" v="257" actId="34807"/>
-          <ac:spMkLst>
-            <pc:docMk/>
-            <pc:sldMk cId="1072426033" sldId="2571"/>
-            <ac:spMk id="12" creationId="{744CAA32-F237-419C-A2DD-43C28D920D3C}"/>
-          </ac:spMkLst>
-        </pc:spChg>
-        <pc:picChg chg="mod ord">
-          <ac:chgData name="German Luis Dagatti" userId="43e7766c8bef1a99" providerId="LiveId" clId="{571E5FA9-B83F-472B-AE41-7DE03044985C}" dt="2025-04-21T02:28:11.641" v="257" actId="34807"/>
-          <ac:picMkLst>
-            <pc:docMk/>
-            <pc:sldMk cId="1072426033" sldId="2571"/>
-            <ac:picMk id="5" creationId="{0ED0CC9E-F89C-4D2B-BA09-36EC5E23ED2A}"/>
-          </ac:picMkLst>
-        </pc:picChg>
-        <pc:cxnChg chg="add del">
-          <ac:chgData name="German Luis Dagatti" userId="43e7766c8bef1a99" providerId="LiveId" clId="{571E5FA9-B83F-472B-AE41-7DE03044985C}" dt="2025-04-21T02:28:11.641" v="257" actId="34807"/>
-          <ac:cxnSpMkLst>
-            <pc:docMk/>
-            <pc:sldMk cId="1072426033" sldId="2571"/>
-            <ac:cxnSpMk id="10" creationId="{118E06E4-607B-144B-382B-AD3D06B1EE8C}"/>
-          </ac:cxnSpMkLst>
-        </pc:cxnChg>
-        <pc:cxnChg chg="add del">
-          <ac:chgData name="German Luis Dagatti" userId="43e7766c8bef1a99" providerId="LiveId" clId="{571E5FA9-B83F-472B-AE41-7DE03044985C}" dt="2025-04-21T02:28:11.641" v="257" actId="34807"/>
-          <ac:cxnSpMkLst>
-            <pc:docMk/>
-            <pc:sldMk cId="1072426033" sldId="2571"/>
-            <ac:cxnSpMk id="14" creationId="{92025DBA-8780-9CA0-2826-FF6E3BD1A0C9}"/>
-          </ac:cxnSpMkLst>
-        </pc:cxnChg>
       </pc:sldChg>
       <pc:sldChg chg="addSp delSp modSp add del mod modTransition setBg modClrScheme addAnim delAnim chgLayout">
         <pc:chgData name="German Luis Dagatti" userId="43e7766c8bef1a99" providerId="LiveId" clId="{571E5FA9-B83F-472B-AE41-7DE03044985C}" dt="2025-04-21T02:37:57.584" v="276" actId="34807"/>
@@ -1334,54 +459,6 @@
           <pc:docMk/>
           <pc:sldMk cId="1339481629" sldId="2572"/>
         </pc:sldMkLst>
-        <pc:spChg chg="mod">
-          <ac:chgData name="German Luis Dagatti" userId="43e7766c8bef1a99" providerId="LiveId" clId="{571E5FA9-B83F-472B-AE41-7DE03044985C}" dt="2025-04-21T02:37:57.584" v="276" actId="34807"/>
-          <ac:spMkLst>
-            <pc:docMk/>
-            <pc:sldMk cId="1339481629" sldId="2572"/>
-            <ac:spMk id="2" creationId="{2093D348-D7AA-47A9-5907-93C672336116}"/>
-          </ac:spMkLst>
-        </pc:spChg>
-        <pc:spChg chg="mod">
-          <ac:chgData name="German Luis Dagatti" userId="43e7766c8bef1a99" providerId="LiveId" clId="{571E5FA9-B83F-472B-AE41-7DE03044985C}" dt="2025-04-21T02:37:57.584" v="276" actId="34807"/>
-          <ac:spMkLst>
-            <pc:docMk/>
-            <pc:sldMk cId="1339481629" sldId="2572"/>
-            <ac:spMk id="4" creationId="{98A9D0F9-53FA-5B6E-667C-3119A6FCE5C9}"/>
-          </ac:spMkLst>
-        </pc:spChg>
-        <pc:spChg chg="add del">
-          <ac:chgData name="German Luis Dagatti" userId="43e7766c8bef1a99" providerId="LiveId" clId="{571E5FA9-B83F-472B-AE41-7DE03044985C}" dt="2025-04-21T02:37:57.584" v="276" actId="34807"/>
-          <ac:spMkLst>
-            <pc:docMk/>
-            <pc:sldMk cId="1339481629" sldId="2572"/>
-            <ac:spMk id="12" creationId="{744CAA32-F237-419C-A2DD-43C28D920D3C}"/>
-          </ac:spMkLst>
-        </pc:spChg>
-        <pc:picChg chg="mod">
-          <ac:chgData name="German Luis Dagatti" userId="43e7766c8bef1a99" providerId="LiveId" clId="{571E5FA9-B83F-472B-AE41-7DE03044985C}" dt="2025-04-21T02:37:57.584" v="276" actId="34807"/>
-          <ac:picMkLst>
-            <pc:docMk/>
-            <pc:sldMk cId="1339481629" sldId="2572"/>
-            <ac:picMk id="5" creationId="{E2AB63DF-9DFB-4597-B914-AA7636BBB5B4}"/>
-          </ac:picMkLst>
-        </pc:picChg>
-        <pc:cxnChg chg="add del">
-          <ac:chgData name="German Luis Dagatti" userId="43e7766c8bef1a99" providerId="LiveId" clId="{571E5FA9-B83F-472B-AE41-7DE03044985C}" dt="2025-04-21T02:37:57.584" v="276" actId="34807"/>
-          <ac:cxnSpMkLst>
-            <pc:docMk/>
-            <pc:sldMk cId="1339481629" sldId="2572"/>
-            <ac:cxnSpMk id="10" creationId="{118E06E4-607B-144B-382B-AD3D06B1EE8C}"/>
-          </ac:cxnSpMkLst>
-        </pc:cxnChg>
-        <pc:cxnChg chg="add del">
-          <ac:chgData name="German Luis Dagatti" userId="43e7766c8bef1a99" providerId="LiveId" clId="{571E5FA9-B83F-472B-AE41-7DE03044985C}" dt="2025-04-21T02:37:57.584" v="276" actId="34807"/>
-          <ac:cxnSpMkLst>
-            <pc:docMk/>
-            <pc:sldMk cId="1339481629" sldId="2572"/>
-            <ac:cxnSpMk id="14" creationId="{08052531-D50B-3899-B150-D05525F4F2BC}"/>
-          </ac:cxnSpMkLst>
-        </pc:cxnChg>
       </pc:sldChg>
       <pc:sldChg chg="addSp delSp modSp add del mod modTransition setBg modClrScheme addAnim delAnim chgLayout">
         <pc:chgData name="German Luis Dagatti" userId="43e7766c8bef1a99" providerId="LiveId" clId="{571E5FA9-B83F-472B-AE41-7DE03044985C}" dt="2025-04-21T02:28:11.641" v="257" actId="34807"/>
@@ -1389,54 +466,6 @@
           <pc:docMk/>
           <pc:sldMk cId="1712489481" sldId="2572"/>
         </pc:sldMkLst>
-        <pc:spChg chg="mod">
-          <ac:chgData name="German Luis Dagatti" userId="43e7766c8bef1a99" providerId="LiveId" clId="{571E5FA9-B83F-472B-AE41-7DE03044985C}" dt="2025-04-21T02:28:11.641" v="257" actId="34807"/>
-          <ac:spMkLst>
-            <pc:docMk/>
-            <pc:sldMk cId="1712489481" sldId="2572"/>
-            <ac:spMk id="2" creationId="{6EB5C5E1-5F52-BB24-3E24-64FFF022E940}"/>
-          </ac:spMkLst>
-        </pc:spChg>
-        <pc:spChg chg="mod">
-          <ac:chgData name="German Luis Dagatti" userId="43e7766c8bef1a99" providerId="LiveId" clId="{571E5FA9-B83F-472B-AE41-7DE03044985C}" dt="2025-04-21T02:28:11.641" v="257" actId="34807"/>
-          <ac:spMkLst>
-            <pc:docMk/>
-            <pc:sldMk cId="1712489481" sldId="2572"/>
-            <ac:spMk id="4" creationId="{360A8BA2-87D3-2802-79EE-B5E055B01569}"/>
-          </ac:spMkLst>
-        </pc:spChg>
-        <pc:spChg chg="add del">
-          <ac:chgData name="German Luis Dagatti" userId="43e7766c8bef1a99" providerId="LiveId" clId="{571E5FA9-B83F-472B-AE41-7DE03044985C}" dt="2025-04-21T02:28:11.641" v="257" actId="34807"/>
-          <ac:spMkLst>
-            <pc:docMk/>
-            <pc:sldMk cId="1712489481" sldId="2572"/>
-            <ac:spMk id="12" creationId="{744CAA32-F237-419C-A2DD-43C28D920D3C}"/>
-          </ac:spMkLst>
-        </pc:spChg>
-        <pc:picChg chg="mod">
-          <ac:chgData name="German Luis Dagatti" userId="43e7766c8bef1a99" providerId="LiveId" clId="{571E5FA9-B83F-472B-AE41-7DE03044985C}" dt="2025-04-21T02:28:11.641" v="257" actId="34807"/>
-          <ac:picMkLst>
-            <pc:docMk/>
-            <pc:sldMk cId="1712489481" sldId="2572"/>
-            <ac:picMk id="5" creationId="{625F9588-AD67-4918-850B-D4B679865E8E}"/>
-          </ac:picMkLst>
-        </pc:picChg>
-        <pc:cxnChg chg="add del">
-          <ac:chgData name="German Luis Dagatti" userId="43e7766c8bef1a99" providerId="LiveId" clId="{571E5FA9-B83F-472B-AE41-7DE03044985C}" dt="2025-04-21T02:28:11.641" v="257" actId="34807"/>
-          <ac:cxnSpMkLst>
-            <pc:docMk/>
-            <pc:sldMk cId="1712489481" sldId="2572"/>
-            <ac:cxnSpMk id="10" creationId="{118E06E4-607B-144B-382B-AD3D06B1EE8C}"/>
-          </ac:cxnSpMkLst>
-        </pc:cxnChg>
-        <pc:cxnChg chg="add del">
-          <ac:chgData name="German Luis Dagatti" userId="43e7766c8bef1a99" providerId="LiveId" clId="{571E5FA9-B83F-472B-AE41-7DE03044985C}" dt="2025-04-21T02:28:11.641" v="257" actId="34807"/>
-          <ac:cxnSpMkLst>
-            <pc:docMk/>
-            <pc:sldMk cId="1712489481" sldId="2572"/>
-            <ac:cxnSpMk id="14" creationId="{08052531-D50B-3899-B150-D05525F4F2BC}"/>
-          </ac:cxnSpMkLst>
-        </pc:cxnChg>
       </pc:sldChg>
       <pc:sldChg chg="addSp delSp modSp add del mod modTransition setBg modClrScheme chgLayout">
         <pc:chgData name="German Luis Dagatti" userId="43e7766c8bef1a99" providerId="LiveId" clId="{571E5FA9-B83F-472B-AE41-7DE03044985C}" dt="2025-04-21T02:37:57.584" v="276" actId="34807"/>
@@ -1444,30 +473,6 @@
           <pc:docMk/>
           <pc:sldMk cId="198609071" sldId="2573"/>
         </pc:sldMkLst>
-        <pc:spChg chg="mod">
-          <ac:chgData name="German Luis Dagatti" userId="43e7766c8bef1a99" providerId="LiveId" clId="{571E5FA9-B83F-472B-AE41-7DE03044985C}" dt="2025-04-21T02:37:57.584" v="276" actId="34807"/>
-          <ac:spMkLst>
-            <pc:docMk/>
-            <pc:sldMk cId="198609071" sldId="2573"/>
-            <ac:spMk id="2" creationId="{FC67DF5E-5A0A-6F39-4871-2DB68D43F286}"/>
-          </ac:spMkLst>
-        </pc:spChg>
-        <pc:spChg chg="add del">
-          <ac:chgData name="German Luis Dagatti" userId="43e7766c8bef1a99" providerId="LiveId" clId="{571E5FA9-B83F-472B-AE41-7DE03044985C}" dt="2025-04-21T02:37:57.584" v="276" actId="34807"/>
-          <ac:spMkLst>
-            <pc:docMk/>
-            <pc:sldMk cId="198609071" sldId="2573"/>
-            <ac:spMk id="9" creationId="{1653AE3C-AC4F-907C-B473-B9A30D21506F}"/>
-          </ac:spMkLst>
-        </pc:spChg>
-        <pc:graphicFrameChg chg="mod modGraphic">
-          <ac:chgData name="German Luis Dagatti" userId="43e7766c8bef1a99" providerId="LiveId" clId="{571E5FA9-B83F-472B-AE41-7DE03044985C}" dt="2025-04-21T02:37:57.584" v="276" actId="34807"/>
-          <ac:graphicFrameMkLst>
-            <pc:docMk/>
-            <pc:sldMk cId="198609071" sldId="2573"/>
-            <ac:graphicFrameMk id="4" creationId="{0755F0D3-EF33-4AA3-8E6D-0511C631A3EA}"/>
-          </ac:graphicFrameMkLst>
-        </pc:graphicFrameChg>
       </pc:sldChg>
       <pc:sldChg chg="addSp delSp modSp add del mod modTransition setBg modClrScheme addAnim delAnim chgLayout">
         <pc:chgData name="German Luis Dagatti" userId="43e7766c8bef1a99" providerId="LiveId" clId="{571E5FA9-B83F-472B-AE41-7DE03044985C}" dt="2025-04-21T02:28:11.641" v="257" actId="34807"/>
@@ -1475,54 +480,6 @@
           <pc:docMk/>
           <pc:sldMk cId="2830584289" sldId="2573"/>
         </pc:sldMkLst>
-        <pc:spChg chg="mod">
-          <ac:chgData name="German Luis Dagatti" userId="43e7766c8bef1a99" providerId="LiveId" clId="{571E5FA9-B83F-472B-AE41-7DE03044985C}" dt="2025-04-21T02:28:11.641" v="257" actId="34807"/>
-          <ac:spMkLst>
-            <pc:docMk/>
-            <pc:sldMk cId="2830584289" sldId="2573"/>
-            <ac:spMk id="2" creationId="{82D19B20-C1D4-433B-9F99-2D4BDCC266F9}"/>
-          </ac:spMkLst>
-        </pc:spChg>
-        <pc:spChg chg="mod">
-          <ac:chgData name="German Luis Dagatti" userId="43e7766c8bef1a99" providerId="LiveId" clId="{571E5FA9-B83F-472B-AE41-7DE03044985C}" dt="2025-04-21T02:28:11.641" v="257" actId="34807"/>
-          <ac:spMkLst>
-            <pc:docMk/>
-            <pc:sldMk cId="2830584289" sldId="2573"/>
-            <ac:spMk id="4" creationId="{796E1C2C-F17E-753F-B119-D6205B1D0A33}"/>
-          </ac:spMkLst>
-        </pc:spChg>
-        <pc:spChg chg="add del">
-          <ac:chgData name="German Luis Dagatti" userId="43e7766c8bef1a99" providerId="LiveId" clId="{571E5FA9-B83F-472B-AE41-7DE03044985C}" dt="2025-04-21T02:28:11.641" v="257" actId="34807"/>
-          <ac:spMkLst>
-            <pc:docMk/>
-            <pc:sldMk cId="2830584289" sldId="2573"/>
-            <ac:spMk id="12" creationId="{744CAA32-F237-419C-A2DD-43C28D920D3C}"/>
-          </ac:spMkLst>
-        </pc:spChg>
-        <pc:picChg chg="mod ord">
-          <ac:chgData name="German Luis Dagatti" userId="43e7766c8bef1a99" providerId="LiveId" clId="{571E5FA9-B83F-472B-AE41-7DE03044985C}" dt="2025-04-21T02:28:11.641" v="257" actId="34807"/>
-          <ac:picMkLst>
-            <pc:docMk/>
-            <pc:sldMk cId="2830584289" sldId="2573"/>
-            <ac:picMk id="5" creationId="{D133274C-E249-4069-A6F5-75F52A6A7028}"/>
-          </ac:picMkLst>
-        </pc:picChg>
-        <pc:cxnChg chg="add del">
-          <ac:chgData name="German Luis Dagatti" userId="43e7766c8bef1a99" providerId="LiveId" clId="{571E5FA9-B83F-472B-AE41-7DE03044985C}" dt="2025-04-21T02:28:11.641" v="257" actId="34807"/>
-          <ac:cxnSpMkLst>
-            <pc:docMk/>
-            <pc:sldMk cId="2830584289" sldId="2573"/>
-            <ac:cxnSpMk id="10" creationId="{118E06E4-607B-144B-382B-AD3D06B1EE8C}"/>
-          </ac:cxnSpMkLst>
-        </pc:cxnChg>
-        <pc:cxnChg chg="add del">
-          <ac:chgData name="German Luis Dagatti" userId="43e7766c8bef1a99" providerId="LiveId" clId="{571E5FA9-B83F-472B-AE41-7DE03044985C}" dt="2025-04-21T02:28:11.641" v="257" actId="34807"/>
-          <ac:cxnSpMkLst>
-            <pc:docMk/>
-            <pc:sldMk cId="2830584289" sldId="2573"/>
-            <ac:cxnSpMk id="14" creationId="{92025DBA-8780-9CA0-2826-FF6E3BD1A0C9}"/>
-          </ac:cxnSpMkLst>
-        </pc:cxnChg>
       </pc:sldChg>
       <pc:sldChg chg="addSp delSp modSp add del mod modTransition setBg modClrScheme addAnim delAnim chgLayout">
         <pc:chgData name="German Luis Dagatti" userId="43e7766c8bef1a99" providerId="LiveId" clId="{571E5FA9-B83F-472B-AE41-7DE03044985C}" dt="2025-04-21T02:28:11.641" v="257" actId="34807"/>
@@ -1530,38 +487,6 @@
           <pc:docMk/>
           <pc:sldMk cId="1874111297" sldId="2574"/>
         </pc:sldMkLst>
-        <pc:spChg chg="mod">
-          <ac:chgData name="German Luis Dagatti" userId="43e7766c8bef1a99" providerId="LiveId" clId="{571E5FA9-B83F-472B-AE41-7DE03044985C}" dt="2025-04-21T02:28:11.641" v="257" actId="34807"/>
-          <ac:spMkLst>
-            <pc:docMk/>
-            <pc:sldMk cId="1874111297" sldId="2574"/>
-            <ac:spMk id="2" creationId="{22DB6140-65D2-F4C4-FC43-6073827177A0}"/>
-          </ac:spMkLst>
-        </pc:spChg>
-        <pc:spChg chg="add del">
-          <ac:chgData name="German Luis Dagatti" userId="43e7766c8bef1a99" providerId="LiveId" clId="{571E5FA9-B83F-472B-AE41-7DE03044985C}" dt="2025-04-21T02:28:11.641" v="257" actId="34807"/>
-          <ac:spMkLst>
-            <pc:docMk/>
-            <pc:sldMk cId="1874111297" sldId="2574"/>
-            <ac:spMk id="7" creationId="{46B9231A-B34B-4A29-A6AC-532E1EE81575}"/>
-          </ac:spMkLst>
-        </pc:spChg>
-        <pc:spChg chg="add del">
-          <ac:chgData name="German Luis Dagatti" userId="43e7766c8bef1a99" providerId="LiveId" clId="{571E5FA9-B83F-472B-AE41-7DE03044985C}" dt="2025-04-21T02:28:11.641" v="257" actId="34807"/>
-          <ac:spMkLst>
-            <pc:docMk/>
-            <pc:sldMk cId="1874111297" sldId="2574"/>
-            <ac:spMk id="9" creationId="{19F9BF86-FE94-4517-B97D-026C7515E589}"/>
-          </ac:spMkLst>
-        </pc:spChg>
-        <pc:cxnChg chg="add del">
-          <ac:chgData name="German Luis Dagatti" userId="43e7766c8bef1a99" providerId="LiveId" clId="{571E5FA9-B83F-472B-AE41-7DE03044985C}" dt="2025-04-21T02:28:11.641" v="257" actId="34807"/>
-          <ac:cxnSpMkLst>
-            <pc:docMk/>
-            <pc:sldMk cId="1874111297" sldId="2574"/>
-            <ac:cxnSpMk id="11" creationId="{53C0BBAA-A5EC-5D5D-32E6-9F7EA6048489}"/>
-          </ac:cxnSpMkLst>
-        </pc:cxnChg>
       </pc:sldChg>
       <pc:sldChg chg="addSp delSp modSp add del mod modTransition setBg modClrScheme chgLayout">
         <pc:chgData name="German Luis Dagatti" userId="43e7766c8bef1a99" providerId="LiveId" clId="{571E5FA9-B83F-472B-AE41-7DE03044985C}" dt="2025-04-21T02:37:57.584" v="276" actId="34807"/>
@@ -1569,46 +494,6 @@
           <pc:docMk/>
           <pc:sldMk cId="3696758575" sldId="2574"/>
         </pc:sldMkLst>
-        <pc:spChg chg="mod">
-          <ac:chgData name="German Luis Dagatti" userId="43e7766c8bef1a99" providerId="LiveId" clId="{571E5FA9-B83F-472B-AE41-7DE03044985C}" dt="2025-04-21T02:37:57.584" v="276" actId="34807"/>
-          <ac:spMkLst>
-            <pc:docMk/>
-            <pc:sldMk cId="3696758575" sldId="2574"/>
-            <ac:spMk id="2" creationId="{54AF88AF-0BB1-33D3-CAAB-8B3DF3F7256C}"/>
-          </ac:spMkLst>
-        </pc:spChg>
-        <pc:spChg chg="add del">
-          <ac:chgData name="German Luis Dagatti" userId="43e7766c8bef1a99" providerId="LiveId" clId="{571E5FA9-B83F-472B-AE41-7DE03044985C}" dt="2025-04-21T02:37:57.584" v="276" actId="34807"/>
-          <ac:spMkLst>
-            <pc:docMk/>
-            <pc:sldMk cId="3696758575" sldId="2574"/>
-            <ac:spMk id="3" creationId="{3CA11935-6BC2-8195-B507-80282E9737DE}"/>
-          </ac:spMkLst>
-        </pc:spChg>
-        <pc:spChg chg="add del">
-          <ac:chgData name="German Luis Dagatti" userId="43e7766c8bef1a99" providerId="LiveId" clId="{571E5FA9-B83F-472B-AE41-7DE03044985C}" dt="2025-04-21T02:37:57.584" v="276" actId="34807"/>
-          <ac:spMkLst>
-            <pc:docMk/>
-            <pc:sldMk cId="3696758575" sldId="2574"/>
-            <ac:spMk id="8" creationId="{DBDA151C-5770-45E4-AAFF-59E7F403866D}"/>
-          </ac:spMkLst>
-        </pc:spChg>
-        <pc:graphicFrameChg chg="add del mod">
-          <ac:chgData name="German Luis Dagatti" userId="43e7766c8bef1a99" providerId="LiveId" clId="{571E5FA9-B83F-472B-AE41-7DE03044985C}" dt="2025-04-21T02:37:57.584" v="276" actId="34807"/>
-          <ac:graphicFrameMkLst>
-            <pc:docMk/>
-            <pc:sldMk cId="3696758575" sldId="2574"/>
-            <ac:graphicFrameMk id="11" creationId="{E410CA96-A495-9409-4E64-30D9130B8955}"/>
-          </ac:graphicFrameMkLst>
-        </pc:graphicFrameChg>
-        <pc:cxnChg chg="add del">
-          <ac:chgData name="German Luis Dagatti" userId="43e7766c8bef1a99" providerId="LiveId" clId="{571E5FA9-B83F-472B-AE41-7DE03044985C}" dt="2025-04-21T02:37:57.584" v="276" actId="34807"/>
-          <ac:cxnSpMkLst>
-            <pc:docMk/>
-            <pc:sldMk cId="3696758575" sldId="2574"/>
-            <ac:cxnSpMk id="10" creationId="{F21FC8CC-145C-8745-889B-6521F9CCB628}"/>
-          </ac:cxnSpMkLst>
-        </pc:cxnChg>
       </pc:sldChg>
       <pc:sldChg chg="addSp delSp modSp add del mod modTransition setBg modClrScheme addAnim delAnim chgLayout">
         <pc:chgData name="German Luis Dagatti" userId="43e7766c8bef1a99" providerId="LiveId" clId="{571E5FA9-B83F-472B-AE41-7DE03044985C}" dt="2025-04-21T02:28:11.641" v="257" actId="34807"/>
@@ -1616,54 +501,6 @@
           <pc:docMk/>
           <pc:sldMk cId="3410171415" sldId="2575"/>
         </pc:sldMkLst>
-        <pc:spChg chg="mod">
-          <ac:chgData name="German Luis Dagatti" userId="43e7766c8bef1a99" providerId="LiveId" clId="{571E5FA9-B83F-472B-AE41-7DE03044985C}" dt="2025-04-21T02:28:11.641" v="257" actId="34807"/>
-          <ac:spMkLst>
-            <pc:docMk/>
-            <pc:sldMk cId="3410171415" sldId="2575"/>
-            <ac:spMk id="2" creationId="{C8EB677E-2715-B88B-E496-1DF33183A260}"/>
-          </ac:spMkLst>
-        </pc:spChg>
-        <pc:spChg chg="mod">
-          <ac:chgData name="German Luis Dagatti" userId="43e7766c8bef1a99" providerId="LiveId" clId="{571E5FA9-B83F-472B-AE41-7DE03044985C}" dt="2025-04-21T02:28:11.641" v="257" actId="34807"/>
-          <ac:spMkLst>
-            <pc:docMk/>
-            <pc:sldMk cId="3410171415" sldId="2575"/>
-            <ac:spMk id="4" creationId="{A1B92CC0-6207-154D-7318-9F8FF0D6DE63}"/>
-          </ac:spMkLst>
-        </pc:spChg>
-        <pc:spChg chg="add del">
-          <ac:chgData name="German Luis Dagatti" userId="43e7766c8bef1a99" providerId="LiveId" clId="{571E5FA9-B83F-472B-AE41-7DE03044985C}" dt="2025-04-21T02:28:11.641" v="257" actId="34807"/>
-          <ac:spMkLst>
-            <pc:docMk/>
-            <pc:sldMk cId="3410171415" sldId="2575"/>
-            <ac:spMk id="12" creationId="{744CAA32-F237-419C-A2DD-43C28D920D3C}"/>
-          </ac:spMkLst>
-        </pc:spChg>
-        <pc:picChg chg="mod">
-          <ac:chgData name="German Luis Dagatti" userId="43e7766c8bef1a99" providerId="LiveId" clId="{571E5FA9-B83F-472B-AE41-7DE03044985C}" dt="2025-04-21T02:28:11.641" v="257" actId="34807"/>
-          <ac:picMkLst>
-            <pc:docMk/>
-            <pc:sldMk cId="3410171415" sldId="2575"/>
-            <ac:picMk id="5" creationId="{17E2DE59-A7EE-4207-84B0-57AF466BF2B1}"/>
-          </ac:picMkLst>
-        </pc:picChg>
-        <pc:cxnChg chg="add del">
-          <ac:chgData name="German Luis Dagatti" userId="43e7766c8bef1a99" providerId="LiveId" clId="{571E5FA9-B83F-472B-AE41-7DE03044985C}" dt="2025-04-21T02:28:11.641" v="257" actId="34807"/>
-          <ac:cxnSpMkLst>
-            <pc:docMk/>
-            <pc:sldMk cId="3410171415" sldId="2575"/>
-            <ac:cxnSpMk id="10" creationId="{118E06E4-607B-144B-382B-AD3D06B1EE8C}"/>
-          </ac:cxnSpMkLst>
-        </pc:cxnChg>
-        <pc:cxnChg chg="add del">
-          <ac:chgData name="German Luis Dagatti" userId="43e7766c8bef1a99" providerId="LiveId" clId="{571E5FA9-B83F-472B-AE41-7DE03044985C}" dt="2025-04-21T02:28:11.641" v="257" actId="34807"/>
-          <ac:cxnSpMkLst>
-            <pc:docMk/>
-            <pc:sldMk cId="3410171415" sldId="2575"/>
-            <ac:cxnSpMk id="14" creationId="{08052531-D50B-3899-B150-D05525F4F2BC}"/>
-          </ac:cxnSpMkLst>
-        </pc:cxnChg>
       </pc:sldChg>
       <pc:sldChg chg="addSp delSp modSp add del mod modTransition setBg modClrScheme addAnim delAnim chgLayout">
         <pc:chgData name="German Luis Dagatti" userId="43e7766c8bef1a99" providerId="LiveId" clId="{571E5FA9-B83F-472B-AE41-7DE03044985C}" dt="2025-04-21T02:28:11.641" v="257" actId="34807"/>
@@ -1671,54 +508,6 @@
           <pc:docMk/>
           <pc:sldMk cId="1142579137" sldId="2576"/>
         </pc:sldMkLst>
-        <pc:spChg chg="mod">
-          <ac:chgData name="German Luis Dagatti" userId="43e7766c8bef1a99" providerId="LiveId" clId="{571E5FA9-B83F-472B-AE41-7DE03044985C}" dt="2025-04-21T02:28:11.641" v="257" actId="34807"/>
-          <ac:spMkLst>
-            <pc:docMk/>
-            <pc:sldMk cId="1142579137" sldId="2576"/>
-            <ac:spMk id="2" creationId="{0BEC183B-42B3-6918-6107-6D0E0D283928}"/>
-          </ac:spMkLst>
-        </pc:spChg>
-        <pc:spChg chg="mod">
-          <ac:chgData name="German Luis Dagatti" userId="43e7766c8bef1a99" providerId="LiveId" clId="{571E5FA9-B83F-472B-AE41-7DE03044985C}" dt="2025-04-21T02:28:11.641" v="257" actId="34807"/>
-          <ac:spMkLst>
-            <pc:docMk/>
-            <pc:sldMk cId="1142579137" sldId="2576"/>
-            <ac:spMk id="4" creationId="{59461783-3855-ECEE-20EF-1CA163C4F266}"/>
-          </ac:spMkLst>
-        </pc:spChg>
-        <pc:spChg chg="add del">
-          <ac:chgData name="German Luis Dagatti" userId="43e7766c8bef1a99" providerId="LiveId" clId="{571E5FA9-B83F-472B-AE41-7DE03044985C}" dt="2025-04-21T02:28:11.641" v="257" actId="34807"/>
-          <ac:spMkLst>
-            <pc:docMk/>
-            <pc:sldMk cId="1142579137" sldId="2576"/>
-            <ac:spMk id="12" creationId="{744CAA32-F237-419C-A2DD-43C28D920D3C}"/>
-          </ac:spMkLst>
-        </pc:spChg>
-        <pc:picChg chg="mod">
-          <ac:chgData name="German Luis Dagatti" userId="43e7766c8bef1a99" providerId="LiveId" clId="{571E5FA9-B83F-472B-AE41-7DE03044985C}" dt="2025-04-21T02:28:11.641" v="257" actId="34807"/>
-          <ac:picMkLst>
-            <pc:docMk/>
-            <pc:sldMk cId="1142579137" sldId="2576"/>
-            <ac:picMk id="5" creationId="{FD06A6EB-E450-4E0E-A2B6-BB1DD731FAFD}"/>
-          </ac:picMkLst>
-        </pc:picChg>
-        <pc:cxnChg chg="add del">
-          <ac:chgData name="German Luis Dagatti" userId="43e7766c8bef1a99" providerId="LiveId" clId="{571E5FA9-B83F-472B-AE41-7DE03044985C}" dt="2025-04-21T02:28:11.641" v="257" actId="34807"/>
-          <ac:cxnSpMkLst>
-            <pc:docMk/>
-            <pc:sldMk cId="1142579137" sldId="2576"/>
-            <ac:cxnSpMk id="10" creationId="{118E06E4-607B-144B-382B-AD3D06B1EE8C}"/>
-          </ac:cxnSpMkLst>
-        </pc:cxnChg>
-        <pc:cxnChg chg="add del">
-          <ac:chgData name="German Luis Dagatti" userId="43e7766c8bef1a99" providerId="LiveId" clId="{571E5FA9-B83F-472B-AE41-7DE03044985C}" dt="2025-04-21T02:28:11.641" v="257" actId="34807"/>
-          <ac:cxnSpMkLst>
-            <pc:docMk/>
-            <pc:sldMk cId="1142579137" sldId="2576"/>
-            <ac:cxnSpMk id="14" creationId="{08052531-D50B-3899-B150-D05525F4F2BC}"/>
-          </ac:cxnSpMkLst>
-        </pc:cxnChg>
       </pc:sldChg>
       <pc:sldChg chg="addSp delSp modSp add del mod modTransition setBg modClrScheme chgLayout">
         <pc:chgData name="German Luis Dagatti" userId="43e7766c8bef1a99" providerId="LiveId" clId="{571E5FA9-B83F-472B-AE41-7DE03044985C}" dt="2025-04-21T02:28:11.641" v="257" actId="34807"/>
@@ -1726,30 +515,6 @@
           <pc:docMk/>
           <pc:sldMk cId="577960794" sldId="2577"/>
         </pc:sldMkLst>
-        <pc:spChg chg="mod">
-          <ac:chgData name="German Luis Dagatti" userId="43e7766c8bef1a99" providerId="LiveId" clId="{571E5FA9-B83F-472B-AE41-7DE03044985C}" dt="2025-04-21T02:28:11.641" v="257" actId="34807"/>
-          <ac:spMkLst>
-            <pc:docMk/>
-            <pc:sldMk cId="577960794" sldId="2577"/>
-            <ac:spMk id="2" creationId="{E7C19BB7-821C-F5DB-A92B-AA72D43E50D3}"/>
-          </ac:spMkLst>
-        </pc:spChg>
-        <pc:spChg chg="add del">
-          <ac:chgData name="German Luis Dagatti" userId="43e7766c8bef1a99" providerId="LiveId" clId="{571E5FA9-B83F-472B-AE41-7DE03044985C}" dt="2025-04-21T02:28:11.641" v="257" actId="34807"/>
-          <ac:spMkLst>
-            <pc:docMk/>
-            <pc:sldMk cId="577960794" sldId="2577"/>
-            <ac:spMk id="9" creationId="{1653AE3C-AC4F-907C-B473-B9A30D21506F}"/>
-          </ac:spMkLst>
-        </pc:spChg>
-        <pc:graphicFrameChg chg="mod modGraphic">
-          <ac:chgData name="German Luis Dagatti" userId="43e7766c8bef1a99" providerId="LiveId" clId="{571E5FA9-B83F-472B-AE41-7DE03044985C}" dt="2025-04-21T02:28:11.641" v="257" actId="34807"/>
-          <ac:graphicFrameMkLst>
-            <pc:docMk/>
-            <pc:sldMk cId="577960794" sldId="2577"/>
-            <ac:graphicFrameMk id="4" creationId="{D48BD6C8-19A4-4367-B76F-1799AAA1C460}"/>
-          </ac:graphicFrameMkLst>
-        </pc:graphicFrameChg>
       </pc:sldChg>
       <pc:sldChg chg="addSp delSp modSp add del mod modTransition setBg modClrScheme chgLayout">
         <pc:chgData name="German Luis Dagatti" userId="43e7766c8bef1a99" providerId="LiveId" clId="{571E5FA9-B83F-472B-AE41-7DE03044985C}" dt="2025-04-21T02:28:11.641" v="257" actId="34807"/>
@@ -1757,46 +522,6 @@
           <pc:docMk/>
           <pc:sldMk cId="494232822" sldId="2578"/>
         </pc:sldMkLst>
-        <pc:spChg chg="mod">
-          <ac:chgData name="German Luis Dagatti" userId="43e7766c8bef1a99" providerId="LiveId" clId="{571E5FA9-B83F-472B-AE41-7DE03044985C}" dt="2025-04-21T02:28:11.641" v="257" actId="34807"/>
-          <ac:spMkLst>
-            <pc:docMk/>
-            <pc:sldMk cId="494232822" sldId="2578"/>
-            <ac:spMk id="2" creationId="{6B937394-9271-0846-1D42-C8E892D874E3}"/>
-          </ac:spMkLst>
-        </pc:spChg>
-        <pc:spChg chg="add del">
-          <ac:chgData name="German Luis Dagatti" userId="43e7766c8bef1a99" providerId="LiveId" clId="{571E5FA9-B83F-472B-AE41-7DE03044985C}" dt="2025-04-21T02:28:11.641" v="257" actId="34807"/>
-          <ac:spMkLst>
-            <pc:docMk/>
-            <pc:sldMk cId="494232822" sldId="2578"/>
-            <ac:spMk id="3" creationId="{8EB5E2AA-2B95-6491-5096-EE2F9EF12E86}"/>
-          </ac:spMkLst>
-        </pc:spChg>
-        <pc:spChg chg="add del">
-          <ac:chgData name="German Luis Dagatti" userId="43e7766c8bef1a99" providerId="LiveId" clId="{571E5FA9-B83F-472B-AE41-7DE03044985C}" dt="2025-04-21T02:28:11.641" v="257" actId="34807"/>
-          <ac:spMkLst>
-            <pc:docMk/>
-            <pc:sldMk cId="494232822" sldId="2578"/>
-            <ac:spMk id="8" creationId="{DBDA151C-5770-45E4-AAFF-59E7F403866D}"/>
-          </ac:spMkLst>
-        </pc:spChg>
-        <pc:graphicFrameChg chg="add del mod">
-          <ac:chgData name="German Luis Dagatti" userId="43e7766c8bef1a99" providerId="LiveId" clId="{571E5FA9-B83F-472B-AE41-7DE03044985C}" dt="2025-04-21T02:28:11.641" v="257" actId="34807"/>
-          <ac:graphicFrameMkLst>
-            <pc:docMk/>
-            <pc:sldMk cId="494232822" sldId="2578"/>
-            <ac:graphicFrameMk id="11" creationId="{74CF4BBB-E756-EBB9-3153-555866B20EE5}"/>
-          </ac:graphicFrameMkLst>
-        </pc:graphicFrameChg>
-        <pc:cxnChg chg="add del">
-          <ac:chgData name="German Luis Dagatti" userId="43e7766c8bef1a99" providerId="LiveId" clId="{571E5FA9-B83F-472B-AE41-7DE03044985C}" dt="2025-04-21T02:28:11.641" v="257" actId="34807"/>
-          <ac:cxnSpMkLst>
-            <pc:docMk/>
-            <pc:sldMk cId="494232822" sldId="2578"/>
-            <ac:cxnSpMk id="10" creationId="{F21FC8CC-145C-8745-889B-6521F9CCB628}"/>
-          </ac:cxnSpMkLst>
-        </pc:cxnChg>
       </pc:sldChg>
       <pc:sldMasterChg chg="add del addSldLayout delSldLayout">
         <pc:chgData name="German Luis Dagatti" userId="43e7766c8bef1a99" providerId="LiveId" clId="{571E5FA9-B83F-472B-AE41-7DE03044985C}" dt="2025-04-21T02:37:57.584" v="276" actId="34807"/>
@@ -2170,7 +895,7 @@
           <a:p>
             <a:fld id="{0D4D5B49-29D8-4D6B-AF6B-7A1910EF617F}" type="datetimeFigureOut">
               <a:rPr lang="es-AR" smtClean="0"/>
-              <a:t>20/4/2025</a:t>
+              <a:t>27/4/2025</a:t>
             </a:fld>
             <a:endParaRPr lang="es-AR"/>
           </a:p>
@@ -2569,7 +1294,7 @@
           <a:p>
             <a:fld id="{3055E1DF-F919-4EC8-928B-43B9E83684A7}" type="datetimeFigureOut">
               <a:rPr lang="es-AR" smtClean="0"/>
-              <a:t>17/4/2025</a:t>
+              <a:t>27/4/2025</a:t>
             </a:fld>
             <a:endParaRPr lang="es-AR"/>
           </a:p>
@@ -2739,7 +1464,7 @@
           <a:p>
             <a:fld id="{3055E1DF-F919-4EC8-928B-43B9E83684A7}" type="datetimeFigureOut">
               <a:rPr lang="es-AR" smtClean="0"/>
-              <a:t>17/4/2025</a:t>
+              <a:t>27/4/2025</a:t>
             </a:fld>
             <a:endParaRPr lang="es-AR"/>
           </a:p>
@@ -2919,7 +1644,7 @@
           <a:p>
             <a:fld id="{3055E1DF-F919-4EC8-928B-43B9E83684A7}" type="datetimeFigureOut">
               <a:rPr lang="es-AR" smtClean="0"/>
-              <a:t>17/4/2025</a:t>
+              <a:t>27/4/2025</a:t>
             </a:fld>
             <a:endParaRPr lang="es-AR"/>
           </a:p>
@@ -3089,7 +1814,7 @@
           <a:p>
             <a:fld id="{3055E1DF-F919-4EC8-928B-43B9E83684A7}" type="datetimeFigureOut">
               <a:rPr lang="es-AR" smtClean="0"/>
-              <a:t>17/4/2025</a:t>
+              <a:t>27/4/2025</a:t>
             </a:fld>
             <a:endParaRPr lang="es-AR"/>
           </a:p>
@@ -3335,7 +2060,7 @@
           <a:p>
             <a:fld id="{3055E1DF-F919-4EC8-928B-43B9E83684A7}" type="datetimeFigureOut">
               <a:rPr lang="es-AR" smtClean="0"/>
-              <a:t>17/4/2025</a:t>
+              <a:t>27/4/2025</a:t>
             </a:fld>
             <a:endParaRPr lang="es-AR"/>
           </a:p>
@@ -3567,7 +2292,7 @@
           <a:p>
             <a:fld id="{3055E1DF-F919-4EC8-928B-43B9E83684A7}" type="datetimeFigureOut">
               <a:rPr lang="es-AR" smtClean="0"/>
-              <a:t>17/4/2025</a:t>
+              <a:t>27/4/2025</a:t>
             </a:fld>
             <a:endParaRPr lang="es-AR"/>
           </a:p>
@@ -3934,7 +2659,7 @@
           <a:p>
             <a:fld id="{3055E1DF-F919-4EC8-928B-43B9E83684A7}" type="datetimeFigureOut">
               <a:rPr lang="es-AR" smtClean="0"/>
-              <a:t>17/4/2025</a:t>
+              <a:t>27/4/2025</a:t>
             </a:fld>
             <a:endParaRPr lang="es-AR"/>
           </a:p>
@@ -4052,7 +2777,7 @@
           <a:p>
             <a:fld id="{3055E1DF-F919-4EC8-928B-43B9E83684A7}" type="datetimeFigureOut">
               <a:rPr lang="es-AR" smtClean="0"/>
-              <a:t>17/4/2025</a:t>
+              <a:t>27/4/2025</a:t>
             </a:fld>
             <a:endParaRPr lang="es-AR"/>
           </a:p>
@@ -4147,7 +2872,7 @@
           <a:p>
             <a:fld id="{3055E1DF-F919-4EC8-928B-43B9E83684A7}" type="datetimeFigureOut">
               <a:rPr lang="es-AR" smtClean="0"/>
-              <a:t>17/4/2025</a:t>
+              <a:t>27/4/2025</a:t>
             </a:fld>
             <a:endParaRPr lang="es-AR"/>
           </a:p>
@@ -4424,7 +3149,7 @@
           <a:p>
             <a:fld id="{3055E1DF-F919-4EC8-928B-43B9E83684A7}" type="datetimeFigureOut">
               <a:rPr lang="es-AR" smtClean="0"/>
-              <a:t>17/4/2025</a:t>
+              <a:t>27/4/2025</a:t>
             </a:fld>
             <a:endParaRPr lang="es-AR"/>
           </a:p>
@@ -4681,7 +3406,7 @@
           <a:p>
             <a:fld id="{3055E1DF-F919-4EC8-928B-43B9E83684A7}" type="datetimeFigureOut">
               <a:rPr lang="es-AR" smtClean="0"/>
-              <a:t>17/4/2025</a:t>
+              <a:t>27/4/2025</a:t>
             </a:fld>
             <a:endParaRPr lang="es-AR"/>
           </a:p>
@@ -4894,7 +3619,7 @@
           <a:p>
             <a:fld id="{3055E1DF-F919-4EC8-928B-43B9E83684A7}" type="datetimeFigureOut">
               <a:rPr lang="es-AR" smtClean="0"/>
-              <a:t>17/4/2025</a:t>
+              <a:t>27/4/2025</a:t>
             </a:fld>
             <a:endParaRPr lang="es-AR"/>
           </a:p>
@@ -5490,6 +4215,136 @@
           </a:prstGeom>
         </p:spPr>
       </p:pic>
+      <p:sp>
+        <p:nvSpPr>
+          <p:cNvPr id="2" name="CuadroTexto 1">
+            <a:extLst>
+              <a:ext uri="{FF2B5EF4-FFF2-40B4-BE49-F238E27FC236}">
+                <a16:creationId xmlns:a16="http://schemas.microsoft.com/office/drawing/2014/main" id="{2468AFBD-FD56-DCC0-8D0A-46F3E4253539}"/>
+              </a:ext>
+            </a:extLst>
+          </p:cNvPr>
+          <p:cNvSpPr txBox="1"/>
+          <p:nvPr/>
+        </p:nvSpPr>
+        <p:spPr>
+          <a:xfrm>
+            <a:off x="10046824" y="2592727"/>
+            <a:ext cx="1983129" cy="3139321"/>
+          </a:xfrm>
+          <a:prstGeom prst="rect">
+            <a:avLst/>
+          </a:prstGeom>
+          <a:solidFill>
+            <a:schemeClr val="bg1"/>
+          </a:solidFill>
+        </p:spPr>
+        <p:txBody>
+          <a:bodyPr wrap="square" rtlCol="0">
+            <a:spAutoFit/>
+          </a:bodyPr>
+          <a:lstStyle/>
+          <a:p>
+            <a:r>
+              <a:rPr lang="es-AR" dirty="0">
+                <a:solidFill>
+                  <a:srgbClr val="FF0000"/>
+                </a:solidFill>
+                <a:highlight>
+                  <a:srgbClr val="FFFF00"/>
+                </a:highlight>
+              </a:rPr>
+              <a:t>No se utilizaron las funciones integradas </a:t>
+            </a:r>
+            <a:r>
+              <a:rPr lang="es-AR" dirty="0" err="1">
+                <a:solidFill>
+                  <a:srgbClr val="FF0000"/>
+                </a:solidFill>
+                <a:highlight>
+                  <a:srgbClr val="FFFF00"/>
+                </a:highlight>
+              </a:rPr>
+              <a:t>bin</a:t>
+            </a:r>
+            <a:r>
+              <a:rPr lang="es-AR" dirty="0">
+                <a:solidFill>
+                  <a:srgbClr val="FF0000"/>
+                </a:solidFill>
+                <a:highlight>
+                  <a:srgbClr val="FFFF00"/>
+                </a:highlight>
+              </a:rPr>
+              <a:t>() y </a:t>
+            </a:r>
+            <a:r>
+              <a:rPr lang="es-AR" dirty="0" err="1">
+                <a:solidFill>
+                  <a:srgbClr val="FF0000"/>
+                </a:solidFill>
+                <a:highlight>
+                  <a:srgbClr val="FFFF00"/>
+                </a:highlight>
+              </a:rPr>
+              <a:t>int</a:t>
+            </a:r>
+            <a:r>
+              <a:rPr lang="es-AR" dirty="0">
+                <a:solidFill>
+                  <a:srgbClr val="FF0000"/>
+                </a:solidFill>
+                <a:highlight>
+                  <a:srgbClr val="FFFF00"/>
+                </a:highlight>
+              </a:rPr>
+              <a:t>(base), ya que queríamos presentar una opción que mostrara el proceso de cambio de un sistema a otro. </a:t>
+            </a:r>
+          </a:p>
+        </p:txBody>
+      </p:sp>
+      <p:cxnSp>
+        <p:nvCxnSpPr>
+          <p:cNvPr id="5" name="Conector recto de flecha 4">
+            <a:extLst>
+              <a:ext uri="{FF2B5EF4-FFF2-40B4-BE49-F238E27FC236}">
+                <a16:creationId xmlns:a16="http://schemas.microsoft.com/office/drawing/2014/main" id="{A8870A2D-5BFF-5882-019F-C62D217ABA57}"/>
+              </a:ext>
+            </a:extLst>
+          </p:cNvPr>
+          <p:cNvCxnSpPr/>
+          <p:nvPr/>
+        </p:nvCxnSpPr>
+        <p:spPr>
+          <a:xfrm>
+            <a:off x="9155575" y="4051139"/>
+            <a:ext cx="787078" cy="0"/>
+          </a:xfrm>
+          <a:prstGeom prst="straightConnector1">
+            <a:avLst/>
+          </a:prstGeom>
+          <a:ln w="57150">
+            <a:solidFill>
+              <a:srgbClr val="FF0000"/>
+            </a:solidFill>
+            <a:tailEnd type="triangle"/>
+          </a:ln>
+        </p:spPr>
+        <p:style>
+          <a:lnRef idx="2">
+            <a:schemeClr val="accent1"/>
+          </a:lnRef>
+          <a:fillRef idx="0">
+            <a:schemeClr val="accent1"/>
+          </a:fillRef>
+          <a:effectRef idx="1">
+            <a:schemeClr val="accent1"/>
+          </a:effectRef>
+          <a:fontRef idx="minor">
+            <a:schemeClr val="tx1"/>
+          </a:fontRef>
+        </p:style>
+      </p:cxnSp>
     </p:spTree>
     <p:extLst>
       <p:ext uri="{BB962C8B-B14F-4D97-AF65-F5344CB8AC3E}">
@@ -6090,6 +4945,50 @@
           </a:prstGeom>
         </p:spPr>
       </p:pic>
+      <p:sp>
+        <p:nvSpPr>
+          <p:cNvPr id="2" name="CuadroTexto 1">
+            <a:extLst>
+              <a:ext uri="{FF2B5EF4-FFF2-40B4-BE49-F238E27FC236}">
+                <a16:creationId xmlns:a16="http://schemas.microsoft.com/office/drawing/2014/main" id="{DD98688C-AC38-6129-916C-678B6A0BDD5F}"/>
+              </a:ext>
+            </a:extLst>
+          </p:cNvPr>
+          <p:cNvSpPr txBox="1"/>
+          <p:nvPr/>
+        </p:nvSpPr>
+        <p:spPr>
+          <a:xfrm>
+            <a:off x="7199455" y="1088019"/>
+            <a:ext cx="2893670" cy="646331"/>
+          </a:xfrm>
+          <a:prstGeom prst="rect">
+            <a:avLst/>
+          </a:prstGeom>
+          <a:solidFill>
+            <a:schemeClr val="bg1"/>
+          </a:solidFill>
+        </p:spPr>
+        <p:txBody>
+          <a:bodyPr wrap="square" rtlCol="0">
+            <a:spAutoFit/>
+          </a:bodyPr>
+          <a:lstStyle/>
+          <a:p>
+            <a:r>
+              <a:rPr lang="es-AR" dirty="0">
+                <a:solidFill>
+                  <a:srgbClr val="FF0000"/>
+                </a:solidFill>
+                <a:highlight>
+                  <a:srgbClr val="FFFF00"/>
+                </a:highlight>
+              </a:rPr>
+              <a:t>Trabajo colaborativo en GitHub</a:t>
+            </a:r>
+          </a:p>
+        </p:txBody>
+      </p:sp>
     </p:spTree>
     <p:extLst>
       <p:ext uri="{BB962C8B-B14F-4D97-AF65-F5344CB8AC3E}">
@@ -6150,6 +5049,93 @@
           </a:prstGeom>
         </p:spPr>
       </p:pic>
+      <p:sp>
+        <p:nvSpPr>
+          <p:cNvPr id="4" name="CuadroTexto 3">
+            <a:extLst>
+              <a:ext uri="{FF2B5EF4-FFF2-40B4-BE49-F238E27FC236}">
+                <a16:creationId xmlns:a16="http://schemas.microsoft.com/office/drawing/2014/main" id="{1F30F306-263B-CF4F-B4D9-4AD2A85A7F44}"/>
+              </a:ext>
+            </a:extLst>
+          </p:cNvPr>
+          <p:cNvSpPr txBox="1"/>
+          <p:nvPr/>
+        </p:nvSpPr>
+        <p:spPr>
+          <a:xfrm>
+            <a:off x="7257328" y="1088019"/>
+            <a:ext cx="2893670" cy="1200329"/>
+          </a:xfrm>
+          <a:prstGeom prst="rect">
+            <a:avLst/>
+          </a:prstGeom>
+          <a:solidFill>
+            <a:schemeClr val="bg1"/>
+          </a:solidFill>
+        </p:spPr>
+        <p:txBody>
+          <a:bodyPr wrap="square" rtlCol="0">
+            <a:spAutoFit/>
+          </a:bodyPr>
+          <a:lstStyle/>
+          <a:p>
+            <a:r>
+              <a:rPr lang="es-AR" dirty="0">
+                <a:solidFill>
+                  <a:srgbClr val="FF0000"/>
+                </a:solidFill>
+                <a:highlight>
+                  <a:srgbClr val="FFFF00"/>
+                </a:highlight>
+              </a:rPr>
+              <a:t>Problemas al momento de hacer el primer </a:t>
+            </a:r>
+            <a:r>
+              <a:rPr lang="es-AR" dirty="0" err="1">
+                <a:solidFill>
+                  <a:srgbClr val="FF0000"/>
+                </a:solidFill>
+                <a:highlight>
+                  <a:srgbClr val="FFFF00"/>
+                </a:highlight>
+              </a:rPr>
+              <a:t>Merge</a:t>
+            </a:r>
+            <a:r>
+              <a:rPr lang="es-AR" dirty="0">
+                <a:solidFill>
+                  <a:srgbClr val="FF0000"/>
+                </a:solidFill>
+                <a:highlight>
+                  <a:srgbClr val="FFFF00"/>
+                </a:highlight>
+              </a:rPr>
+              <a:t>.. </a:t>
+            </a:r>
+            <a:br>
+              <a:rPr lang="es-AR" dirty="0">
+                <a:solidFill>
+                  <a:srgbClr val="FF0000"/>
+                </a:solidFill>
+                <a:highlight>
+                  <a:srgbClr val="FFFF00"/>
+                </a:highlight>
+              </a:rPr>
+            </a:br>
+            <a:r>
+              <a:rPr lang="es-AR" dirty="0">
+                <a:solidFill>
+                  <a:srgbClr val="FF0000"/>
+                </a:solidFill>
+                <a:highlight>
+                  <a:srgbClr val="FFFF00"/>
+                </a:highlight>
+              </a:rPr>
+              <a:t>Todo tranquilo, se pudo solucionar </a:t>
+            </a:r>
+          </a:p>
+        </p:txBody>
+      </p:sp>
     </p:spTree>
     <p:extLst>
       <p:ext uri="{BB962C8B-B14F-4D97-AF65-F5344CB8AC3E}">
@@ -6164,6 +5150,138 @@
 </file>
 
 <file path=ppt/slides/slide7.xml><?xml version="1.0" encoding="utf-8"?>
+<p:sld xmlns:a="http://schemas.openxmlformats.org/drawingml/2006/main" xmlns:r="http://schemas.openxmlformats.org/officeDocument/2006/relationships" xmlns:p="http://schemas.openxmlformats.org/presentationml/2006/main">
+  <p:cSld>
+    <p:spTree>
+      <p:nvGrpSpPr>
+        <p:cNvPr id="1" name=""/>
+        <p:cNvGrpSpPr/>
+        <p:nvPr/>
+      </p:nvGrpSpPr>
+      <p:grpSpPr>
+        <a:xfrm>
+          <a:off x="0" y="0"/>
+          <a:ext cx="0" cy="0"/>
+          <a:chOff x="0" y="0"/>
+          <a:chExt cx="0" cy="0"/>
+        </a:xfrm>
+      </p:grpSpPr>
+      <p:pic>
+        <p:nvPicPr>
+          <p:cNvPr id="3" name="Imagen 2">
+            <a:extLst>
+              <a:ext uri="{FF2B5EF4-FFF2-40B4-BE49-F238E27FC236}">
+                <a16:creationId xmlns:a16="http://schemas.microsoft.com/office/drawing/2014/main" id="{D08EB241-DD0F-B533-5A3D-063438C8FF28}"/>
+              </a:ext>
+            </a:extLst>
+          </p:cNvPr>
+          <p:cNvPicPr>
+            <a:picLocks noChangeAspect="1"/>
+          </p:cNvPicPr>
+          <p:nvPr/>
+        </p:nvPicPr>
+        <p:blipFill>
+          <a:blip r:embed="rId2"/>
+          <a:stretch>
+            <a:fillRect/>
+          </a:stretch>
+        </p:blipFill>
+        <p:spPr>
+          <a:xfrm>
+            <a:off x="0" y="169752"/>
+            <a:ext cx="12192000" cy="6518495"/>
+          </a:xfrm>
+          <a:prstGeom prst="rect">
+            <a:avLst/>
+          </a:prstGeom>
+        </p:spPr>
+      </p:pic>
+      <p:sp>
+        <p:nvSpPr>
+          <p:cNvPr id="2" name="CuadroTexto 1">
+            <a:extLst>
+              <a:ext uri="{FF2B5EF4-FFF2-40B4-BE49-F238E27FC236}">
+                <a16:creationId xmlns:a16="http://schemas.microsoft.com/office/drawing/2014/main" id="{64512DE4-A359-BC9C-FD9F-C36E05ED4398}"/>
+              </a:ext>
+            </a:extLst>
+          </p:cNvPr>
+          <p:cNvSpPr txBox="1"/>
+          <p:nvPr/>
+        </p:nvSpPr>
+        <p:spPr>
+          <a:xfrm>
+            <a:off x="8657864" y="4143735"/>
+            <a:ext cx="2893670" cy="1200329"/>
+          </a:xfrm>
+          <a:prstGeom prst="rect">
+            <a:avLst/>
+          </a:prstGeom>
+          <a:solidFill>
+            <a:schemeClr val="bg1"/>
+          </a:solidFill>
+        </p:spPr>
+        <p:txBody>
+          <a:bodyPr wrap="square" rtlCol="0">
+            <a:spAutoFit/>
+          </a:bodyPr>
+          <a:lstStyle/>
+          <a:p>
+            <a:r>
+              <a:rPr lang="es-AR" dirty="0">
+                <a:solidFill>
+                  <a:srgbClr val="FF0000"/>
+                </a:solidFill>
+              </a:rPr>
+              <a:t>Problemas al momento de hacer el primer </a:t>
+            </a:r>
+            <a:r>
+              <a:rPr lang="es-AR" dirty="0" err="1">
+                <a:solidFill>
+                  <a:srgbClr val="FF0000"/>
+                </a:solidFill>
+              </a:rPr>
+              <a:t>Merge</a:t>
+            </a:r>
+            <a:r>
+              <a:rPr lang="es-AR" dirty="0">
+                <a:solidFill>
+                  <a:srgbClr val="FF0000"/>
+                </a:solidFill>
+              </a:rPr>
+              <a:t>.. </a:t>
+            </a:r>
+            <a:br>
+              <a:rPr lang="es-AR" dirty="0">
+                <a:solidFill>
+                  <a:srgbClr val="FF0000"/>
+                </a:solidFill>
+              </a:rPr>
+            </a:br>
+            <a:r>
+              <a:rPr lang="es-AR" dirty="0">
+                <a:solidFill>
+                  <a:srgbClr val="FF0000"/>
+                </a:solidFill>
+              </a:rPr>
+              <a:t>Todo tranquilo, se pudo solucionar </a:t>
+            </a:r>
+          </a:p>
+        </p:txBody>
+      </p:sp>
+    </p:spTree>
+    <p:extLst>
+      <p:ext uri="{BB962C8B-B14F-4D97-AF65-F5344CB8AC3E}">
+        <p14:creationId xmlns:p14="http://schemas.microsoft.com/office/powerpoint/2010/main" val="2948101576"/>
+      </p:ext>
+    </p:extLst>
+  </p:cSld>
+  <p:clrMapOvr>
+    <a:masterClrMapping/>
+  </p:clrMapOvr>
+</p:sld>
+</file>
+
+<file path=ppt/slides/slide8.xml><?xml version="1.0" encoding="utf-8"?>
 <p:sld xmlns:a="http://schemas.openxmlformats.org/drawingml/2006/main" xmlns:r="http://schemas.openxmlformats.org/officeDocument/2006/relationships" xmlns:p="http://schemas.openxmlformats.org/presentationml/2006/main">
   <p:cSld>
     <p:spTree>
@@ -6210,70 +5328,120 @@
           </a:prstGeom>
         </p:spPr>
       </p:pic>
+      <p:sp>
+        <p:nvSpPr>
+          <p:cNvPr id="4" name="CuadroTexto 3">
+            <a:extLst>
+              <a:ext uri="{FF2B5EF4-FFF2-40B4-BE49-F238E27FC236}">
+                <a16:creationId xmlns:a16="http://schemas.microsoft.com/office/drawing/2014/main" id="{DEE0833A-4A9A-34B2-71B9-6AD0E8F8F94F}"/>
+              </a:ext>
+            </a:extLst>
+          </p:cNvPr>
+          <p:cNvSpPr txBox="1"/>
+          <p:nvPr/>
+        </p:nvSpPr>
+        <p:spPr>
+          <a:xfrm>
+            <a:off x="8171728" y="2083442"/>
+            <a:ext cx="2893670" cy="1754326"/>
+          </a:xfrm>
+          <a:prstGeom prst="rect">
+            <a:avLst/>
+          </a:prstGeom>
+          <a:solidFill>
+            <a:schemeClr val="bg1"/>
+          </a:solidFill>
+        </p:spPr>
+        <p:txBody>
+          <a:bodyPr wrap="square" rtlCol="0">
+            <a:spAutoFit/>
+          </a:bodyPr>
+          <a:lstStyle/>
+          <a:p>
+            <a:r>
+              <a:rPr lang="es-AR" dirty="0">
+                <a:solidFill>
+                  <a:srgbClr val="FF0000"/>
+                </a:solidFill>
+              </a:rPr>
+              <a:t>A continuación vamos a mostrar como  se utilizó IA (</a:t>
+            </a:r>
+            <a:r>
+              <a:rPr lang="es-AR" dirty="0" err="1">
+                <a:solidFill>
+                  <a:srgbClr val="FF0000"/>
+                </a:solidFill>
+              </a:rPr>
+              <a:t>Copilot</a:t>
+            </a:r>
+            <a:r>
+              <a:rPr lang="es-AR" dirty="0">
+                <a:solidFill>
+                  <a:srgbClr val="FF0000"/>
+                </a:solidFill>
+              </a:rPr>
+              <a:t>) Para optimizar y mejorar el  programa. Nos centralizamos en el programa principal. </a:t>
+            </a:r>
+          </a:p>
+        </p:txBody>
+      </p:sp>
+      <p:sp>
+        <p:nvSpPr>
+          <p:cNvPr id="5" name="Cerrar llave 4">
+            <a:extLst>
+              <a:ext uri="{FF2B5EF4-FFF2-40B4-BE49-F238E27FC236}">
+                <a16:creationId xmlns:a16="http://schemas.microsoft.com/office/drawing/2014/main" id="{C5F233E5-1255-D11F-4CE4-5C202B4B9843}"/>
+              </a:ext>
+            </a:extLst>
+          </p:cNvPr>
+          <p:cNvSpPr/>
+          <p:nvPr/>
+        </p:nvSpPr>
+        <p:spPr>
+          <a:xfrm>
+            <a:off x="6944809" y="1666754"/>
+            <a:ext cx="798653" cy="2673752"/>
+          </a:xfrm>
+          <a:prstGeom prst="rightBrace">
+            <a:avLst>
+              <a:gd name="adj1" fmla="val 8333"/>
+              <a:gd name="adj2" fmla="val 49567"/>
+            </a:avLst>
+          </a:prstGeom>
+          <a:noFill/>
+          <a:ln w="76200">
+            <a:solidFill>
+              <a:srgbClr val="FF0000"/>
+            </a:solidFill>
+          </a:ln>
+        </p:spPr>
+        <p:style>
+          <a:lnRef idx="2">
+            <a:schemeClr val="accent1"/>
+          </a:lnRef>
+          <a:fillRef idx="0">
+            <a:schemeClr val="accent1"/>
+          </a:fillRef>
+          <a:effectRef idx="1">
+            <a:schemeClr val="accent1"/>
+          </a:effectRef>
+          <a:fontRef idx="minor">
+            <a:schemeClr val="tx1"/>
+          </a:fontRef>
+        </p:style>
+        <p:txBody>
+          <a:bodyPr rtlCol="0" anchor="ctr"/>
+          <a:lstStyle/>
+          <a:p>
+            <a:pPr algn="ctr"/>
+            <a:endParaRPr lang="es-AR"/>
+          </a:p>
+        </p:txBody>
+      </p:sp>
     </p:spTree>
     <p:extLst>
       <p:ext uri="{BB962C8B-B14F-4D97-AF65-F5344CB8AC3E}">
         <p14:creationId xmlns:p14="http://schemas.microsoft.com/office/powerpoint/2010/main" val="3021590399"/>
-      </p:ext>
-    </p:extLst>
-  </p:cSld>
-  <p:clrMapOvr>
-    <a:masterClrMapping/>
-  </p:clrMapOvr>
-</p:sld>
-</file>
-
-<file path=ppt/slides/slide8.xml><?xml version="1.0" encoding="utf-8"?>
-<p:sld xmlns:a="http://schemas.openxmlformats.org/drawingml/2006/main" xmlns:r="http://schemas.openxmlformats.org/officeDocument/2006/relationships" xmlns:p="http://schemas.openxmlformats.org/presentationml/2006/main">
-  <p:cSld>
-    <p:spTree>
-      <p:nvGrpSpPr>
-        <p:cNvPr id="1" name=""/>
-        <p:cNvGrpSpPr/>
-        <p:nvPr/>
-      </p:nvGrpSpPr>
-      <p:grpSpPr>
-        <a:xfrm>
-          <a:off x="0" y="0"/>
-          <a:ext cx="0" cy="0"/>
-          <a:chOff x="0" y="0"/>
-          <a:chExt cx="0" cy="0"/>
-        </a:xfrm>
-      </p:grpSpPr>
-      <p:pic>
-        <p:nvPicPr>
-          <p:cNvPr id="3" name="Imagen 2">
-            <a:extLst>
-              <a:ext uri="{FF2B5EF4-FFF2-40B4-BE49-F238E27FC236}">
-                <a16:creationId xmlns:a16="http://schemas.microsoft.com/office/drawing/2014/main" id="{D08EB241-DD0F-B533-5A3D-063438C8FF28}"/>
-              </a:ext>
-            </a:extLst>
-          </p:cNvPr>
-          <p:cNvPicPr>
-            <a:picLocks noChangeAspect="1"/>
-          </p:cNvPicPr>
-          <p:nvPr/>
-        </p:nvPicPr>
-        <p:blipFill>
-          <a:blip r:embed="rId2"/>
-          <a:stretch>
-            <a:fillRect/>
-          </a:stretch>
-        </p:blipFill>
-        <p:spPr>
-          <a:xfrm>
-            <a:off x="0" y="169752"/>
-            <a:ext cx="12192000" cy="6518495"/>
-          </a:xfrm>
-          <a:prstGeom prst="rect">
-            <a:avLst/>
-          </a:prstGeom>
-        </p:spPr>
-      </p:pic>
-    </p:spTree>
-    <p:extLst>
-      <p:ext uri="{BB962C8B-B14F-4D97-AF65-F5344CB8AC3E}">
-        <p14:creationId xmlns:p14="http://schemas.microsoft.com/office/powerpoint/2010/main" val="2948101576"/>
       </p:ext>
     </p:extLst>
   </p:cSld>

</xml_diff>